<commit_message>
Add Week 2 Homework printout
Co-Authored-By: Llewellyn Falco <10874+isidore@users.noreply.github.com>
</commit_message>
<xml_diff>
--- a/Homework Printouts.pptx
+++ b/Homework Printouts.pptx
@@ -106,6 +106,11 @@
       </a:defRPr>
     </a:lvl9pPr>
   </p:defaultTextStyle>
+  <p:extLst>
+    <p:ext uri="{EFAFB233-063F-42B5-8137-9DF3F51BA10A}">
+      <p15:sldGuideLst xmlns:p15="http://schemas.microsoft.com/office/powerpoint/2012/main"/>
+    </p:ext>
+  </p:extLst>
 </p:presentation>
 </file>
 
@@ -240,7 +245,7 @@
           <a:p>
             <a:fld id="{9BAD008B-C58F-DC47-9BDF-ACF9484DF185}" type="datetimeFigureOut">
               <a:rPr lang="en-GB" smtClean="0"/>
-              <a:t>30/10/2020</a:t>
+              <a:t>05/11/2020</a:t>
             </a:fld>
             <a:endParaRPr lang="en-GB"/>
           </a:p>
@@ -410,7 +415,7 @@
           <a:p>
             <a:fld id="{9BAD008B-C58F-DC47-9BDF-ACF9484DF185}" type="datetimeFigureOut">
               <a:rPr lang="en-GB" smtClean="0"/>
-              <a:t>30/10/2020</a:t>
+              <a:t>05/11/2020</a:t>
             </a:fld>
             <a:endParaRPr lang="en-GB"/>
           </a:p>
@@ -590,7 +595,7 @@
           <a:p>
             <a:fld id="{9BAD008B-C58F-DC47-9BDF-ACF9484DF185}" type="datetimeFigureOut">
               <a:rPr lang="en-GB" smtClean="0"/>
-              <a:t>30/10/2020</a:t>
+              <a:t>05/11/2020</a:t>
             </a:fld>
             <a:endParaRPr lang="en-GB"/>
           </a:p>
@@ -760,7 +765,7 @@
           <a:p>
             <a:fld id="{9BAD008B-C58F-DC47-9BDF-ACF9484DF185}" type="datetimeFigureOut">
               <a:rPr lang="en-GB" smtClean="0"/>
-              <a:t>30/10/2020</a:t>
+              <a:t>05/11/2020</a:t>
             </a:fld>
             <a:endParaRPr lang="en-GB"/>
           </a:p>
@@ -1004,7 +1009,7 @@
           <a:p>
             <a:fld id="{9BAD008B-C58F-DC47-9BDF-ACF9484DF185}" type="datetimeFigureOut">
               <a:rPr lang="en-GB" smtClean="0"/>
-              <a:t>30/10/2020</a:t>
+              <a:t>05/11/2020</a:t>
             </a:fld>
             <a:endParaRPr lang="en-GB"/>
           </a:p>
@@ -1236,7 +1241,7 @@
           <a:p>
             <a:fld id="{9BAD008B-C58F-DC47-9BDF-ACF9484DF185}" type="datetimeFigureOut">
               <a:rPr lang="en-GB" smtClean="0"/>
-              <a:t>30/10/2020</a:t>
+              <a:t>05/11/2020</a:t>
             </a:fld>
             <a:endParaRPr lang="en-GB"/>
           </a:p>
@@ -1603,7 +1608,7 @@
           <a:p>
             <a:fld id="{9BAD008B-C58F-DC47-9BDF-ACF9484DF185}" type="datetimeFigureOut">
               <a:rPr lang="en-GB" smtClean="0"/>
-              <a:t>30/10/2020</a:t>
+              <a:t>05/11/2020</a:t>
             </a:fld>
             <a:endParaRPr lang="en-GB"/>
           </a:p>
@@ -1721,7 +1726,7 @@
           <a:p>
             <a:fld id="{9BAD008B-C58F-DC47-9BDF-ACF9484DF185}" type="datetimeFigureOut">
               <a:rPr lang="en-GB" smtClean="0"/>
-              <a:t>30/10/2020</a:t>
+              <a:t>05/11/2020</a:t>
             </a:fld>
             <a:endParaRPr lang="en-GB"/>
           </a:p>
@@ -1816,7 +1821,7 @@
           <a:p>
             <a:fld id="{9BAD008B-C58F-DC47-9BDF-ACF9484DF185}" type="datetimeFigureOut">
               <a:rPr lang="en-GB" smtClean="0"/>
-              <a:t>30/10/2020</a:t>
+              <a:t>05/11/2020</a:t>
             </a:fld>
             <a:endParaRPr lang="en-GB"/>
           </a:p>
@@ -2093,7 +2098,7 @@
           <a:p>
             <a:fld id="{9BAD008B-C58F-DC47-9BDF-ACF9484DF185}" type="datetimeFigureOut">
               <a:rPr lang="en-GB" smtClean="0"/>
-              <a:t>30/10/2020</a:t>
+              <a:t>05/11/2020</a:t>
             </a:fld>
             <a:endParaRPr lang="en-GB"/>
           </a:p>
@@ -2350,7 +2355,7 @@
           <a:p>
             <a:fld id="{9BAD008B-C58F-DC47-9BDF-ACF9484DF185}" type="datetimeFigureOut">
               <a:rPr lang="en-GB" smtClean="0"/>
-              <a:t>30/10/2020</a:t>
+              <a:t>05/11/2020</a:t>
             </a:fld>
             <a:endParaRPr lang="en-GB"/>
           </a:p>
@@ -2563,7 +2568,7 @@
           <a:p>
             <a:fld id="{9BAD008B-C58F-DC47-9BDF-ACF9484DF185}" type="datetimeFigureOut">
               <a:rPr lang="en-GB" smtClean="0"/>
-              <a:t>30/10/2020</a:t>
+              <a:t>05/11/2020</a:t>
             </a:fld>
             <a:endParaRPr lang="en-GB"/>
           </a:p>
@@ -6264,7 +6269,7 @@
           <a:p>
             <a:r>
               <a:rPr lang="en-GB" dirty="0"/>
-              <a:t>Testing stories (if you test):</a:t>
+              <a:t>Classes I wish had printers:</a:t>
             </a:r>
           </a:p>
         </p:txBody>
@@ -6600,10 +6605,10 @@
         </p:nvGrpSpPr>
         <p:grpSpPr>
           <a:xfrm>
-            <a:off x="633452" y="5203767"/>
-            <a:ext cx="5734097" cy="1457407"/>
+            <a:off x="633452" y="4293438"/>
+            <a:ext cx="5734097" cy="867203"/>
             <a:chOff x="633452" y="3200400"/>
-            <a:chExt cx="5734097" cy="1457407"/>
+            <a:chExt cx="5734097" cy="867203"/>
           </a:xfrm>
         </p:grpSpPr>
         <p:sp>
@@ -6642,7 +6647,7 @@
                     </a:schemeClr>
                   </a:solidFill>
                 </a:rPr>
-                <a:t>Today I tested ______ and</a:t>
+                <a:t>ClassName3,       ClassName4</a:t>
               </a:r>
             </a:p>
           </p:txBody>
@@ -6750,369 +6755,6 @@
           <p:spPr>
             <a:xfrm>
               <a:off x="633452" y="4067603"/>
-              <a:ext cx="5734097" cy="0"/>
-            </a:xfrm>
-            <a:prstGeom prst="line">
-              <a:avLst/>
-            </a:prstGeom>
-            <a:ln>
-              <a:solidFill>
-                <a:schemeClr val="tx1"/>
-              </a:solidFill>
-            </a:ln>
-          </p:spPr>
-          <p:style>
-            <a:lnRef idx="1">
-              <a:schemeClr val="accent1"/>
-            </a:lnRef>
-            <a:fillRef idx="0">
-              <a:schemeClr val="accent1"/>
-            </a:fillRef>
-            <a:effectRef idx="0">
-              <a:schemeClr val="accent1"/>
-            </a:effectRef>
-            <a:fontRef idx="minor">
-              <a:schemeClr val="tx1"/>
-            </a:fontRef>
-          </p:style>
-        </p:cxnSp>
-        <p:cxnSp>
-          <p:nvCxnSpPr>
-            <p:cNvPr id="88" name="Straight Connector 87">
-              <a:extLst>
-                <a:ext uri="{FF2B5EF4-FFF2-40B4-BE49-F238E27FC236}">
-                  <a16:creationId xmlns:a16="http://schemas.microsoft.com/office/drawing/2014/main" id="{FDB8A382-E0F4-D94F-8B0C-C24E0B493A9D}"/>
-                </a:ext>
-              </a:extLst>
-            </p:cNvPr>
-            <p:cNvCxnSpPr>
-              <a:cxnSpLocks/>
-            </p:cNvCxnSpPr>
-            <p:nvPr/>
-          </p:nvCxnSpPr>
-          <p:spPr>
-            <a:xfrm>
-              <a:off x="633452" y="4657807"/>
-              <a:ext cx="5734097" cy="0"/>
-            </a:xfrm>
-            <a:prstGeom prst="line">
-              <a:avLst/>
-            </a:prstGeom>
-            <a:ln>
-              <a:solidFill>
-                <a:schemeClr val="tx1"/>
-              </a:solidFill>
-            </a:ln>
-          </p:spPr>
-          <p:style>
-            <a:lnRef idx="1">
-              <a:schemeClr val="accent1"/>
-            </a:lnRef>
-            <a:fillRef idx="0">
-              <a:schemeClr val="accent1"/>
-            </a:fillRef>
-            <a:effectRef idx="0">
-              <a:schemeClr val="accent1"/>
-            </a:effectRef>
-            <a:fontRef idx="minor">
-              <a:schemeClr val="tx1"/>
-            </a:fontRef>
-          </p:style>
-        </p:cxnSp>
-        <p:cxnSp>
-          <p:nvCxnSpPr>
-            <p:cNvPr id="89" name="Straight Connector 88">
-              <a:extLst>
-                <a:ext uri="{FF2B5EF4-FFF2-40B4-BE49-F238E27FC236}">
-                  <a16:creationId xmlns:a16="http://schemas.microsoft.com/office/drawing/2014/main" id="{513FE733-6216-964B-8B09-BEDD95C73BD2}"/>
-                </a:ext>
-              </a:extLst>
-            </p:cNvPr>
-            <p:cNvCxnSpPr>
-              <a:cxnSpLocks/>
-            </p:cNvCxnSpPr>
-            <p:nvPr/>
-          </p:nvCxnSpPr>
-          <p:spPr>
-            <a:xfrm>
-              <a:off x="633452" y="4362705"/>
-              <a:ext cx="5734097" cy="0"/>
-            </a:xfrm>
-            <a:prstGeom prst="line">
-              <a:avLst/>
-            </a:prstGeom>
-            <a:ln>
-              <a:solidFill>
-                <a:schemeClr val="tx1"/>
-              </a:solidFill>
-            </a:ln>
-          </p:spPr>
-          <p:style>
-            <a:lnRef idx="1">
-              <a:schemeClr val="accent1"/>
-            </a:lnRef>
-            <a:fillRef idx="0">
-              <a:schemeClr val="accent1"/>
-            </a:fillRef>
-            <a:effectRef idx="0">
-              <a:schemeClr val="accent1"/>
-            </a:effectRef>
-            <a:fontRef idx="minor">
-              <a:schemeClr val="tx1"/>
-            </a:fontRef>
-          </p:style>
-        </p:cxnSp>
-      </p:grpSp>
-      <p:grpSp>
-        <p:nvGrpSpPr>
-          <p:cNvPr id="90" name="Group 89">
-            <a:extLst>
-              <a:ext uri="{FF2B5EF4-FFF2-40B4-BE49-F238E27FC236}">
-                <a16:creationId xmlns:a16="http://schemas.microsoft.com/office/drawing/2014/main" id="{9E0BFDFB-A67F-074F-AE70-331FBD5F7E77}"/>
-              </a:ext>
-            </a:extLst>
-          </p:cNvPr>
-          <p:cNvGrpSpPr/>
-          <p:nvPr/>
-        </p:nvGrpSpPr>
-        <p:grpSpPr>
-          <a:xfrm>
-            <a:off x="633452" y="7207134"/>
-            <a:ext cx="5734097" cy="1457407"/>
-            <a:chOff x="633452" y="3200400"/>
-            <a:chExt cx="5734097" cy="1457407"/>
-          </a:xfrm>
-        </p:grpSpPr>
-        <p:sp>
-          <p:nvSpPr>
-            <p:cNvPr id="91" name="TextBox 90">
-              <a:extLst>
-                <a:ext uri="{FF2B5EF4-FFF2-40B4-BE49-F238E27FC236}">
-                  <a16:creationId xmlns:a16="http://schemas.microsoft.com/office/drawing/2014/main" id="{8B7A63AF-4C14-1441-A635-631CCF700A4B}"/>
-                </a:ext>
-              </a:extLst>
-            </p:cNvPr>
-            <p:cNvSpPr txBox="1"/>
-            <p:nvPr/>
-          </p:nvSpPr>
-          <p:spPr>
-            <a:xfrm>
-              <a:off x="1047404" y="3200400"/>
-              <a:ext cx="3794760" cy="276999"/>
-            </a:xfrm>
-            <a:prstGeom prst="rect">
-              <a:avLst/>
-            </a:prstGeom>
-            <a:noFill/>
-          </p:spPr>
-          <p:txBody>
-            <a:bodyPr wrap="square" rtlCol="0">
-              <a:spAutoFit/>
-            </a:bodyPr>
-            <a:lstStyle/>
-            <a:p>
-              <a:r>
-                <a:rPr lang="en-GB" sz="1200" dirty="0">
-                  <a:solidFill>
-                    <a:schemeClr val="bg1">
-                      <a:lumMod val="75000"/>
-                    </a:schemeClr>
-                  </a:solidFill>
-                </a:rPr>
-                <a:t>Today I tested ______ and</a:t>
-              </a:r>
-            </a:p>
-          </p:txBody>
-        </p:sp>
-        <p:cxnSp>
-          <p:nvCxnSpPr>
-            <p:cNvPr id="92" name="Straight Connector 91">
-              <a:extLst>
-                <a:ext uri="{FF2B5EF4-FFF2-40B4-BE49-F238E27FC236}">
-                  <a16:creationId xmlns:a16="http://schemas.microsoft.com/office/drawing/2014/main" id="{AE203220-2664-C244-B1D0-0F4FBE0ED6D5}"/>
-                </a:ext>
-              </a:extLst>
-            </p:cNvPr>
-            <p:cNvCxnSpPr>
-              <a:cxnSpLocks/>
-            </p:cNvCxnSpPr>
-            <p:nvPr/>
-          </p:nvCxnSpPr>
-          <p:spPr>
-            <a:xfrm>
-              <a:off x="633452" y="3477399"/>
-              <a:ext cx="5734097" cy="0"/>
-            </a:xfrm>
-            <a:prstGeom prst="line">
-              <a:avLst/>
-            </a:prstGeom>
-            <a:ln>
-              <a:solidFill>
-                <a:schemeClr val="tx1"/>
-              </a:solidFill>
-            </a:ln>
-          </p:spPr>
-          <p:style>
-            <a:lnRef idx="1">
-              <a:schemeClr val="accent1"/>
-            </a:lnRef>
-            <a:fillRef idx="0">
-              <a:schemeClr val="accent1"/>
-            </a:fillRef>
-            <a:effectRef idx="0">
-              <a:schemeClr val="accent1"/>
-            </a:effectRef>
-            <a:fontRef idx="minor">
-              <a:schemeClr val="tx1"/>
-            </a:fontRef>
-          </p:style>
-        </p:cxnSp>
-        <p:cxnSp>
-          <p:nvCxnSpPr>
-            <p:cNvPr id="93" name="Straight Connector 92">
-              <a:extLst>
-                <a:ext uri="{FF2B5EF4-FFF2-40B4-BE49-F238E27FC236}">
-                  <a16:creationId xmlns:a16="http://schemas.microsoft.com/office/drawing/2014/main" id="{8945653C-90A5-3245-822F-3088D74CED99}"/>
-                </a:ext>
-              </a:extLst>
-            </p:cNvPr>
-            <p:cNvCxnSpPr>
-              <a:cxnSpLocks/>
-            </p:cNvCxnSpPr>
-            <p:nvPr/>
-          </p:nvCxnSpPr>
-          <p:spPr>
-            <a:xfrm>
-              <a:off x="633452" y="3772501"/>
-              <a:ext cx="5734097" cy="0"/>
-            </a:xfrm>
-            <a:prstGeom prst="line">
-              <a:avLst/>
-            </a:prstGeom>
-            <a:ln>
-              <a:solidFill>
-                <a:schemeClr val="tx1"/>
-              </a:solidFill>
-            </a:ln>
-          </p:spPr>
-          <p:style>
-            <a:lnRef idx="1">
-              <a:schemeClr val="accent1"/>
-            </a:lnRef>
-            <a:fillRef idx="0">
-              <a:schemeClr val="accent1"/>
-            </a:fillRef>
-            <a:effectRef idx="0">
-              <a:schemeClr val="accent1"/>
-            </a:effectRef>
-            <a:fontRef idx="minor">
-              <a:schemeClr val="tx1"/>
-            </a:fontRef>
-          </p:style>
-        </p:cxnSp>
-        <p:cxnSp>
-          <p:nvCxnSpPr>
-            <p:cNvPr id="94" name="Straight Connector 93">
-              <a:extLst>
-                <a:ext uri="{FF2B5EF4-FFF2-40B4-BE49-F238E27FC236}">
-                  <a16:creationId xmlns:a16="http://schemas.microsoft.com/office/drawing/2014/main" id="{5511C019-C8DB-164C-993E-6DF8C7C561CF}"/>
-                </a:ext>
-              </a:extLst>
-            </p:cNvPr>
-            <p:cNvCxnSpPr>
-              <a:cxnSpLocks/>
-            </p:cNvCxnSpPr>
-            <p:nvPr/>
-          </p:nvCxnSpPr>
-          <p:spPr>
-            <a:xfrm>
-              <a:off x="633452" y="4067603"/>
-              <a:ext cx="5734097" cy="0"/>
-            </a:xfrm>
-            <a:prstGeom prst="line">
-              <a:avLst/>
-            </a:prstGeom>
-            <a:ln>
-              <a:solidFill>
-                <a:schemeClr val="tx1"/>
-              </a:solidFill>
-            </a:ln>
-          </p:spPr>
-          <p:style>
-            <a:lnRef idx="1">
-              <a:schemeClr val="accent1"/>
-            </a:lnRef>
-            <a:fillRef idx="0">
-              <a:schemeClr val="accent1"/>
-            </a:fillRef>
-            <a:effectRef idx="0">
-              <a:schemeClr val="accent1"/>
-            </a:effectRef>
-            <a:fontRef idx="minor">
-              <a:schemeClr val="tx1"/>
-            </a:fontRef>
-          </p:style>
-        </p:cxnSp>
-        <p:cxnSp>
-          <p:nvCxnSpPr>
-            <p:cNvPr id="95" name="Straight Connector 94">
-              <a:extLst>
-                <a:ext uri="{FF2B5EF4-FFF2-40B4-BE49-F238E27FC236}">
-                  <a16:creationId xmlns:a16="http://schemas.microsoft.com/office/drawing/2014/main" id="{73FA85BD-E5C7-8F4D-845D-A6C7F0E5EAE9}"/>
-                </a:ext>
-              </a:extLst>
-            </p:cNvPr>
-            <p:cNvCxnSpPr>
-              <a:cxnSpLocks/>
-            </p:cNvCxnSpPr>
-            <p:nvPr/>
-          </p:nvCxnSpPr>
-          <p:spPr>
-            <a:xfrm>
-              <a:off x="633452" y="4657807"/>
-              <a:ext cx="5734097" cy="0"/>
-            </a:xfrm>
-            <a:prstGeom prst="line">
-              <a:avLst/>
-            </a:prstGeom>
-            <a:ln>
-              <a:solidFill>
-                <a:schemeClr val="tx1"/>
-              </a:solidFill>
-            </a:ln>
-          </p:spPr>
-          <p:style>
-            <a:lnRef idx="1">
-              <a:schemeClr val="accent1"/>
-            </a:lnRef>
-            <a:fillRef idx="0">
-              <a:schemeClr val="accent1"/>
-            </a:fillRef>
-            <a:effectRef idx="0">
-              <a:schemeClr val="accent1"/>
-            </a:effectRef>
-            <a:fontRef idx="minor">
-              <a:schemeClr val="tx1"/>
-            </a:fontRef>
-          </p:style>
-        </p:cxnSp>
-        <p:cxnSp>
-          <p:nvCxnSpPr>
-            <p:cNvPr id="96" name="Straight Connector 95">
-              <a:extLst>
-                <a:ext uri="{FF2B5EF4-FFF2-40B4-BE49-F238E27FC236}">
-                  <a16:creationId xmlns:a16="http://schemas.microsoft.com/office/drawing/2014/main" id="{EDA28E50-4522-C44E-BB3A-A9DEEB032F81}"/>
-                </a:ext>
-              </a:extLst>
-            </p:cNvPr>
-            <p:cNvCxnSpPr>
-              <a:cxnSpLocks/>
-            </p:cNvCxnSpPr>
-            <p:nvPr/>
-          </p:nvCxnSpPr>
-          <p:spPr>
-            <a:xfrm>
-              <a:off x="633452" y="4362705"/>
               <a:ext cx="5734097" cy="0"/>
             </a:xfrm>
             <a:prstGeom prst="line">
@@ -7316,6 +6958,1025 @@
           </a:p>
         </p:txBody>
       </p:sp>
+      <p:sp>
+        <p:nvSpPr>
+          <p:cNvPr id="29" name="TextBox 28">
+            <a:extLst>
+              <a:ext uri="{FF2B5EF4-FFF2-40B4-BE49-F238E27FC236}">
+                <a16:creationId xmlns:a16="http://schemas.microsoft.com/office/drawing/2014/main" id="{48AE2099-CF8C-E847-B5E4-28F6585550FC}"/>
+              </a:ext>
+            </a:extLst>
+          </p:cNvPr>
+          <p:cNvSpPr txBox="1"/>
+          <p:nvPr/>
+        </p:nvSpPr>
+        <p:spPr>
+          <a:xfrm>
+            <a:off x="922713" y="5547516"/>
+            <a:ext cx="5128952" cy="369332"/>
+          </a:xfrm>
+          <a:prstGeom prst="rect">
+            <a:avLst/>
+          </a:prstGeom>
+          <a:noFill/>
+        </p:spPr>
+        <p:txBody>
+          <a:bodyPr wrap="square" rtlCol="0">
+            <a:spAutoFit/>
+          </a:bodyPr>
+          <a:lstStyle/>
+          <a:p>
+            <a:r>
+              <a:rPr lang="en-GB" dirty="0"/>
+              <a:t>Printer ideas (examples):</a:t>
+            </a:r>
+          </a:p>
+        </p:txBody>
+      </p:sp>
+      <p:grpSp>
+        <p:nvGrpSpPr>
+          <p:cNvPr id="2" name="Group 1">
+            <a:extLst>
+              <a:ext uri="{FF2B5EF4-FFF2-40B4-BE49-F238E27FC236}">
+                <a16:creationId xmlns:a16="http://schemas.microsoft.com/office/drawing/2014/main" id="{24987F36-C8D7-C54A-A7BD-50EC341E87C7}"/>
+              </a:ext>
+            </a:extLst>
+          </p:cNvPr>
+          <p:cNvGrpSpPr/>
+          <p:nvPr/>
+        </p:nvGrpSpPr>
+        <p:grpSpPr>
+          <a:xfrm>
+            <a:off x="633452" y="6031579"/>
+            <a:ext cx="2693900" cy="2633064"/>
+            <a:chOff x="633452" y="6031579"/>
+            <a:chExt cx="2693900" cy="2633064"/>
+          </a:xfrm>
+        </p:grpSpPr>
+        <p:sp>
+          <p:nvSpPr>
+            <p:cNvPr id="91" name="TextBox 90">
+              <a:extLst>
+                <a:ext uri="{FF2B5EF4-FFF2-40B4-BE49-F238E27FC236}">
+                  <a16:creationId xmlns:a16="http://schemas.microsoft.com/office/drawing/2014/main" id="{8B7A63AF-4C14-1441-A635-631CCF700A4B}"/>
+                </a:ext>
+              </a:extLst>
+            </p:cNvPr>
+            <p:cNvSpPr txBox="1"/>
+            <p:nvPr/>
+          </p:nvSpPr>
+          <p:spPr>
+            <a:xfrm>
+              <a:off x="814834" y="6031579"/>
+              <a:ext cx="2512518" cy="276999"/>
+            </a:xfrm>
+            <a:prstGeom prst="rect">
+              <a:avLst/>
+            </a:prstGeom>
+            <a:noFill/>
+          </p:spPr>
+          <p:txBody>
+            <a:bodyPr wrap="square" rtlCol="0">
+              <a:spAutoFit/>
+            </a:bodyPr>
+            <a:lstStyle/>
+            <a:p>
+              <a:r>
+                <a:rPr lang="en-GB" sz="1200" dirty="0">
+                  <a:solidFill>
+                    <a:schemeClr val="bg1">
+                      <a:lumMod val="75000"/>
+                    </a:schemeClr>
+                  </a:solidFill>
+                </a:rPr>
+                <a:t>Example format for ClassName5</a:t>
+              </a:r>
+            </a:p>
+          </p:txBody>
+        </p:sp>
+        <p:cxnSp>
+          <p:nvCxnSpPr>
+            <p:cNvPr id="92" name="Straight Connector 91">
+              <a:extLst>
+                <a:ext uri="{FF2B5EF4-FFF2-40B4-BE49-F238E27FC236}">
+                  <a16:creationId xmlns:a16="http://schemas.microsoft.com/office/drawing/2014/main" id="{AE203220-2664-C244-B1D0-0F4FBE0ED6D5}"/>
+                </a:ext>
+              </a:extLst>
+            </p:cNvPr>
+            <p:cNvCxnSpPr>
+              <a:cxnSpLocks/>
+            </p:cNvCxnSpPr>
+            <p:nvPr/>
+          </p:nvCxnSpPr>
+          <p:spPr>
+            <a:xfrm>
+              <a:off x="633452" y="6308578"/>
+              <a:ext cx="2512519" cy="0"/>
+            </a:xfrm>
+            <a:prstGeom prst="line">
+              <a:avLst/>
+            </a:prstGeom>
+            <a:ln>
+              <a:solidFill>
+                <a:schemeClr val="tx1"/>
+              </a:solidFill>
+            </a:ln>
+          </p:spPr>
+          <p:style>
+            <a:lnRef idx="1">
+              <a:schemeClr val="accent1"/>
+            </a:lnRef>
+            <a:fillRef idx="0">
+              <a:schemeClr val="accent1"/>
+            </a:fillRef>
+            <a:effectRef idx="0">
+              <a:schemeClr val="accent1"/>
+            </a:effectRef>
+            <a:fontRef idx="minor">
+              <a:schemeClr val="tx1"/>
+            </a:fontRef>
+          </p:style>
+        </p:cxnSp>
+        <p:cxnSp>
+          <p:nvCxnSpPr>
+            <p:cNvPr id="93" name="Straight Connector 92">
+              <a:extLst>
+                <a:ext uri="{FF2B5EF4-FFF2-40B4-BE49-F238E27FC236}">
+                  <a16:creationId xmlns:a16="http://schemas.microsoft.com/office/drawing/2014/main" id="{8945653C-90A5-3245-822F-3088D74CED99}"/>
+                </a:ext>
+              </a:extLst>
+            </p:cNvPr>
+            <p:cNvCxnSpPr>
+              <a:cxnSpLocks/>
+            </p:cNvCxnSpPr>
+            <p:nvPr/>
+          </p:nvCxnSpPr>
+          <p:spPr>
+            <a:xfrm>
+              <a:off x="633452" y="6603680"/>
+              <a:ext cx="2512519" cy="0"/>
+            </a:xfrm>
+            <a:prstGeom prst="line">
+              <a:avLst/>
+            </a:prstGeom>
+            <a:ln>
+              <a:solidFill>
+                <a:schemeClr val="tx1"/>
+              </a:solidFill>
+            </a:ln>
+          </p:spPr>
+          <p:style>
+            <a:lnRef idx="1">
+              <a:schemeClr val="accent1"/>
+            </a:lnRef>
+            <a:fillRef idx="0">
+              <a:schemeClr val="accent1"/>
+            </a:fillRef>
+            <a:effectRef idx="0">
+              <a:schemeClr val="accent1"/>
+            </a:effectRef>
+            <a:fontRef idx="minor">
+              <a:schemeClr val="tx1"/>
+            </a:fontRef>
+          </p:style>
+        </p:cxnSp>
+        <p:cxnSp>
+          <p:nvCxnSpPr>
+            <p:cNvPr id="94" name="Straight Connector 93">
+              <a:extLst>
+                <a:ext uri="{FF2B5EF4-FFF2-40B4-BE49-F238E27FC236}">
+                  <a16:creationId xmlns:a16="http://schemas.microsoft.com/office/drawing/2014/main" id="{5511C019-C8DB-164C-993E-6DF8C7C561CF}"/>
+                </a:ext>
+              </a:extLst>
+            </p:cNvPr>
+            <p:cNvCxnSpPr>
+              <a:cxnSpLocks/>
+            </p:cNvCxnSpPr>
+            <p:nvPr/>
+          </p:nvCxnSpPr>
+          <p:spPr>
+            <a:xfrm>
+              <a:off x="633452" y="6898782"/>
+              <a:ext cx="2512519" cy="0"/>
+            </a:xfrm>
+            <a:prstGeom prst="line">
+              <a:avLst/>
+            </a:prstGeom>
+            <a:ln>
+              <a:solidFill>
+                <a:schemeClr val="tx1"/>
+              </a:solidFill>
+            </a:ln>
+          </p:spPr>
+          <p:style>
+            <a:lnRef idx="1">
+              <a:schemeClr val="accent1"/>
+            </a:lnRef>
+            <a:fillRef idx="0">
+              <a:schemeClr val="accent1"/>
+            </a:fillRef>
+            <a:effectRef idx="0">
+              <a:schemeClr val="accent1"/>
+            </a:effectRef>
+            <a:fontRef idx="minor">
+              <a:schemeClr val="tx1"/>
+            </a:fontRef>
+          </p:style>
+        </p:cxnSp>
+        <p:cxnSp>
+          <p:nvCxnSpPr>
+            <p:cNvPr id="95" name="Straight Connector 94">
+              <a:extLst>
+                <a:ext uri="{FF2B5EF4-FFF2-40B4-BE49-F238E27FC236}">
+                  <a16:creationId xmlns:a16="http://schemas.microsoft.com/office/drawing/2014/main" id="{73FA85BD-E5C7-8F4D-845D-A6C7F0E5EAE9}"/>
+                </a:ext>
+              </a:extLst>
+            </p:cNvPr>
+            <p:cNvCxnSpPr>
+              <a:cxnSpLocks/>
+            </p:cNvCxnSpPr>
+            <p:nvPr/>
+          </p:nvCxnSpPr>
+          <p:spPr>
+            <a:xfrm>
+              <a:off x="633452" y="7488986"/>
+              <a:ext cx="2512519" cy="0"/>
+            </a:xfrm>
+            <a:prstGeom prst="line">
+              <a:avLst/>
+            </a:prstGeom>
+            <a:ln>
+              <a:solidFill>
+                <a:schemeClr val="tx1"/>
+              </a:solidFill>
+            </a:ln>
+          </p:spPr>
+          <p:style>
+            <a:lnRef idx="1">
+              <a:schemeClr val="accent1"/>
+            </a:lnRef>
+            <a:fillRef idx="0">
+              <a:schemeClr val="accent1"/>
+            </a:fillRef>
+            <a:effectRef idx="0">
+              <a:schemeClr val="accent1"/>
+            </a:effectRef>
+            <a:fontRef idx="minor">
+              <a:schemeClr val="tx1"/>
+            </a:fontRef>
+          </p:style>
+        </p:cxnSp>
+        <p:cxnSp>
+          <p:nvCxnSpPr>
+            <p:cNvPr id="96" name="Straight Connector 95">
+              <a:extLst>
+                <a:ext uri="{FF2B5EF4-FFF2-40B4-BE49-F238E27FC236}">
+                  <a16:creationId xmlns:a16="http://schemas.microsoft.com/office/drawing/2014/main" id="{EDA28E50-4522-C44E-BB3A-A9DEEB032F81}"/>
+                </a:ext>
+              </a:extLst>
+            </p:cNvPr>
+            <p:cNvCxnSpPr>
+              <a:cxnSpLocks/>
+            </p:cNvCxnSpPr>
+            <p:nvPr/>
+          </p:nvCxnSpPr>
+          <p:spPr>
+            <a:xfrm>
+              <a:off x="633452" y="7193884"/>
+              <a:ext cx="2512519" cy="0"/>
+            </a:xfrm>
+            <a:prstGeom prst="line">
+              <a:avLst/>
+            </a:prstGeom>
+            <a:ln>
+              <a:solidFill>
+                <a:schemeClr val="tx1"/>
+              </a:solidFill>
+            </a:ln>
+          </p:spPr>
+          <p:style>
+            <a:lnRef idx="1">
+              <a:schemeClr val="accent1"/>
+            </a:lnRef>
+            <a:fillRef idx="0">
+              <a:schemeClr val="accent1"/>
+            </a:fillRef>
+            <a:effectRef idx="0">
+              <a:schemeClr val="accent1"/>
+            </a:effectRef>
+            <a:fontRef idx="minor">
+              <a:schemeClr val="tx1"/>
+            </a:fontRef>
+          </p:style>
+        </p:cxnSp>
+        <p:cxnSp>
+          <p:nvCxnSpPr>
+            <p:cNvPr id="30" name="Straight Connector 29">
+              <a:extLst>
+                <a:ext uri="{FF2B5EF4-FFF2-40B4-BE49-F238E27FC236}">
+                  <a16:creationId xmlns:a16="http://schemas.microsoft.com/office/drawing/2014/main" id="{125AB048-6580-A34D-AD24-8C1A984B7CE6}"/>
+                </a:ext>
+              </a:extLst>
+            </p:cNvPr>
+            <p:cNvCxnSpPr>
+              <a:cxnSpLocks/>
+            </p:cNvCxnSpPr>
+            <p:nvPr/>
+          </p:nvCxnSpPr>
+          <p:spPr>
+            <a:xfrm>
+              <a:off x="633452" y="7484235"/>
+              <a:ext cx="2512519" cy="0"/>
+            </a:xfrm>
+            <a:prstGeom prst="line">
+              <a:avLst/>
+            </a:prstGeom>
+            <a:ln>
+              <a:solidFill>
+                <a:schemeClr val="tx1"/>
+              </a:solidFill>
+            </a:ln>
+          </p:spPr>
+          <p:style>
+            <a:lnRef idx="1">
+              <a:schemeClr val="accent1"/>
+            </a:lnRef>
+            <a:fillRef idx="0">
+              <a:schemeClr val="accent1"/>
+            </a:fillRef>
+            <a:effectRef idx="0">
+              <a:schemeClr val="accent1"/>
+            </a:effectRef>
+            <a:fontRef idx="minor">
+              <a:schemeClr val="tx1"/>
+            </a:fontRef>
+          </p:style>
+        </p:cxnSp>
+        <p:cxnSp>
+          <p:nvCxnSpPr>
+            <p:cNvPr id="31" name="Straight Connector 30">
+              <a:extLst>
+                <a:ext uri="{FF2B5EF4-FFF2-40B4-BE49-F238E27FC236}">
+                  <a16:creationId xmlns:a16="http://schemas.microsoft.com/office/drawing/2014/main" id="{116A72F3-D6EE-D240-B2AF-8BF7D24EF9DB}"/>
+                </a:ext>
+              </a:extLst>
+            </p:cNvPr>
+            <p:cNvCxnSpPr>
+              <a:cxnSpLocks/>
+            </p:cNvCxnSpPr>
+            <p:nvPr/>
+          </p:nvCxnSpPr>
+          <p:spPr>
+            <a:xfrm>
+              <a:off x="633452" y="7779337"/>
+              <a:ext cx="2512519" cy="0"/>
+            </a:xfrm>
+            <a:prstGeom prst="line">
+              <a:avLst/>
+            </a:prstGeom>
+            <a:ln>
+              <a:solidFill>
+                <a:schemeClr val="tx1"/>
+              </a:solidFill>
+            </a:ln>
+          </p:spPr>
+          <p:style>
+            <a:lnRef idx="1">
+              <a:schemeClr val="accent1"/>
+            </a:lnRef>
+            <a:fillRef idx="0">
+              <a:schemeClr val="accent1"/>
+            </a:fillRef>
+            <a:effectRef idx="0">
+              <a:schemeClr val="accent1"/>
+            </a:effectRef>
+            <a:fontRef idx="minor">
+              <a:schemeClr val="tx1"/>
+            </a:fontRef>
+          </p:style>
+        </p:cxnSp>
+        <p:cxnSp>
+          <p:nvCxnSpPr>
+            <p:cNvPr id="32" name="Straight Connector 31">
+              <a:extLst>
+                <a:ext uri="{FF2B5EF4-FFF2-40B4-BE49-F238E27FC236}">
+                  <a16:creationId xmlns:a16="http://schemas.microsoft.com/office/drawing/2014/main" id="{7F46A698-A8D2-0B44-91F8-9C0820A5D99B}"/>
+                </a:ext>
+              </a:extLst>
+            </p:cNvPr>
+            <p:cNvCxnSpPr>
+              <a:cxnSpLocks/>
+            </p:cNvCxnSpPr>
+            <p:nvPr/>
+          </p:nvCxnSpPr>
+          <p:spPr>
+            <a:xfrm>
+              <a:off x="633452" y="8074439"/>
+              <a:ext cx="2512519" cy="0"/>
+            </a:xfrm>
+            <a:prstGeom prst="line">
+              <a:avLst/>
+            </a:prstGeom>
+            <a:ln>
+              <a:solidFill>
+                <a:schemeClr val="tx1"/>
+              </a:solidFill>
+            </a:ln>
+          </p:spPr>
+          <p:style>
+            <a:lnRef idx="1">
+              <a:schemeClr val="accent1"/>
+            </a:lnRef>
+            <a:fillRef idx="0">
+              <a:schemeClr val="accent1"/>
+            </a:fillRef>
+            <a:effectRef idx="0">
+              <a:schemeClr val="accent1"/>
+            </a:effectRef>
+            <a:fontRef idx="minor">
+              <a:schemeClr val="tx1"/>
+            </a:fontRef>
+          </p:style>
+        </p:cxnSp>
+        <p:cxnSp>
+          <p:nvCxnSpPr>
+            <p:cNvPr id="33" name="Straight Connector 32">
+              <a:extLst>
+                <a:ext uri="{FF2B5EF4-FFF2-40B4-BE49-F238E27FC236}">
+                  <a16:creationId xmlns:a16="http://schemas.microsoft.com/office/drawing/2014/main" id="{1FD7DDE6-1BF1-BB49-91CB-4C693A5110C5}"/>
+                </a:ext>
+              </a:extLst>
+            </p:cNvPr>
+            <p:cNvCxnSpPr>
+              <a:cxnSpLocks/>
+            </p:cNvCxnSpPr>
+            <p:nvPr/>
+          </p:nvCxnSpPr>
+          <p:spPr>
+            <a:xfrm>
+              <a:off x="633452" y="8664643"/>
+              <a:ext cx="2512519" cy="0"/>
+            </a:xfrm>
+            <a:prstGeom prst="line">
+              <a:avLst/>
+            </a:prstGeom>
+            <a:ln>
+              <a:solidFill>
+                <a:schemeClr val="tx1"/>
+              </a:solidFill>
+            </a:ln>
+          </p:spPr>
+          <p:style>
+            <a:lnRef idx="1">
+              <a:schemeClr val="accent1"/>
+            </a:lnRef>
+            <a:fillRef idx="0">
+              <a:schemeClr val="accent1"/>
+            </a:fillRef>
+            <a:effectRef idx="0">
+              <a:schemeClr val="accent1"/>
+            </a:effectRef>
+            <a:fontRef idx="minor">
+              <a:schemeClr val="tx1"/>
+            </a:fontRef>
+          </p:style>
+        </p:cxnSp>
+        <p:cxnSp>
+          <p:nvCxnSpPr>
+            <p:cNvPr id="34" name="Straight Connector 33">
+              <a:extLst>
+                <a:ext uri="{FF2B5EF4-FFF2-40B4-BE49-F238E27FC236}">
+                  <a16:creationId xmlns:a16="http://schemas.microsoft.com/office/drawing/2014/main" id="{69E81771-9F47-F442-AFC4-6DD1BF13D91D}"/>
+                </a:ext>
+              </a:extLst>
+            </p:cNvPr>
+            <p:cNvCxnSpPr>
+              <a:cxnSpLocks/>
+            </p:cNvCxnSpPr>
+            <p:nvPr/>
+          </p:nvCxnSpPr>
+          <p:spPr>
+            <a:xfrm>
+              <a:off x="633452" y="8369541"/>
+              <a:ext cx="2512519" cy="0"/>
+            </a:xfrm>
+            <a:prstGeom prst="line">
+              <a:avLst/>
+            </a:prstGeom>
+            <a:ln>
+              <a:solidFill>
+                <a:schemeClr val="tx1"/>
+              </a:solidFill>
+            </a:ln>
+          </p:spPr>
+          <p:style>
+            <a:lnRef idx="1">
+              <a:schemeClr val="accent1"/>
+            </a:lnRef>
+            <a:fillRef idx="0">
+              <a:schemeClr val="accent1"/>
+            </a:fillRef>
+            <a:effectRef idx="0">
+              <a:schemeClr val="accent1"/>
+            </a:effectRef>
+            <a:fontRef idx="minor">
+              <a:schemeClr val="tx1"/>
+            </a:fontRef>
+          </p:style>
+        </p:cxnSp>
+      </p:grpSp>
+      <p:grpSp>
+        <p:nvGrpSpPr>
+          <p:cNvPr id="36" name="Group 35">
+            <a:extLst>
+              <a:ext uri="{FF2B5EF4-FFF2-40B4-BE49-F238E27FC236}">
+                <a16:creationId xmlns:a16="http://schemas.microsoft.com/office/drawing/2014/main" id="{76B5DBD1-EA6B-DC45-9E6F-B94D64AFDC88}"/>
+              </a:ext>
+            </a:extLst>
+          </p:cNvPr>
+          <p:cNvGrpSpPr/>
+          <p:nvPr/>
+        </p:nvGrpSpPr>
+        <p:grpSpPr>
+          <a:xfrm>
+            <a:off x="3463738" y="6031579"/>
+            <a:ext cx="2693900" cy="2633064"/>
+            <a:chOff x="633452" y="6031579"/>
+            <a:chExt cx="2693900" cy="2633064"/>
+          </a:xfrm>
+        </p:grpSpPr>
+        <p:sp>
+          <p:nvSpPr>
+            <p:cNvPr id="37" name="TextBox 36">
+              <a:extLst>
+                <a:ext uri="{FF2B5EF4-FFF2-40B4-BE49-F238E27FC236}">
+                  <a16:creationId xmlns:a16="http://schemas.microsoft.com/office/drawing/2014/main" id="{9A93FD9C-AAFD-164D-8728-848316432ED8}"/>
+                </a:ext>
+              </a:extLst>
+            </p:cNvPr>
+            <p:cNvSpPr txBox="1"/>
+            <p:nvPr/>
+          </p:nvSpPr>
+          <p:spPr>
+            <a:xfrm>
+              <a:off x="814834" y="6031579"/>
+              <a:ext cx="2512518" cy="276999"/>
+            </a:xfrm>
+            <a:prstGeom prst="rect">
+              <a:avLst/>
+            </a:prstGeom>
+            <a:noFill/>
+          </p:spPr>
+          <p:txBody>
+            <a:bodyPr wrap="square" rtlCol="0">
+              <a:spAutoFit/>
+            </a:bodyPr>
+            <a:lstStyle/>
+            <a:p>
+              <a:r>
+                <a:rPr lang="en-GB" sz="1200" dirty="0">
+                  <a:solidFill>
+                    <a:schemeClr val="bg1">
+                      <a:lumMod val="75000"/>
+                    </a:schemeClr>
+                  </a:solidFill>
+                </a:rPr>
+                <a:t>Example format for ClassName6</a:t>
+              </a:r>
+            </a:p>
+          </p:txBody>
+        </p:sp>
+        <p:cxnSp>
+          <p:nvCxnSpPr>
+            <p:cNvPr id="38" name="Straight Connector 37">
+              <a:extLst>
+                <a:ext uri="{FF2B5EF4-FFF2-40B4-BE49-F238E27FC236}">
+                  <a16:creationId xmlns:a16="http://schemas.microsoft.com/office/drawing/2014/main" id="{0FA30B22-142D-3046-BF3B-050A9C4419DE}"/>
+                </a:ext>
+              </a:extLst>
+            </p:cNvPr>
+            <p:cNvCxnSpPr>
+              <a:cxnSpLocks/>
+            </p:cNvCxnSpPr>
+            <p:nvPr/>
+          </p:nvCxnSpPr>
+          <p:spPr>
+            <a:xfrm>
+              <a:off x="633452" y="6308578"/>
+              <a:ext cx="2512519" cy="0"/>
+            </a:xfrm>
+            <a:prstGeom prst="line">
+              <a:avLst/>
+            </a:prstGeom>
+            <a:ln>
+              <a:solidFill>
+                <a:schemeClr val="tx1"/>
+              </a:solidFill>
+            </a:ln>
+          </p:spPr>
+          <p:style>
+            <a:lnRef idx="1">
+              <a:schemeClr val="accent1"/>
+            </a:lnRef>
+            <a:fillRef idx="0">
+              <a:schemeClr val="accent1"/>
+            </a:fillRef>
+            <a:effectRef idx="0">
+              <a:schemeClr val="accent1"/>
+            </a:effectRef>
+            <a:fontRef idx="minor">
+              <a:schemeClr val="tx1"/>
+            </a:fontRef>
+          </p:style>
+        </p:cxnSp>
+        <p:cxnSp>
+          <p:nvCxnSpPr>
+            <p:cNvPr id="39" name="Straight Connector 38">
+              <a:extLst>
+                <a:ext uri="{FF2B5EF4-FFF2-40B4-BE49-F238E27FC236}">
+                  <a16:creationId xmlns:a16="http://schemas.microsoft.com/office/drawing/2014/main" id="{3847CD7D-C50D-CC47-BE5B-915586FEBD56}"/>
+                </a:ext>
+              </a:extLst>
+            </p:cNvPr>
+            <p:cNvCxnSpPr>
+              <a:cxnSpLocks/>
+            </p:cNvCxnSpPr>
+            <p:nvPr/>
+          </p:nvCxnSpPr>
+          <p:spPr>
+            <a:xfrm>
+              <a:off x="633452" y="6603680"/>
+              <a:ext cx="2512519" cy="0"/>
+            </a:xfrm>
+            <a:prstGeom prst="line">
+              <a:avLst/>
+            </a:prstGeom>
+            <a:ln>
+              <a:solidFill>
+                <a:schemeClr val="tx1"/>
+              </a:solidFill>
+            </a:ln>
+          </p:spPr>
+          <p:style>
+            <a:lnRef idx="1">
+              <a:schemeClr val="accent1"/>
+            </a:lnRef>
+            <a:fillRef idx="0">
+              <a:schemeClr val="accent1"/>
+            </a:fillRef>
+            <a:effectRef idx="0">
+              <a:schemeClr val="accent1"/>
+            </a:effectRef>
+            <a:fontRef idx="minor">
+              <a:schemeClr val="tx1"/>
+            </a:fontRef>
+          </p:style>
+        </p:cxnSp>
+        <p:cxnSp>
+          <p:nvCxnSpPr>
+            <p:cNvPr id="40" name="Straight Connector 39">
+              <a:extLst>
+                <a:ext uri="{FF2B5EF4-FFF2-40B4-BE49-F238E27FC236}">
+                  <a16:creationId xmlns:a16="http://schemas.microsoft.com/office/drawing/2014/main" id="{E881B216-D9BD-A044-B5F7-970E699228D2}"/>
+                </a:ext>
+              </a:extLst>
+            </p:cNvPr>
+            <p:cNvCxnSpPr>
+              <a:cxnSpLocks/>
+            </p:cNvCxnSpPr>
+            <p:nvPr/>
+          </p:nvCxnSpPr>
+          <p:spPr>
+            <a:xfrm>
+              <a:off x="633452" y="6898782"/>
+              <a:ext cx="2512519" cy="0"/>
+            </a:xfrm>
+            <a:prstGeom prst="line">
+              <a:avLst/>
+            </a:prstGeom>
+            <a:ln>
+              <a:solidFill>
+                <a:schemeClr val="tx1"/>
+              </a:solidFill>
+            </a:ln>
+          </p:spPr>
+          <p:style>
+            <a:lnRef idx="1">
+              <a:schemeClr val="accent1"/>
+            </a:lnRef>
+            <a:fillRef idx="0">
+              <a:schemeClr val="accent1"/>
+            </a:fillRef>
+            <a:effectRef idx="0">
+              <a:schemeClr val="accent1"/>
+            </a:effectRef>
+            <a:fontRef idx="minor">
+              <a:schemeClr val="tx1"/>
+            </a:fontRef>
+          </p:style>
+        </p:cxnSp>
+        <p:cxnSp>
+          <p:nvCxnSpPr>
+            <p:cNvPr id="41" name="Straight Connector 40">
+              <a:extLst>
+                <a:ext uri="{FF2B5EF4-FFF2-40B4-BE49-F238E27FC236}">
+                  <a16:creationId xmlns:a16="http://schemas.microsoft.com/office/drawing/2014/main" id="{7168DF04-7B64-4D41-873A-71794E181CB9}"/>
+                </a:ext>
+              </a:extLst>
+            </p:cNvPr>
+            <p:cNvCxnSpPr>
+              <a:cxnSpLocks/>
+            </p:cNvCxnSpPr>
+            <p:nvPr/>
+          </p:nvCxnSpPr>
+          <p:spPr>
+            <a:xfrm>
+              <a:off x="633452" y="7488986"/>
+              <a:ext cx="2512519" cy="0"/>
+            </a:xfrm>
+            <a:prstGeom prst="line">
+              <a:avLst/>
+            </a:prstGeom>
+            <a:ln>
+              <a:solidFill>
+                <a:schemeClr val="tx1"/>
+              </a:solidFill>
+            </a:ln>
+          </p:spPr>
+          <p:style>
+            <a:lnRef idx="1">
+              <a:schemeClr val="accent1"/>
+            </a:lnRef>
+            <a:fillRef idx="0">
+              <a:schemeClr val="accent1"/>
+            </a:fillRef>
+            <a:effectRef idx="0">
+              <a:schemeClr val="accent1"/>
+            </a:effectRef>
+            <a:fontRef idx="minor">
+              <a:schemeClr val="tx1"/>
+            </a:fontRef>
+          </p:style>
+        </p:cxnSp>
+        <p:cxnSp>
+          <p:nvCxnSpPr>
+            <p:cNvPr id="42" name="Straight Connector 41">
+              <a:extLst>
+                <a:ext uri="{FF2B5EF4-FFF2-40B4-BE49-F238E27FC236}">
+                  <a16:creationId xmlns:a16="http://schemas.microsoft.com/office/drawing/2014/main" id="{7FA2A09B-998A-554B-AF1E-34E50FA02C44}"/>
+                </a:ext>
+              </a:extLst>
+            </p:cNvPr>
+            <p:cNvCxnSpPr>
+              <a:cxnSpLocks/>
+            </p:cNvCxnSpPr>
+            <p:nvPr/>
+          </p:nvCxnSpPr>
+          <p:spPr>
+            <a:xfrm>
+              <a:off x="633452" y="7193884"/>
+              <a:ext cx="2512519" cy="0"/>
+            </a:xfrm>
+            <a:prstGeom prst="line">
+              <a:avLst/>
+            </a:prstGeom>
+            <a:ln>
+              <a:solidFill>
+                <a:schemeClr val="tx1"/>
+              </a:solidFill>
+            </a:ln>
+          </p:spPr>
+          <p:style>
+            <a:lnRef idx="1">
+              <a:schemeClr val="accent1"/>
+            </a:lnRef>
+            <a:fillRef idx="0">
+              <a:schemeClr val="accent1"/>
+            </a:fillRef>
+            <a:effectRef idx="0">
+              <a:schemeClr val="accent1"/>
+            </a:effectRef>
+            <a:fontRef idx="minor">
+              <a:schemeClr val="tx1"/>
+            </a:fontRef>
+          </p:style>
+        </p:cxnSp>
+        <p:cxnSp>
+          <p:nvCxnSpPr>
+            <p:cNvPr id="43" name="Straight Connector 42">
+              <a:extLst>
+                <a:ext uri="{FF2B5EF4-FFF2-40B4-BE49-F238E27FC236}">
+                  <a16:creationId xmlns:a16="http://schemas.microsoft.com/office/drawing/2014/main" id="{E5161AAD-CE00-0241-B9C9-05031F5BA157}"/>
+                </a:ext>
+              </a:extLst>
+            </p:cNvPr>
+            <p:cNvCxnSpPr>
+              <a:cxnSpLocks/>
+            </p:cNvCxnSpPr>
+            <p:nvPr/>
+          </p:nvCxnSpPr>
+          <p:spPr>
+            <a:xfrm>
+              <a:off x="633452" y="7484235"/>
+              <a:ext cx="2512519" cy="0"/>
+            </a:xfrm>
+            <a:prstGeom prst="line">
+              <a:avLst/>
+            </a:prstGeom>
+            <a:ln>
+              <a:solidFill>
+                <a:schemeClr val="tx1"/>
+              </a:solidFill>
+            </a:ln>
+          </p:spPr>
+          <p:style>
+            <a:lnRef idx="1">
+              <a:schemeClr val="accent1"/>
+            </a:lnRef>
+            <a:fillRef idx="0">
+              <a:schemeClr val="accent1"/>
+            </a:fillRef>
+            <a:effectRef idx="0">
+              <a:schemeClr val="accent1"/>
+            </a:effectRef>
+            <a:fontRef idx="minor">
+              <a:schemeClr val="tx1"/>
+            </a:fontRef>
+          </p:style>
+        </p:cxnSp>
+        <p:cxnSp>
+          <p:nvCxnSpPr>
+            <p:cNvPr id="44" name="Straight Connector 43">
+              <a:extLst>
+                <a:ext uri="{FF2B5EF4-FFF2-40B4-BE49-F238E27FC236}">
+                  <a16:creationId xmlns:a16="http://schemas.microsoft.com/office/drawing/2014/main" id="{676DA71A-B432-E943-9287-669396F6DFCC}"/>
+                </a:ext>
+              </a:extLst>
+            </p:cNvPr>
+            <p:cNvCxnSpPr>
+              <a:cxnSpLocks/>
+            </p:cNvCxnSpPr>
+            <p:nvPr/>
+          </p:nvCxnSpPr>
+          <p:spPr>
+            <a:xfrm>
+              <a:off x="633452" y="7779337"/>
+              <a:ext cx="2512519" cy="0"/>
+            </a:xfrm>
+            <a:prstGeom prst="line">
+              <a:avLst/>
+            </a:prstGeom>
+            <a:ln>
+              <a:solidFill>
+                <a:schemeClr val="tx1"/>
+              </a:solidFill>
+            </a:ln>
+          </p:spPr>
+          <p:style>
+            <a:lnRef idx="1">
+              <a:schemeClr val="accent1"/>
+            </a:lnRef>
+            <a:fillRef idx="0">
+              <a:schemeClr val="accent1"/>
+            </a:fillRef>
+            <a:effectRef idx="0">
+              <a:schemeClr val="accent1"/>
+            </a:effectRef>
+            <a:fontRef idx="minor">
+              <a:schemeClr val="tx1"/>
+            </a:fontRef>
+          </p:style>
+        </p:cxnSp>
+        <p:cxnSp>
+          <p:nvCxnSpPr>
+            <p:cNvPr id="45" name="Straight Connector 44">
+              <a:extLst>
+                <a:ext uri="{FF2B5EF4-FFF2-40B4-BE49-F238E27FC236}">
+                  <a16:creationId xmlns:a16="http://schemas.microsoft.com/office/drawing/2014/main" id="{842976FB-C4BF-344B-A059-D165DC99DD04}"/>
+                </a:ext>
+              </a:extLst>
+            </p:cNvPr>
+            <p:cNvCxnSpPr>
+              <a:cxnSpLocks/>
+            </p:cNvCxnSpPr>
+            <p:nvPr/>
+          </p:nvCxnSpPr>
+          <p:spPr>
+            <a:xfrm>
+              <a:off x="633452" y="8074439"/>
+              <a:ext cx="2512519" cy="0"/>
+            </a:xfrm>
+            <a:prstGeom prst="line">
+              <a:avLst/>
+            </a:prstGeom>
+            <a:ln>
+              <a:solidFill>
+                <a:schemeClr val="tx1"/>
+              </a:solidFill>
+            </a:ln>
+          </p:spPr>
+          <p:style>
+            <a:lnRef idx="1">
+              <a:schemeClr val="accent1"/>
+            </a:lnRef>
+            <a:fillRef idx="0">
+              <a:schemeClr val="accent1"/>
+            </a:fillRef>
+            <a:effectRef idx="0">
+              <a:schemeClr val="accent1"/>
+            </a:effectRef>
+            <a:fontRef idx="minor">
+              <a:schemeClr val="tx1"/>
+            </a:fontRef>
+          </p:style>
+        </p:cxnSp>
+        <p:cxnSp>
+          <p:nvCxnSpPr>
+            <p:cNvPr id="46" name="Straight Connector 45">
+              <a:extLst>
+                <a:ext uri="{FF2B5EF4-FFF2-40B4-BE49-F238E27FC236}">
+                  <a16:creationId xmlns:a16="http://schemas.microsoft.com/office/drawing/2014/main" id="{F3B24B7E-4774-0346-9F68-4BA78F196BB9}"/>
+                </a:ext>
+              </a:extLst>
+            </p:cNvPr>
+            <p:cNvCxnSpPr>
+              <a:cxnSpLocks/>
+            </p:cNvCxnSpPr>
+            <p:nvPr/>
+          </p:nvCxnSpPr>
+          <p:spPr>
+            <a:xfrm>
+              <a:off x="633452" y="8664643"/>
+              <a:ext cx="2512519" cy="0"/>
+            </a:xfrm>
+            <a:prstGeom prst="line">
+              <a:avLst/>
+            </a:prstGeom>
+            <a:ln>
+              <a:solidFill>
+                <a:schemeClr val="tx1"/>
+              </a:solidFill>
+            </a:ln>
+          </p:spPr>
+          <p:style>
+            <a:lnRef idx="1">
+              <a:schemeClr val="accent1"/>
+            </a:lnRef>
+            <a:fillRef idx="0">
+              <a:schemeClr val="accent1"/>
+            </a:fillRef>
+            <a:effectRef idx="0">
+              <a:schemeClr val="accent1"/>
+            </a:effectRef>
+            <a:fontRef idx="minor">
+              <a:schemeClr val="tx1"/>
+            </a:fontRef>
+          </p:style>
+        </p:cxnSp>
+        <p:cxnSp>
+          <p:nvCxnSpPr>
+            <p:cNvPr id="47" name="Straight Connector 46">
+              <a:extLst>
+                <a:ext uri="{FF2B5EF4-FFF2-40B4-BE49-F238E27FC236}">
+                  <a16:creationId xmlns:a16="http://schemas.microsoft.com/office/drawing/2014/main" id="{64242C55-C3B2-5148-956F-13547E231F58}"/>
+                </a:ext>
+              </a:extLst>
+            </p:cNvPr>
+            <p:cNvCxnSpPr>
+              <a:cxnSpLocks/>
+            </p:cNvCxnSpPr>
+            <p:nvPr/>
+          </p:nvCxnSpPr>
+          <p:spPr>
+            <a:xfrm>
+              <a:off x="633452" y="8369541"/>
+              <a:ext cx="2512519" cy="0"/>
+            </a:xfrm>
+            <a:prstGeom prst="line">
+              <a:avLst/>
+            </a:prstGeom>
+            <a:ln>
+              <a:solidFill>
+                <a:schemeClr val="tx1"/>
+              </a:solidFill>
+            </a:ln>
+          </p:spPr>
+          <p:style>
+            <a:lnRef idx="1">
+              <a:schemeClr val="accent1"/>
+            </a:lnRef>
+            <a:fillRef idx="0">
+              <a:schemeClr val="accent1"/>
+            </a:fillRef>
+            <a:effectRef idx="0">
+              <a:schemeClr val="accent1"/>
+            </a:effectRef>
+            <a:fontRef idx="minor">
+              <a:schemeClr val="tx1"/>
+            </a:fontRef>
+          </p:style>
+        </p:cxnSp>
+      </p:grpSp>
     </p:spTree>
     <p:extLst>
       <p:ext uri="{BB962C8B-B14F-4D97-AF65-F5344CB8AC3E}">

</xml_diff>

<commit_message>
Add week 3 homework printout
Co-Authored-By: Llewellyn Falco <10874+isidore@users.noreply.github.com>
</commit_message>
<xml_diff>
--- a/Homework Printouts.pptx
+++ b/Homework Printouts.pptx
@@ -8021,7 +8021,7 @@
         </p:nvSpPr>
         <p:spPr>
           <a:xfrm>
-            <a:off x="922713" y="1576412"/>
+            <a:off x="922713" y="1805012"/>
             <a:ext cx="5128952" cy="369332"/>
           </a:xfrm>
           <a:prstGeom prst="rect">
@@ -8037,1889 +8037,11 @@
           <a:p>
             <a:r>
               <a:rPr lang="en-GB" dirty="0"/>
-              <a:t>Number of Functional Methods encountered:</a:t>
+              <a:t>Methods that are hard to test (ClassName::method)</a:t>
             </a:r>
           </a:p>
         </p:txBody>
       </p:sp>
-      <p:grpSp>
-        <p:nvGrpSpPr>
-          <p:cNvPr id="17" name="Group 16">
-            <a:extLst>
-              <a:ext uri="{FF2B5EF4-FFF2-40B4-BE49-F238E27FC236}">
-                <a16:creationId xmlns:a16="http://schemas.microsoft.com/office/drawing/2014/main" id="{6868F493-A251-A047-AA10-EC372C3837B5}"/>
-              </a:ext>
-            </a:extLst>
-          </p:cNvPr>
-          <p:cNvGrpSpPr/>
-          <p:nvPr/>
-        </p:nvGrpSpPr>
-        <p:grpSpPr>
-          <a:xfrm>
-            <a:off x="3467818" y="1954058"/>
-            <a:ext cx="393444" cy="294517"/>
-            <a:chOff x="5329845" y="1105593"/>
-            <a:chExt cx="721820" cy="540327"/>
-          </a:xfrm>
-        </p:grpSpPr>
-        <p:cxnSp>
-          <p:nvCxnSpPr>
-            <p:cNvPr id="18" name="Straight Connector 17">
-              <a:extLst>
-                <a:ext uri="{FF2B5EF4-FFF2-40B4-BE49-F238E27FC236}">
-                  <a16:creationId xmlns:a16="http://schemas.microsoft.com/office/drawing/2014/main" id="{DBDA8070-D9B4-E048-AA8B-CA13ACAFA1C4}"/>
-                </a:ext>
-              </a:extLst>
-            </p:cNvPr>
-            <p:cNvCxnSpPr>
-              <a:cxnSpLocks/>
-            </p:cNvCxnSpPr>
-            <p:nvPr/>
-          </p:nvCxnSpPr>
-          <p:spPr>
-            <a:xfrm>
-              <a:off x="5444836" y="1105593"/>
-              <a:ext cx="0" cy="540327"/>
-            </a:xfrm>
-            <a:prstGeom prst="line">
-              <a:avLst/>
-            </a:prstGeom>
-            <a:ln w="38100">
-              <a:solidFill>
-                <a:schemeClr val="bg1">
-                  <a:lumMod val="85000"/>
-                </a:schemeClr>
-              </a:solidFill>
-            </a:ln>
-          </p:spPr>
-          <p:style>
-            <a:lnRef idx="1">
-              <a:schemeClr val="accent1"/>
-            </a:lnRef>
-            <a:fillRef idx="0">
-              <a:schemeClr val="accent1"/>
-            </a:fillRef>
-            <a:effectRef idx="0">
-              <a:schemeClr val="accent1"/>
-            </a:effectRef>
-            <a:fontRef idx="minor">
-              <a:schemeClr val="tx1"/>
-            </a:fontRef>
-          </p:style>
-        </p:cxnSp>
-        <p:cxnSp>
-          <p:nvCxnSpPr>
-            <p:cNvPr id="19" name="Straight Connector 18">
-              <a:extLst>
-                <a:ext uri="{FF2B5EF4-FFF2-40B4-BE49-F238E27FC236}">
-                  <a16:creationId xmlns:a16="http://schemas.microsoft.com/office/drawing/2014/main" id="{35305E93-982F-5F45-9F56-CC47348A3DBC}"/>
-                </a:ext>
-              </a:extLst>
-            </p:cNvPr>
-            <p:cNvCxnSpPr>
-              <a:cxnSpLocks/>
-            </p:cNvCxnSpPr>
-            <p:nvPr/>
-          </p:nvCxnSpPr>
-          <p:spPr>
-            <a:xfrm>
-              <a:off x="5597236" y="1105593"/>
-              <a:ext cx="0" cy="540327"/>
-            </a:xfrm>
-            <a:prstGeom prst="line">
-              <a:avLst/>
-            </a:prstGeom>
-            <a:ln w="38100">
-              <a:solidFill>
-                <a:schemeClr val="bg1">
-                  <a:lumMod val="85000"/>
-                </a:schemeClr>
-              </a:solidFill>
-            </a:ln>
-          </p:spPr>
-          <p:style>
-            <a:lnRef idx="1">
-              <a:schemeClr val="accent1"/>
-            </a:lnRef>
-            <a:fillRef idx="0">
-              <a:schemeClr val="accent1"/>
-            </a:fillRef>
-            <a:effectRef idx="0">
-              <a:schemeClr val="accent1"/>
-            </a:effectRef>
-            <a:fontRef idx="minor">
-              <a:schemeClr val="tx1"/>
-            </a:fontRef>
-          </p:style>
-        </p:cxnSp>
-        <p:cxnSp>
-          <p:nvCxnSpPr>
-            <p:cNvPr id="20" name="Straight Connector 19">
-              <a:extLst>
-                <a:ext uri="{FF2B5EF4-FFF2-40B4-BE49-F238E27FC236}">
-                  <a16:creationId xmlns:a16="http://schemas.microsoft.com/office/drawing/2014/main" id="{72557377-C461-CB49-BB20-007BB1750E85}"/>
-                </a:ext>
-              </a:extLst>
-            </p:cNvPr>
-            <p:cNvCxnSpPr>
-              <a:cxnSpLocks/>
-            </p:cNvCxnSpPr>
-            <p:nvPr/>
-          </p:nvCxnSpPr>
-          <p:spPr>
-            <a:xfrm>
-              <a:off x="5749636" y="1105593"/>
-              <a:ext cx="0" cy="540327"/>
-            </a:xfrm>
-            <a:prstGeom prst="line">
-              <a:avLst/>
-            </a:prstGeom>
-            <a:ln w="38100">
-              <a:solidFill>
-                <a:schemeClr val="bg1">
-                  <a:lumMod val="85000"/>
-                </a:schemeClr>
-              </a:solidFill>
-            </a:ln>
-          </p:spPr>
-          <p:style>
-            <a:lnRef idx="1">
-              <a:schemeClr val="accent1"/>
-            </a:lnRef>
-            <a:fillRef idx="0">
-              <a:schemeClr val="accent1"/>
-            </a:fillRef>
-            <a:effectRef idx="0">
-              <a:schemeClr val="accent1"/>
-            </a:effectRef>
-            <a:fontRef idx="minor">
-              <a:schemeClr val="tx1"/>
-            </a:fontRef>
-          </p:style>
-        </p:cxnSp>
-        <p:cxnSp>
-          <p:nvCxnSpPr>
-            <p:cNvPr id="21" name="Straight Connector 20">
-              <a:extLst>
-                <a:ext uri="{FF2B5EF4-FFF2-40B4-BE49-F238E27FC236}">
-                  <a16:creationId xmlns:a16="http://schemas.microsoft.com/office/drawing/2014/main" id="{114BCB25-1283-084C-AD9C-FFF8254727C3}"/>
-                </a:ext>
-              </a:extLst>
-            </p:cNvPr>
-            <p:cNvCxnSpPr>
-              <a:cxnSpLocks/>
-            </p:cNvCxnSpPr>
-            <p:nvPr/>
-          </p:nvCxnSpPr>
-          <p:spPr>
-            <a:xfrm>
-              <a:off x="5902036" y="1105593"/>
-              <a:ext cx="0" cy="540327"/>
-            </a:xfrm>
-            <a:prstGeom prst="line">
-              <a:avLst/>
-            </a:prstGeom>
-            <a:ln w="38100">
-              <a:solidFill>
-                <a:schemeClr val="bg1">
-                  <a:lumMod val="85000"/>
-                </a:schemeClr>
-              </a:solidFill>
-            </a:ln>
-          </p:spPr>
-          <p:style>
-            <a:lnRef idx="1">
-              <a:schemeClr val="accent1"/>
-            </a:lnRef>
-            <a:fillRef idx="0">
-              <a:schemeClr val="accent1"/>
-            </a:fillRef>
-            <a:effectRef idx="0">
-              <a:schemeClr val="accent1"/>
-            </a:effectRef>
-            <a:fontRef idx="minor">
-              <a:schemeClr val="tx1"/>
-            </a:fontRef>
-          </p:style>
-        </p:cxnSp>
-        <p:cxnSp>
-          <p:nvCxnSpPr>
-            <p:cNvPr id="22" name="Straight Connector 21">
-              <a:extLst>
-                <a:ext uri="{FF2B5EF4-FFF2-40B4-BE49-F238E27FC236}">
-                  <a16:creationId xmlns:a16="http://schemas.microsoft.com/office/drawing/2014/main" id="{EDD9BE14-B2DE-E440-BE3E-7AADB7069B97}"/>
-                </a:ext>
-              </a:extLst>
-            </p:cNvPr>
-            <p:cNvCxnSpPr>
-              <a:cxnSpLocks/>
-            </p:cNvCxnSpPr>
-            <p:nvPr/>
-          </p:nvCxnSpPr>
-          <p:spPr>
-            <a:xfrm flipH="1">
-              <a:off x="5329845" y="1215444"/>
-              <a:ext cx="721820" cy="430476"/>
-            </a:xfrm>
-            <a:prstGeom prst="line">
-              <a:avLst/>
-            </a:prstGeom>
-            <a:ln w="38100">
-              <a:solidFill>
-                <a:schemeClr val="bg1">
-                  <a:lumMod val="85000"/>
-                </a:schemeClr>
-              </a:solidFill>
-            </a:ln>
-          </p:spPr>
-          <p:style>
-            <a:lnRef idx="1">
-              <a:schemeClr val="accent1"/>
-            </a:lnRef>
-            <a:fillRef idx="0">
-              <a:schemeClr val="accent1"/>
-            </a:fillRef>
-            <a:effectRef idx="0">
-              <a:schemeClr val="accent1"/>
-            </a:effectRef>
-            <a:fontRef idx="minor">
-              <a:schemeClr val="tx1"/>
-            </a:fontRef>
-          </p:style>
-        </p:cxnSp>
-      </p:grpSp>
-      <p:grpSp>
-        <p:nvGrpSpPr>
-          <p:cNvPr id="23" name="Group 22">
-            <a:extLst>
-              <a:ext uri="{FF2B5EF4-FFF2-40B4-BE49-F238E27FC236}">
-                <a16:creationId xmlns:a16="http://schemas.microsoft.com/office/drawing/2014/main" id="{4CC521EA-71A6-8F40-8043-47FF28DF9197}"/>
-              </a:ext>
-            </a:extLst>
-          </p:cNvPr>
-          <p:cNvGrpSpPr/>
-          <p:nvPr/>
-        </p:nvGrpSpPr>
-        <p:grpSpPr>
-          <a:xfrm>
-            <a:off x="3958269" y="1954058"/>
-            <a:ext cx="393444" cy="294517"/>
-            <a:chOff x="5329845" y="1105593"/>
-            <a:chExt cx="721820" cy="540327"/>
-          </a:xfrm>
-        </p:grpSpPr>
-        <p:cxnSp>
-          <p:nvCxnSpPr>
-            <p:cNvPr id="24" name="Straight Connector 23">
-              <a:extLst>
-                <a:ext uri="{FF2B5EF4-FFF2-40B4-BE49-F238E27FC236}">
-                  <a16:creationId xmlns:a16="http://schemas.microsoft.com/office/drawing/2014/main" id="{CD78E301-6094-8D4A-BC78-27254D6C212E}"/>
-                </a:ext>
-              </a:extLst>
-            </p:cNvPr>
-            <p:cNvCxnSpPr>
-              <a:cxnSpLocks/>
-            </p:cNvCxnSpPr>
-            <p:nvPr/>
-          </p:nvCxnSpPr>
-          <p:spPr>
-            <a:xfrm>
-              <a:off x="5444836" y="1105593"/>
-              <a:ext cx="0" cy="540327"/>
-            </a:xfrm>
-            <a:prstGeom prst="line">
-              <a:avLst/>
-            </a:prstGeom>
-            <a:ln w="38100">
-              <a:solidFill>
-                <a:schemeClr val="bg1">
-                  <a:lumMod val="85000"/>
-                </a:schemeClr>
-              </a:solidFill>
-            </a:ln>
-          </p:spPr>
-          <p:style>
-            <a:lnRef idx="1">
-              <a:schemeClr val="accent1"/>
-            </a:lnRef>
-            <a:fillRef idx="0">
-              <a:schemeClr val="accent1"/>
-            </a:fillRef>
-            <a:effectRef idx="0">
-              <a:schemeClr val="accent1"/>
-            </a:effectRef>
-            <a:fontRef idx="minor">
-              <a:schemeClr val="tx1"/>
-            </a:fontRef>
-          </p:style>
-        </p:cxnSp>
-        <p:cxnSp>
-          <p:nvCxnSpPr>
-            <p:cNvPr id="25" name="Straight Connector 24">
-              <a:extLst>
-                <a:ext uri="{FF2B5EF4-FFF2-40B4-BE49-F238E27FC236}">
-                  <a16:creationId xmlns:a16="http://schemas.microsoft.com/office/drawing/2014/main" id="{987664D1-3661-7048-B906-3145AD40CA3C}"/>
-                </a:ext>
-              </a:extLst>
-            </p:cNvPr>
-            <p:cNvCxnSpPr>
-              <a:cxnSpLocks/>
-            </p:cNvCxnSpPr>
-            <p:nvPr/>
-          </p:nvCxnSpPr>
-          <p:spPr>
-            <a:xfrm>
-              <a:off x="5597236" y="1105593"/>
-              <a:ext cx="0" cy="540327"/>
-            </a:xfrm>
-            <a:prstGeom prst="line">
-              <a:avLst/>
-            </a:prstGeom>
-            <a:ln w="38100">
-              <a:solidFill>
-                <a:schemeClr val="bg1">
-                  <a:lumMod val="85000"/>
-                </a:schemeClr>
-              </a:solidFill>
-            </a:ln>
-          </p:spPr>
-          <p:style>
-            <a:lnRef idx="1">
-              <a:schemeClr val="accent1"/>
-            </a:lnRef>
-            <a:fillRef idx="0">
-              <a:schemeClr val="accent1"/>
-            </a:fillRef>
-            <a:effectRef idx="0">
-              <a:schemeClr val="accent1"/>
-            </a:effectRef>
-            <a:fontRef idx="minor">
-              <a:schemeClr val="tx1"/>
-            </a:fontRef>
-          </p:style>
-        </p:cxnSp>
-        <p:cxnSp>
-          <p:nvCxnSpPr>
-            <p:cNvPr id="26" name="Straight Connector 25">
-              <a:extLst>
-                <a:ext uri="{FF2B5EF4-FFF2-40B4-BE49-F238E27FC236}">
-                  <a16:creationId xmlns:a16="http://schemas.microsoft.com/office/drawing/2014/main" id="{D12121E8-3CEF-FF49-8329-EE1C4D621618}"/>
-                </a:ext>
-              </a:extLst>
-            </p:cNvPr>
-            <p:cNvCxnSpPr>
-              <a:cxnSpLocks/>
-            </p:cNvCxnSpPr>
-            <p:nvPr/>
-          </p:nvCxnSpPr>
-          <p:spPr>
-            <a:xfrm>
-              <a:off x="5749636" y="1105593"/>
-              <a:ext cx="0" cy="540327"/>
-            </a:xfrm>
-            <a:prstGeom prst="line">
-              <a:avLst/>
-            </a:prstGeom>
-            <a:ln w="38100">
-              <a:solidFill>
-                <a:schemeClr val="bg1">
-                  <a:lumMod val="85000"/>
-                </a:schemeClr>
-              </a:solidFill>
-            </a:ln>
-          </p:spPr>
-          <p:style>
-            <a:lnRef idx="1">
-              <a:schemeClr val="accent1"/>
-            </a:lnRef>
-            <a:fillRef idx="0">
-              <a:schemeClr val="accent1"/>
-            </a:fillRef>
-            <a:effectRef idx="0">
-              <a:schemeClr val="accent1"/>
-            </a:effectRef>
-            <a:fontRef idx="minor">
-              <a:schemeClr val="tx1"/>
-            </a:fontRef>
-          </p:style>
-        </p:cxnSp>
-        <p:cxnSp>
-          <p:nvCxnSpPr>
-            <p:cNvPr id="27" name="Straight Connector 26">
-              <a:extLst>
-                <a:ext uri="{FF2B5EF4-FFF2-40B4-BE49-F238E27FC236}">
-                  <a16:creationId xmlns:a16="http://schemas.microsoft.com/office/drawing/2014/main" id="{DDB3E467-B28B-2B43-8DA5-BE09C5474942}"/>
-                </a:ext>
-              </a:extLst>
-            </p:cNvPr>
-            <p:cNvCxnSpPr>
-              <a:cxnSpLocks/>
-            </p:cNvCxnSpPr>
-            <p:nvPr/>
-          </p:nvCxnSpPr>
-          <p:spPr>
-            <a:xfrm>
-              <a:off x="5902036" y="1105593"/>
-              <a:ext cx="0" cy="540327"/>
-            </a:xfrm>
-            <a:prstGeom prst="line">
-              <a:avLst/>
-            </a:prstGeom>
-            <a:ln w="38100">
-              <a:solidFill>
-                <a:schemeClr val="bg1">
-                  <a:lumMod val="85000"/>
-                </a:schemeClr>
-              </a:solidFill>
-            </a:ln>
-          </p:spPr>
-          <p:style>
-            <a:lnRef idx="1">
-              <a:schemeClr val="accent1"/>
-            </a:lnRef>
-            <a:fillRef idx="0">
-              <a:schemeClr val="accent1"/>
-            </a:fillRef>
-            <a:effectRef idx="0">
-              <a:schemeClr val="accent1"/>
-            </a:effectRef>
-            <a:fontRef idx="minor">
-              <a:schemeClr val="tx1"/>
-            </a:fontRef>
-          </p:style>
-        </p:cxnSp>
-        <p:cxnSp>
-          <p:nvCxnSpPr>
-            <p:cNvPr id="28" name="Straight Connector 27">
-              <a:extLst>
-                <a:ext uri="{FF2B5EF4-FFF2-40B4-BE49-F238E27FC236}">
-                  <a16:creationId xmlns:a16="http://schemas.microsoft.com/office/drawing/2014/main" id="{0D6BC0D0-E1E4-1343-A9EC-4EE3C65E7853}"/>
-                </a:ext>
-              </a:extLst>
-            </p:cNvPr>
-            <p:cNvCxnSpPr>
-              <a:cxnSpLocks/>
-            </p:cNvCxnSpPr>
-            <p:nvPr/>
-          </p:nvCxnSpPr>
-          <p:spPr>
-            <a:xfrm flipH="1">
-              <a:off x="5329845" y="1215444"/>
-              <a:ext cx="721820" cy="430476"/>
-            </a:xfrm>
-            <a:prstGeom prst="line">
-              <a:avLst/>
-            </a:prstGeom>
-            <a:ln w="38100">
-              <a:solidFill>
-                <a:schemeClr val="bg1">
-                  <a:lumMod val="85000"/>
-                </a:schemeClr>
-              </a:solidFill>
-            </a:ln>
-          </p:spPr>
-          <p:style>
-            <a:lnRef idx="1">
-              <a:schemeClr val="accent1"/>
-            </a:lnRef>
-            <a:fillRef idx="0">
-              <a:schemeClr val="accent1"/>
-            </a:fillRef>
-            <a:effectRef idx="0">
-              <a:schemeClr val="accent1"/>
-            </a:effectRef>
-            <a:fontRef idx="minor">
-              <a:schemeClr val="tx1"/>
-            </a:fontRef>
-          </p:style>
-        </p:cxnSp>
-      </p:grpSp>
-      <p:grpSp>
-        <p:nvGrpSpPr>
-          <p:cNvPr id="29" name="Group 28">
-            <a:extLst>
-              <a:ext uri="{FF2B5EF4-FFF2-40B4-BE49-F238E27FC236}">
-                <a16:creationId xmlns:a16="http://schemas.microsoft.com/office/drawing/2014/main" id="{EAE621B9-E8EA-8944-8C8F-15524C0DDC66}"/>
-              </a:ext>
-            </a:extLst>
-          </p:cNvPr>
-          <p:cNvGrpSpPr/>
-          <p:nvPr/>
-        </p:nvGrpSpPr>
-        <p:grpSpPr>
-          <a:xfrm>
-            <a:off x="4448720" y="1954058"/>
-            <a:ext cx="393444" cy="294517"/>
-            <a:chOff x="5329845" y="1105593"/>
-            <a:chExt cx="721820" cy="540327"/>
-          </a:xfrm>
-        </p:grpSpPr>
-        <p:cxnSp>
-          <p:nvCxnSpPr>
-            <p:cNvPr id="30" name="Straight Connector 29">
-              <a:extLst>
-                <a:ext uri="{FF2B5EF4-FFF2-40B4-BE49-F238E27FC236}">
-                  <a16:creationId xmlns:a16="http://schemas.microsoft.com/office/drawing/2014/main" id="{E25EAAF7-B475-364B-9863-5836F41BEDE1}"/>
-                </a:ext>
-              </a:extLst>
-            </p:cNvPr>
-            <p:cNvCxnSpPr>
-              <a:cxnSpLocks/>
-            </p:cNvCxnSpPr>
-            <p:nvPr/>
-          </p:nvCxnSpPr>
-          <p:spPr>
-            <a:xfrm>
-              <a:off x="5444836" y="1105593"/>
-              <a:ext cx="0" cy="540327"/>
-            </a:xfrm>
-            <a:prstGeom prst="line">
-              <a:avLst/>
-            </a:prstGeom>
-            <a:ln w="38100">
-              <a:solidFill>
-                <a:schemeClr val="bg1">
-                  <a:lumMod val="85000"/>
-                </a:schemeClr>
-              </a:solidFill>
-            </a:ln>
-          </p:spPr>
-          <p:style>
-            <a:lnRef idx="1">
-              <a:schemeClr val="accent1"/>
-            </a:lnRef>
-            <a:fillRef idx="0">
-              <a:schemeClr val="accent1"/>
-            </a:fillRef>
-            <a:effectRef idx="0">
-              <a:schemeClr val="accent1"/>
-            </a:effectRef>
-            <a:fontRef idx="minor">
-              <a:schemeClr val="tx1"/>
-            </a:fontRef>
-          </p:style>
-        </p:cxnSp>
-        <p:cxnSp>
-          <p:nvCxnSpPr>
-            <p:cNvPr id="31" name="Straight Connector 30">
-              <a:extLst>
-                <a:ext uri="{FF2B5EF4-FFF2-40B4-BE49-F238E27FC236}">
-                  <a16:creationId xmlns:a16="http://schemas.microsoft.com/office/drawing/2014/main" id="{12C1F0F0-CE07-824C-BAC9-7FD598005657}"/>
-                </a:ext>
-              </a:extLst>
-            </p:cNvPr>
-            <p:cNvCxnSpPr>
-              <a:cxnSpLocks/>
-            </p:cNvCxnSpPr>
-            <p:nvPr/>
-          </p:nvCxnSpPr>
-          <p:spPr>
-            <a:xfrm>
-              <a:off x="5597236" y="1105593"/>
-              <a:ext cx="0" cy="540327"/>
-            </a:xfrm>
-            <a:prstGeom prst="line">
-              <a:avLst/>
-            </a:prstGeom>
-            <a:ln w="38100">
-              <a:solidFill>
-                <a:schemeClr val="bg1">
-                  <a:lumMod val="85000"/>
-                </a:schemeClr>
-              </a:solidFill>
-            </a:ln>
-          </p:spPr>
-          <p:style>
-            <a:lnRef idx="1">
-              <a:schemeClr val="accent1"/>
-            </a:lnRef>
-            <a:fillRef idx="0">
-              <a:schemeClr val="accent1"/>
-            </a:fillRef>
-            <a:effectRef idx="0">
-              <a:schemeClr val="accent1"/>
-            </a:effectRef>
-            <a:fontRef idx="minor">
-              <a:schemeClr val="tx1"/>
-            </a:fontRef>
-          </p:style>
-        </p:cxnSp>
-        <p:cxnSp>
-          <p:nvCxnSpPr>
-            <p:cNvPr id="32" name="Straight Connector 31">
-              <a:extLst>
-                <a:ext uri="{FF2B5EF4-FFF2-40B4-BE49-F238E27FC236}">
-                  <a16:creationId xmlns:a16="http://schemas.microsoft.com/office/drawing/2014/main" id="{0ABC59D3-C6B9-274A-8202-E451A069335D}"/>
-                </a:ext>
-              </a:extLst>
-            </p:cNvPr>
-            <p:cNvCxnSpPr>
-              <a:cxnSpLocks/>
-            </p:cNvCxnSpPr>
-            <p:nvPr/>
-          </p:nvCxnSpPr>
-          <p:spPr>
-            <a:xfrm>
-              <a:off x="5749636" y="1105593"/>
-              <a:ext cx="0" cy="540327"/>
-            </a:xfrm>
-            <a:prstGeom prst="line">
-              <a:avLst/>
-            </a:prstGeom>
-            <a:ln w="38100">
-              <a:solidFill>
-                <a:schemeClr val="bg1">
-                  <a:lumMod val="85000"/>
-                </a:schemeClr>
-              </a:solidFill>
-            </a:ln>
-          </p:spPr>
-          <p:style>
-            <a:lnRef idx="1">
-              <a:schemeClr val="accent1"/>
-            </a:lnRef>
-            <a:fillRef idx="0">
-              <a:schemeClr val="accent1"/>
-            </a:fillRef>
-            <a:effectRef idx="0">
-              <a:schemeClr val="accent1"/>
-            </a:effectRef>
-            <a:fontRef idx="minor">
-              <a:schemeClr val="tx1"/>
-            </a:fontRef>
-          </p:style>
-        </p:cxnSp>
-        <p:cxnSp>
-          <p:nvCxnSpPr>
-            <p:cNvPr id="33" name="Straight Connector 32">
-              <a:extLst>
-                <a:ext uri="{FF2B5EF4-FFF2-40B4-BE49-F238E27FC236}">
-                  <a16:creationId xmlns:a16="http://schemas.microsoft.com/office/drawing/2014/main" id="{3FC639E3-D558-6D47-9BAA-0A10CAD9C942}"/>
-                </a:ext>
-              </a:extLst>
-            </p:cNvPr>
-            <p:cNvCxnSpPr>
-              <a:cxnSpLocks/>
-            </p:cNvCxnSpPr>
-            <p:nvPr/>
-          </p:nvCxnSpPr>
-          <p:spPr>
-            <a:xfrm>
-              <a:off x="5902036" y="1105593"/>
-              <a:ext cx="0" cy="540327"/>
-            </a:xfrm>
-            <a:prstGeom prst="line">
-              <a:avLst/>
-            </a:prstGeom>
-            <a:ln w="38100">
-              <a:solidFill>
-                <a:schemeClr val="bg1">
-                  <a:lumMod val="85000"/>
-                </a:schemeClr>
-              </a:solidFill>
-            </a:ln>
-          </p:spPr>
-          <p:style>
-            <a:lnRef idx="1">
-              <a:schemeClr val="accent1"/>
-            </a:lnRef>
-            <a:fillRef idx="0">
-              <a:schemeClr val="accent1"/>
-            </a:fillRef>
-            <a:effectRef idx="0">
-              <a:schemeClr val="accent1"/>
-            </a:effectRef>
-            <a:fontRef idx="minor">
-              <a:schemeClr val="tx1"/>
-            </a:fontRef>
-          </p:style>
-        </p:cxnSp>
-        <p:cxnSp>
-          <p:nvCxnSpPr>
-            <p:cNvPr id="34" name="Straight Connector 33">
-              <a:extLst>
-                <a:ext uri="{FF2B5EF4-FFF2-40B4-BE49-F238E27FC236}">
-                  <a16:creationId xmlns:a16="http://schemas.microsoft.com/office/drawing/2014/main" id="{E8120A74-50B3-9241-B7AF-F9955A926344}"/>
-                </a:ext>
-              </a:extLst>
-            </p:cNvPr>
-            <p:cNvCxnSpPr>
-              <a:cxnSpLocks/>
-            </p:cNvCxnSpPr>
-            <p:nvPr/>
-          </p:nvCxnSpPr>
-          <p:spPr>
-            <a:xfrm flipH="1">
-              <a:off x="5329845" y="1215444"/>
-              <a:ext cx="721820" cy="430476"/>
-            </a:xfrm>
-            <a:prstGeom prst="line">
-              <a:avLst/>
-            </a:prstGeom>
-            <a:ln w="38100">
-              <a:solidFill>
-                <a:schemeClr val="bg1">
-                  <a:lumMod val="85000"/>
-                </a:schemeClr>
-              </a:solidFill>
-            </a:ln>
-          </p:spPr>
-          <p:style>
-            <a:lnRef idx="1">
-              <a:schemeClr val="accent1"/>
-            </a:lnRef>
-            <a:fillRef idx="0">
-              <a:schemeClr val="accent1"/>
-            </a:fillRef>
-            <a:effectRef idx="0">
-              <a:schemeClr val="accent1"/>
-            </a:effectRef>
-            <a:fontRef idx="minor">
-              <a:schemeClr val="tx1"/>
-            </a:fontRef>
-          </p:style>
-        </p:cxnSp>
-      </p:grpSp>
-      <p:grpSp>
-        <p:nvGrpSpPr>
-          <p:cNvPr id="35" name="Group 34">
-            <a:extLst>
-              <a:ext uri="{FF2B5EF4-FFF2-40B4-BE49-F238E27FC236}">
-                <a16:creationId xmlns:a16="http://schemas.microsoft.com/office/drawing/2014/main" id="{D4E7553B-170F-2B4B-9F22-C844717587A1}"/>
-              </a:ext>
-            </a:extLst>
-          </p:cNvPr>
-          <p:cNvGrpSpPr/>
-          <p:nvPr/>
-        </p:nvGrpSpPr>
-        <p:grpSpPr>
-          <a:xfrm>
-            <a:off x="2486916" y="1954058"/>
-            <a:ext cx="393444" cy="294517"/>
-            <a:chOff x="5329845" y="1105593"/>
-            <a:chExt cx="721820" cy="540327"/>
-          </a:xfrm>
-        </p:grpSpPr>
-        <p:cxnSp>
-          <p:nvCxnSpPr>
-            <p:cNvPr id="36" name="Straight Connector 35">
-              <a:extLst>
-                <a:ext uri="{FF2B5EF4-FFF2-40B4-BE49-F238E27FC236}">
-                  <a16:creationId xmlns:a16="http://schemas.microsoft.com/office/drawing/2014/main" id="{1966B55D-0688-A54C-A088-F2D388463AD3}"/>
-                </a:ext>
-              </a:extLst>
-            </p:cNvPr>
-            <p:cNvCxnSpPr>
-              <a:cxnSpLocks/>
-            </p:cNvCxnSpPr>
-            <p:nvPr/>
-          </p:nvCxnSpPr>
-          <p:spPr>
-            <a:xfrm>
-              <a:off x="5444836" y="1105593"/>
-              <a:ext cx="0" cy="540327"/>
-            </a:xfrm>
-            <a:prstGeom prst="line">
-              <a:avLst/>
-            </a:prstGeom>
-            <a:ln w="38100">
-              <a:solidFill>
-                <a:schemeClr val="bg1">
-                  <a:lumMod val="85000"/>
-                </a:schemeClr>
-              </a:solidFill>
-            </a:ln>
-          </p:spPr>
-          <p:style>
-            <a:lnRef idx="1">
-              <a:schemeClr val="accent1"/>
-            </a:lnRef>
-            <a:fillRef idx="0">
-              <a:schemeClr val="accent1"/>
-            </a:fillRef>
-            <a:effectRef idx="0">
-              <a:schemeClr val="accent1"/>
-            </a:effectRef>
-            <a:fontRef idx="minor">
-              <a:schemeClr val="tx1"/>
-            </a:fontRef>
-          </p:style>
-        </p:cxnSp>
-        <p:cxnSp>
-          <p:nvCxnSpPr>
-            <p:cNvPr id="37" name="Straight Connector 36">
-              <a:extLst>
-                <a:ext uri="{FF2B5EF4-FFF2-40B4-BE49-F238E27FC236}">
-                  <a16:creationId xmlns:a16="http://schemas.microsoft.com/office/drawing/2014/main" id="{A97F75CA-B18B-A04D-B4C5-63F98D22CE06}"/>
-                </a:ext>
-              </a:extLst>
-            </p:cNvPr>
-            <p:cNvCxnSpPr>
-              <a:cxnSpLocks/>
-            </p:cNvCxnSpPr>
-            <p:nvPr/>
-          </p:nvCxnSpPr>
-          <p:spPr>
-            <a:xfrm>
-              <a:off x="5597236" y="1105593"/>
-              <a:ext cx="0" cy="540327"/>
-            </a:xfrm>
-            <a:prstGeom prst="line">
-              <a:avLst/>
-            </a:prstGeom>
-            <a:ln w="38100">
-              <a:solidFill>
-                <a:schemeClr val="bg1">
-                  <a:lumMod val="85000"/>
-                </a:schemeClr>
-              </a:solidFill>
-            </a:ln>
-          </p:spPr>
-          <p:style>
-            <a:lnRef idx="1">
-              <a:schemeClr val="accent1"/>
-            </a:lnRef>
-            <a:fillRef idx="0">
-              <a:schemeClr val="accent1"/>
-            </a:fillRef>
-            <a:effectRef idx="0">
-              <a:schemeClr val="accent1"/>
-            </a:effectRef>
-            <a:fontRef idx="minor">
-              <a:schemeClr val="tx1"/>
-            </a:fontRef>
-          </p:style>
-        </p:cxnSp>
-        <p:cxnSp>
-          <p:nvCxnSpPr>
-            <p:cNvPr id="38" name="Straight Connector 37">
-              <a:extLst>
-                <a:ext uri="{FF2B5EF4-FFF2-40B4-BE49-F238E27FC236}">
-                  <a16:creationId xmlns:a16="http://schemas.microsoft.com/office/drawing/2014/main" id="{D278EB9C-8B99-924D-8C00-A001E5B7C4B7}"/>
-                </a:ext>
-              </a:extLst>
-            </p:cNvPr>
-            <p:cNvCxnSpPr>
-              <a:cxnSpLocks/>
-            </p:cNvCxnSpPr>
-            <p:nvPr/>
-          </p:nvCxnSpPr>
-          <p:spPr>
-            <a:xfrm>
-              <a:off x="5749636" y="1105593"/>
-              <a:ext cx="0" cy="540327"/>
-            </a:xfrm>
-            <a:prstGeom prst="line">
-              <a:avLst/>
-            </a:prstGeom>
-            <a:ln w="38100">
-              <a:solidFill>
-                <a:schemeClr val="bg1">
-                  <a:lumMod val="85000"/>
-                </a:schemeClr>
-              </a:solidFill>
-            </a:ln>
-          </p:spPr>
-          <p:style>
-            <a:lnRef idx="1">
-              <a:schemeClr val="accent1"/>
-            </a:lnRef>
-            <a:fillRef idx="0">
-              <a:schemeClr val="accent1"/>
-            </a:fillRef>
-            <a:effectRef idx="0">
-              <a:schemeClr val="accent1"/>
-            </a:effectRef>
-            <a:fontRef idx="minor">
-              <a:schemeClr val="tx1"/>
-            </a:fontRef>
-          </p:style>
-        </p:cxnSp>
-        <p:cxnSp>
-          <p:nvCxnSpPr>
-            <p:cNvPr id="39" name="Straight Connector 38">
-              <a:extLst>
-                <a:ext uri="{FF2B5EF4-FFF2-40B4-BE49-F238E27FC236}">
-                  <a16:creationId xmlns:a16="http://schemas.microsoft.com/office/drawing/2014/main" id="{570FA124-D3C1-2148-8627-BE07B797831F}"/>
-                </a:ext>
-              </a:extLst>
-            </p:cNvPr>
-            <p:cNvCxnSpPr>
-              <a:cxnSpLocks/>
-            </p:cNvCxnSpPr>
-            <p:nvPr/>
-          </p:nvCxnSpPr>
-          <p:spPr>
-            <a:xfrm>
-              <a:off x="5902036" y="1105593"/>
-              <a:ext cx="0" cy="540327"/>
-            </a:xfrm>
-            <a:prstGeom prst="line">
-              <a:avLst/>
-            </a:prstGeom>
-            <a:ln w="38100">
-              <a:solidFill>
-                <a:schemeClr val="bg1">
-                  <a:lumMod val="85000"/>
-                </a:schemeClr>
-              </a:solidFill>
-            </a:ln>
-          </p:spPr>
-          <p:style>
-            <a:lnRef idx="1">
-              <a:schemeClr val="accent1"/>
-            </a:lnRef>
-            <a:fillRef idx="0">
-              <a:schemeClr val="accent1"/>
-            </a:fillRef>
-            <a:effectRef idx="0">
-              <a:schemeClr val="accent1"/>
-            </a:effectRef>
-            <a:fontRef idx="minor">
-              <a:schemeClr val="tx1"/>
-            </a:fontRef>
-          </p:style>
-        </p:cxnSp>
-        <p:cxnSp>
-          <p:nvCxnSpPr>
-            <p:cNvPr id="40" name="Straight Connector 39">
-              <a:extLst>
-                <a:ext uri="{FF2B5EF4-FFF2-40B4-BE49-F238E27FC236}">
-                  <a16:creationId xmlns:a16="http://schemas.microsoft.com/office/drawing/2014/main" id="{B9AE5658-184F-174E-AA6F-913073B415DC}"/>
-                </a:ext>
-              </a:extLst>
-            </p:cNvPr>
-            <p:cNvCxnSpPr>
-              <a:cxnSpLocks/>
-            </p:cNvCxnSpPr>
-            <p:nvPr/>
-          </p:nvCxnSpPr>
-          <p:spPr>
-            <a:xfrm flipH="1">
-              <a:off x="5329845" y="1215444"/>
-              <a:ext cx="721820" cy="430476"/>
-            </a:xfrm>
-            <a:prstGeom prst="line">
-              <a:avLst/>
-            </a:prstGeom>
-            <a:ln w="38100">
-              <a:solidFill>
-                <a:schemeClr val="bg1">
-                  <a:lumMod val="85000"/>
-                </a:schemeClr>
-              </a:solidFill>
-            </a:ln>
-          </p:spPr>
-          <p:style>
-            <a:lnRef idx="1">
-              <a:schemeClr val="accent1"/>
-            </a:lnRef>
-            <a:fillRef idx="0">
-              <a:schemeClr val="accent1"/>
-            </a:fillRef>
-            <a:effectRef idx="0">
-              <a:schemeClr val="accent1"/>
-            </a:effectRef>
-            <a:fontRef idx="minor">
-              <a:schemeClr val="tx1"/>
-            </a:fontRef>
-          </p:style>
-        </p:cxnSp>
-      </p:grpSp>
-      <p:grpSp>
-        <p:nvGrpSpPr>
-          <p:cNvPr id="41" name="Group 40">
-            <a:extLst>
-              <a:ext uri="{FF2B5EF4-FFF2-40B4-BE49-F238E27FC236}">
-                <a16:creationId xmlns:a16="http://schemas.microsoft.com/office/drawing/2014/main" id="{1E486C72-765A-474A-A60F-B2164320C48C}"/>
-              </a:ext>
-            </a:extLst>
-          </p:cNvPr>
-          <p:cNvGrpSpPr/>
-          <p:nvPr/>
-        </p:nvGrpSpPr>
-        <p:grpSpPr>
-          <a:xfrm>
-            <a:off x="1996465" y="1954058"/>
-            <a:ext cx="393444" cy="294517"/>
-            <a:chOff x="5329845" y="1105593"/>
-            <a:chExt cx="721820" cy="540327"/>
-          </a:xfrm>
-        </p:grpSpPr>
-        <p:cxnSp>
-          <p:nvCxnSpPr>
-            <p:cNvPr id="42" name="Straight Connector 41">
-              <a:extLst>
-                <a:ext uri="{FF2B5EF4-FFF2-40B4-BE49-F238E27FC236}">
-                  <a16:creationId xmlns:a16="http://schemas.microsoft.com/office/drawing/2014/main" id="{55575231-B25E-0845-89A3-968378D45358}"/>
-                </a:ext>
-              </a:extLst>
-            </p:cNvPr>
-            <p:cNvCxnSpPr>
-              <a:cxnSpLocks/>
-            </p:cNvCxnSpPr>
-            <p:nvPr/>
-          </p:nvCxnSpPr>
-          <p:spPr>
-            <a:xfrm>
-              <a:off x="5444836" y="1105593"/>
-              <a:ext cx="0" cy="540327"/>
-            </a:xfrm>
-            <a:prstGeom prst="line">
-              <a:avLst/>
-            </a:prstGeom>
-            <a:ln w="38100">
-              <a:solidFill>
-                <a:schemeClr val="bg1">
-                  <a:lumMod val="85000"/>
-                </a:schemeClr>
-              </a:solidFill>
-            </a:ln>
-          </p:spPr>
-          <p:style>
-            <a:lnRef idx="1">
-              <a:schemeClr val="accent1"/>
-            </a:lnRef>
-            <a:fillRef idx="0">
-              <a:schemeClr val="accent1"/>
-            </a:fillRef>
-            <a:effectRef idx="0">
-              <a:schemeClr val="accent1"/>
-            </a:effectRef>
-            <a:fontRef idx="minor">
-              <a:schemeClr val="tx1"/>
-            </a:fontRef>
-          </p:style>
-        </p:cxnSp>
-        <p:cxnSp>
-          <p:nvCxnSpPr>
-            <p:cNvPr id="43" name="Straight Connector 42">
-              <a:extLst>
-                <a:ext uri="{FF2B5EF4-FFF2-40B4-BE49-F238E27FC236}">
-                  <a16:creationId xmlns:a16="http://schemas.microsoft.com/office/drawing/2014/main" id="{675E7EAC-89C1-EA48-B1F5-C085F5BD85AE}"/>
-                </a:ext>
-              </a:extLst>
-            </p:cNvPr>
-            <p:cNvCxnSpPr>
-              <a:cxnSpLocks/>
-            </p:cNvCxnSpPr>
-            <p:nvPr/>
-          </p:nvCxnSpPr>
-          <p:spPr>
-            <a:xfrm>
-              <a:off x="5597236" y="1105593"/>
-              <a:ext cx="0" cy="540327"/>
-            </a:xfrm>
-            <a:prstGeom prst="line">
-              <a:avLst/>
-            </a:prstGeom>
-            <a:ln w="38100">
-              <a:solidFill>
-                <a:schemeClr val="bg1">
-                  <a:lumMod val="85000"/>
-                </a:schemeClr>
-              </a:solidFill>
-            </a:ln>
-          </p:spPr>
-          <p:style>
-            <a:lnRef idx="1">
-              <a:schemeClr val="accent1"/>
-            </a:lnRef>
-            <a:fillRef idx="0">
-              <a:schemeClr val="accent1"/>
-            </a:fillRef>
-            <a:effectRef idx="0">
-              <a:schemeClr val="accent1"/>
-            </a:effectRef>
-            <a:fontRef idx="minor">
-              <a:schemeClr val="tx1"/>
-            </a:fontRef>
-          </p:style>
-        </p:cxnSp>
-        <p:cxnSp>
-          <p:nvCxnSpPr>
-            <p:cNvPr id="44" name="Straight Connector 43">
-              <a:extLst>
-                <a:ext uri="{FF2B5EF4-FFF2-40B4-BE49-F238E27FC236}">
-                  <a16:creationId xmlns:a16="http://schemas.microsoft.com/office/drawing/2014/main" id="{BD21C0E2-8A70-1D4F-9305-394DBC0F436B}"/>
-                </a:ext>
-              </a:extLst>
-            </p:cNvPr>
-            <p:cNvCxnSpPr>
-              <a:cxnSpLocks/>
-            </p:cNvCxnSpPr>
-            <p:nvPr/>
-          </p:nvCxnSpPr>
-          <p:spPr>
-            <a:xfrm>
-              <a:off x="5749636" y="1105593"/>
-              <a:ext cx="0" cy="540327"/>
-            </a:xfrm>
-            <a:prstGeom prst="line">
-              <a:avLst/>
-            </a:prstGeom>
-            <a:ln w="38100">
-              <a:solidFill>
-                <a:schemeClr val="bg1">
-                  <a:lumMod val="85000"/>
-                </a:schemeClr>
-              </a:solidFill>
-            </a:ln>
-          </p:spPr>
-          <p:style>
-            <a:lnRef idx="1">
-              <a:schemeClr val="accent1"/>
-            </a:lnRef>
-            <a:fillRef idx="0">
-              <a:schemeClr val="accent1"/>
-            </a:fillRef>
-            <a:effectRef idx="0">
-              <a:schemeClr val="accent1"/>
-            </a:effectRef>
-            <a:fontRef idx="minor">
-              <a:schemeClr val="tx1"/>
-            </a:fontRef>
-          </p:style>
-        </p:cxnSp>
-        <p:cxnSp>
-          <p:nvCxnSpPr>
-            <p:cNvPr id="45" name="Straight Connector 44">
-              <a:extLst>
-                <a:ext uri="{FF2B5EF4-FFF2-40B4-BE49-F238E27FC236}">
-                  <a16:creationId xmlns:a16="http://schemas.microsoft.com/office/drawing/2014/main" id="{34A982E6-B7AC-2D40-85CE-B8E7E9369844}"/>
-                </a:ext>
-              </a:extLst>
-            </p:cNvPr>
-            <p:cNvCxnSpPr>
-              <a:cxnSpLocks/>
-            </p:cNvCxnSpPr>
-            <p:nvPr/>
-          </p:nvCxnSpPr>
-          <p:spPr>
-            <a:xfrm>
-              <a:off x="5902036" y="1105593"/>
-              <a:ext cx="0" cy="540327"/>
-            </a:xfrm>
-            <a:prstGeom prst="line">
-              <a:avLst/>
-            </a:prstGeom>
-            <a:ln w="38100">
-              <a:solidFill>
-                <a:schemeClr val="bg1">
-                  <a:lumMod val="85000"/>
-                </a:schemeClr>
-              </a:solidFill>
-            </a:ln>
-          </p:spPr>
-          <p:style>
-            <a:lnRef idx="1">
-              <a:schemeClr val="accent1"/>
-            </a:lnRef>
-            <a:fillRef idx="0">
-              <a:schemeClr val="accent1"/>
-            </a:fillRef>
-            <a:effectRef idx="0">
-              <a:schemeClr val="accent1"/>
-            </a:effectRef>
-            <a:fontRef idx="minor">
-              <a:schemeClr val="tx1"/>
-            </a:fontRef>
-          </p:style>
-        </p:cxnSp>
-        <p:cxnSp>
-          <p:nvCxnSpPr>
-            <p:cNvPr id="46" name="Straight Connector 45">
-              <a:extLst>
-                <a:ext uri="{FF2B5EF4-FFF2-40B4-BE49-F238E27FC236}">
-                  <a16:creationId xmlns:a16="http://schemas.microsoft.com/office/drawing/2014/main" id="{89D0FC18-E538-B94D-8136-B372F0C357DD}"/>
-                </a:ext>
-              </a:extLst>
-            </p:cNvPr>
-            <p:cNvCxnSpPr>
-              <a:cxnSpLocks/>
-            </p:cNvCxnSpPr>
-            <p:nvPr/>
-          </p:nvCxnSpPr>
-          <p:spPr>
-            <a:xfrm flipH="1">
-              <a:off x="5329845" y="1215444"/>
-              <a:ext cx="721820" cy="430476"/>
-            </a:xfrm>
-            <a:prstGeom prst="line">
-              <a:avLst/>
-            </a:prstGeom>
-            <a:ln w="38100">
-              <a:solidFill>
-                <a:schemeClr val="bg1">
-                  <a:lumMod val="85000"/>
-                </a:schemeClr>
-              </a:solidFill>
-            </a:ln>
-          </p:spPr>
-          <p:style>
-            <a:lnRef idx="1">
-              <a:schemeClr val="accent1"/>
-            </a:lnRef>
-            <a:fillRef idx="0">
-              <a:schemeClr val="accent1"/>
-            </a:fillRef>
-            <a:effectRef idx="0">
-              <a:schemeClr val="accent1"/>
-            </a:effectRef>
-            <a:fontRef idx="minor">
-              <a:schemeClr val="tx1"/>
-            </a:fontRef>
-          </p:style>
-        </p:cxnSp>
-      </p:grpSp>
-      <p:grpSp>
-        <p:nvGrpSpPr>
-          <p:cNvPr id="47" name="Group 46">
-            <a:extLst>
-              <a:ext uri="{FF2B5EF4-FFF2-40B4-BE49-F238E27FC236}">
-                <a16:creationId xmlns:a16="http://schemas.microsoft.com/office/drawing/2014/main" id="{BA503E52-5A16-464C-B3C2-94FE7A1F801E}"/>
-              </a:ext>
-            </a:extLst>
-          </p:cNvPr>
-          <p:cNvGrpSpPr/>
-          <p:nvPr/>
-        </p:nvGrpSpPr>
-        <p:grpSpPr>
-          <a:xfrm>
-            <a:off x="1506014" y="1954058"/>
-            <a:ext cx="393444" cy="294517"/>
-            <a:chOff x="5329845" y="1105593"/>
-            <a:chExt cx="721820" cy="540327"/>
-          </a:xfrm>
-        </p:grpSpPr>
-        <p:cxnSp>
-          <p:nvCxnSpPr>
-            <p:cNvPr id="48" name="Straight Connector 47">
-              <a:extLst>
-                <a:ext uri="{FF2B5EF4-FFF2-40B4-BE49-F238E27FC236}">
-                  <a16:creationId xmlns:a16="http://schemas.microsoft.com/office/drawing/2014/main" id="{4370B4CF-3C46-CE42-AF03-BA25E49E443D}"/>
-                </a:ext>
-              </a:extLst>
-            </p:cNvPr>
-            <p:cNvCxnSpPr>
-              <a:cxnSpLocks/>
-            </p:cNvCxnSpPr>
-            <p:nvPr/>
-          </p:nvCxnSpPr>
-          <p:spPr>
-            <a:xfrm>
-              <a:off x="5444836" y="1105593"/>
-              <a:ext cx="0" cy="540327"/>
-            </a:xfrm>
-            <a:prstGeom prst="line">
-              <a:avLst/>
-            </a:prstGeom>
-            <a:ln w="38100">
-              <a:solidFill>
-                <a:schemeClr val="bg1">
-                  <a:lumMod val="85000"/>
-                </a:schemeClr>
-              </a:solidFill>
-            </a:ln>
-          </p:spPr>
-          <p:style>
-            <a:lnRef idx="1">
-              <a:schemeClr val="accent1"/>
-            </a:lnRef>
-            <a:fillRef idx="0">
-              <a:schemeClr val="accent1"/>
-            </a:fillRef>
-            <a:effectRef idx="0">
-              <a:schemeClr val="accent1"/>
-            </a:effectRef>
-            <a:fontRef idx="minor">
-              <a:schemeClr val="tx1"/>
-            </a:fontRef>
-          </p:style>
-        </p:cxnSp>
-        <p:cxnSp>
-          <p:nvCxnSpPr>
-            <p:cNvPr id="49" name="Straight Connector 48">
-              <a:extLst>
-                <a:ext uri="{FF2B5EF4-FFF2-40B4-BE49-F238E27FC236}">
-                  <a16:creationId xmlns:a16="http://schemas.microsoft.com/office/drawing/2014/main" id="{B6FC8228-036A-E545-A920-59734C7D5F7A}"/>
-                </a:ext>
-              </a:extLst>
-            </p:cNvPr>
-            <p:cNvCxnSpPr>
-              <a:cxnSpLocks/>
-            </p:cNvCxnSpPr>
-            <p:nvPr/>
-          </p:nvCxnSpPr>
-          <p:spPr>
-            <a:xfrm>
-              <a:off x="5597236" y="1105593"/>
-              <a:ext cx="0" cy="540327"/>
-            </a:xfrm>
-            <a:prstGeom prst="line">
-              <a:avLst/>
-            </a:prstGeom>
-            <a:ln w="38100">
-              <a:solidFill>
-                <a:schemeClr val="bg1">
-                  <a:lumMod val="85000"/>
-                </a:schemeClr>
-              </a:solidFill>
-            </a:ln>
-          </p:spPr>
-          <p:style>
-            <a:lnRef idx="1">
-              <a:schemeClr val="accent1"/>
-            </a:lnRef>
-            <a:fillRef idx="0">
-              <a:schemeClr val="accent1"/>
-            </a:fillRef>
-            <a:effectRef idx="0">
-              <a:schemeClr val="accent1"/>
-            </a:effectRef>
-            <a:fontRef idx="minor">
-              <a:schemeClr val="tx1"/>
-            </a:fontRef>
-          </p:style>
-        </p:cxnSp>
-        <p:cxnSp>
-          <p:nvCxnSpPr>
-            <p:cNvPr id="50" name="Straight Connector 49">
-              <a:extLst>
-                <a:ext uri="{FF2B5EF4-FFF2-40B4-BE49-F238E27FC236}">
-                  <a16:creationId xmlns:a16="http://schemas.microsoft.com/office/drawing/2014/main" id="{94B8AB82-963D-2E4D-BAFC-DFB5F6CF7DDC}"/>
-                </a:ext>
-              </a:extLst>
-            </p:cNvPr>
-            <p:cNvCxnSpPr>
-              <a:cxnSpLocks/>
-            </p:cNvCxnSpPr>
-            <p:nvPr/>
-          </p:nvCxnSpPr>
-          <p:spPr>
-            <a:xfrm>
-              <a:off x="5749636" y="1105593"/>
-              <a:ext cx="0" cy="540327"/>
-            </a:xfrm>
-            <a:prstGeom prst="line">
-              <a:avLst/>
-            </a:prstGeom>
-            <a:ln w="38100">
-              <a:solidFill>
-                <a:schemeClr val="bg1">
-                  <a:lumMod val="85000"/>
-                </a:schemeClr>
-              </a:solidFill>
-            </a:ln>
-          </p:spPr>
-          <p:style>
-            <a:lnRef idx="1">
-              <a:schemeClr val="accent1"/>
-            </a:lnRef>
-            <a:fillRef idx="0">
-              <a:schemeClr val="accent1"/>
-            </a:fillRef>
-            <a:effectRef idx="0">
-              <a:schemeClr val="accent1"/>
-            </a:effectRef>
-            <a:fontRef idx="minor">
-              <a:schemeClr val="tx1"/>
-            </a:fontRef>
-          </p:style>
-        </p:cxnSp>
-        <p:cxnSp>
-          <p:nvCxnSpPr>
-            <p:cNvPr id="51" name="Straight Connector 50">
-              <a:extLst>
-                <a:ext uri="{FF2B5EF4-FFF2-40B4-BE49-F238E27FC236}">
-                  <a16:creationId xmlns:a16="http://schemas.microsoft.com/office/drawing/2014/main" id="{39305519-BE25-144F-801E-2B20F685B945}"/>
-                </a:ext>
-              </a:extLst>
-            </p:cNvPr>
-            <p:cNvCxnSpPr>
-              <a:cxnSpLocks/>
-            </p:cNvCxnSpPr>
-            <p:nvPr/>
-          </p:nvCxnSpPr>
-          <p:spPr>
-            <a:xfrm>
-              <a:off x="5902036" y="1105593"/>
-              <a:ext cx="0" cy="540327"/>
-            </a:xfrm>
-            <a:prstGeom prst="line">
-              <a:avLst/>
-            </a:prstGeom>
-            <a:ln w="38100">
-              <a:solidFill>
-                <a:schemeClr val="bg1">
-                  <a:lumMod val="85000"/>
-                </a:schemeClr>
-              </a:solidFill>
-            </a:ln>
-          </p:spPr>
-          <p:style>
-            <a:lnRef idx="1">
-              <a:schemeClr val="accent1"/>
-            </a:lnRef>
-            <a:fillRef idx="0">
-              <a:schemeClr val="accent1"/>
-            </a:fillRef>
-            <a:effectRef idx="0">
-              <a:schemeClr val="accent1"/>
-            </a:effectRef>
-            <a:fontRef idx="minor">
-              <a:schemeClr val="tx1"/>
-            </a:fontRef>
-          </p:style>
-        </p:cxnSp>
-        <p:cxnSp>
-          <p:nvCxnSpPr>
-            <p:cNvPr id="52" name="Straight Connector 51">
-              <a:extLst>
-                <a:ext uri="{FF2B5EF4-FFF2-40B4-BE49-F238E27FC236}">
-                  <a16:creationId xmlns:a16="http://schemas.microsoft.com/office/drawing/2014/main" id="{FBDAB017-1A2C-B14C-B0F2-91F5FFE23016}"/>
-                </a:ext>
-              </a:extLst>
-            </p:cNvPr>
-            <p:cNvCxnSpPr>
-              <a:cxnSpLocks/>
-            </p:cNvCxnSpPr>
-            <p:nvPr/>
-          </p:nvCxnSpPr>
-          <p:spPr>
-            <a:xfrm flipH="1">
-              <a:off x="5329845" y="1215444"/>
-              <a:ext cx="721820" cy="430476"/>
-            </a:xfrm>
-            <a:prstGeom prst="line">
-              <a:avLst/>
-            </a:prstGeom>
-            <a:ln w="38100">
-              <a:solidFill>
-                <a:schemeClr val="bg1">
-                  <a:lumMod val="85000"/>
-                </a:schemeClr>
-              </a:solidFill>
-            </a:ln>
-          </p:spPr>
-          <p:style>
-            <a:lnRef idx="1">
-              <a:schemeClr val="accent1"/>
-            </a:lnRef>
-            <a:fillRef idx="0">
-              <a:schemeClr val="accent1"/>
-            </a:fillRef>
-            <a:effectRef idx="0">
-              <a:schemeClr val="accent1"/>
-            </a:effectRef>
-            <a:fontRef idx="minor">
-              <a:schemeClr val="tx1"/>
-            </a:fontRef>
-          </p:style>
-        </p:cxnSp>
-      </p:grpSp>
-      <p:grpSp>
-        <p:nvGrpSpPr>
-          <p:cNvPr id="53" name="Group 52">
-            <a:extLst>
-              <a:ext uri="{FF2B5EF4-FFF2-40B4-BE49-F238E27FC236}">
-                <a16:creationId xmlns:a16="http://schemas.microsoft.com/office/drawing/2014/main" id="{28A5A8DF-F4A8-4844-97E0-AC22C18E76C4}"/>
-              </a:ext>
-            </a:extLst>
-          </p:cNvPr>
-          <p:cNvGrpSpPr/>
-          <p:nvPr/>
-        </p:nvGrpSpPr>
-        <p:grpSpPr>
-          <a:xfrm>
-            <a:off x="4939171" y="1954058"/>
-            <a:ext cx="393444" cy="294517"/>
-            <a:chOff x="5329845" y="1105593"/>
-            <a:chExt cx="721820" cy="540327"/>
-          </a:xfrm>
-        </p:grpSpPr>
-        <p:cxnSp>
-          <p:nvCxnSpPr>
-            <p:cNvPr id="54" name="Straight Connector 53">
-              <a:extLst>
-                <a:ext uri="{FF2B5EF4-FFF2-40B4-BE49-F238E27FC236}">
-                  <a16:creationId xmlns:a16="http://schemas.microsoft.com/office/drawing/2014/main" id="{BA821C0C-A03C-BF4B-84A9-F0965B20B8E7}"/>
-                </a:ext>
-              </a:extLst>
-            </p:cNvPr>
-            <p:cNvCxnSpPr>
-              <a:cxnSpLocks/>
-            </p:cNvCxnSpPr>
-            <p:nvPr/>
-          </p:nvCxnSpPr>
-          <p:spPr>
-            <a:xfrm>
-              <a:off x="5444836" y="1105593"/>
-              <a:ext cx="0" cy="540327"/>
-            </a:xfrm>
-            <a:prstGeom prst="line">
-              <a:avLst/>
-            </a:prstGeom>
-            <a:ln w="38100">
-              <a:solidFill>
-                <a:schemeClr val="bg1">
-                  <a:lumMod val="85000"/>
-                </a:schemeClr>
-              </a:solidFill>
-            </a:ln>
-          </p:spPr>
-          <p:style>
-            <a:lnRef idx="1">
-              <a:schemeClr val="accent1"/>
-            </a:lnRef>
-            <a:fillRef idx="0">
-              <a:schemeClr val="accent1"/>
-            </a:fillRef>
-            <a:effectRef idx="0">
-              <a:schemeClr val="accent1"/>
-            </a:effectRef>
-            <a:fontRef idx="minor">
-              <a:schemeClr val="tx1"/>
-            </a:fontRef>
-          </p:style>
-        </p:cxnSp>
-        <p:cxnSp>
-          <p:nvCxnSpPr>
-            <p:cNvPr id="55" name="Straight Connector 54">
-              <a:extLst>
-                <a:ext uri="{FF2B5EF4-FFF2-40B4-BE49-F238E27FC236}">
-                  <a16:creationId xmlns:a16="http://schemas.microsoft.com/office/drawing/2014/main" id="{53DEFD24-7CF6-A944-BD13-2928958B3A81}"/>
-                </a:ext>
-              </a:extLst>
-            </p:cNvPr>
-            <p:cNvCxnSpPr>
-              <a:cxnSpLocks/>
-            </p:cNvCxnSpPr>
-            <p:nvPr/>
-          </p:nvCxnSpPr>
-          <p:spPr>
-            <a:xfrm>
-              <a:off x="5597236" y="1105593"/>
-              <a:ext cx="0" cy="540327"/>
-            </a:xfrm>
-            <a:prstGeom prst="line">
-              <a:avLst/>
-            </a:prstGeom>
-            <a:ln w="38100">
-              <a:solidFill>
-                <a:schemeClr val="bg1">
-                  <a:lumMod val="85000"/>
-                </a:schemeClr>
-              </a:solidFill>
-            </a:ln>
-          </p:spPr>
-          <p:style>
-            <a:lnRef idx="1">
-              <a:schemeClr val="accent1"/>
-            </a:lnRef>
-            <a:fillRef idx="0">
-              <a:schemeClr val="accent1"/>
-            </a:fillRef>
-            <a:effectRef idx="0">
-              <a:schemeClr val="accent1"/>
-            </a:effectRef>
-            <a:fontRef idx="minor">
-              <a:schemeClr val="tx1"/>
-            </a:fontRef>
-          </p:style>
-        </p:cxnSp>
-        <p:cxnSp>
-          <p:nvCxnSpPr>
-            <p:cNvPr id="56" name="Straight Connector 55">
-              <a:extLst>
-                <a:ext uri="{FF2B5EF4-FFF2-40B4-BE49-F238E27FC236}">
-                  <a16:creationId xmlns:a16="http://schemas.microsoft.com/office/drawing/2014/main" id="{872555F3-1AAA-3344-90CC-1A62B7A3F7A9}"/>
-                </a:ext>
-              </a:extLst>
-            </p:cNvPr>
-            <p:cNvCxnSpPr>
-              <a:cxnSpLocks/>
-            </p:cNvCxnSpPr>
-            <p:nvPr/>
-          </p:nvCxnSpPr>
-          <p:spPr>
-            <a:xfrm>
-              <a:off x="5749636" y="1105593"/>
-              <a:ext cx="0" cy="540327"/>
-            </a:xfrm>
-            <a:prstGeom prst="line">
-              <a:avLst/>
-            </a:prstGeom>
-            <a:ln w="38100">
-              <a:solidFill>
-                <a:schemeClr val="bg1">
-                  <a:lumMod val="85000"/>
-                </a:schemeClr>
-              </a:solidFill>
-            </a:ln>
-          </p:spPr>
-          <p:style>
-            <a:lnRef idx="1">
-              <a:schemeClr val="accent1"/>
-            </a:lnRef>
-            <a:fillRef idx="0">
-              <a:schemeClr val="accent1"/>
-            </a:fillRef>
-            <a:effectRef idx="0">
-              <a:schemeClr val="accent1"/>
-            </a:effectRef>
-            <a:fontRef idx="minor">
-              <a:schemeClr val="tx1"/>
-            </a:fontRef>
-          </p:style>
-        </p:cxnSp>
-        <p:cxnSp>
-          <p:nvCxnSpPr>
-            <p:cNvPr id="57" name="Straight Connector 56">
-              <a:extLst>
-                <a:ext uri="{FF2B5EF4-FFF2-40B4-BE49-F238E27FC236}">
-                  <a16:creationId xmlns:a16="http://schemas.microsoft.com/office/drawing/2014/main" id="{E254A05A-E5A7-A346-A1A2-8E6057289A2A}"/>
-                </a:ext>
-              </a:extLst>
-            </p:cNvPr>
-            <p:cNvCxnSpPr>
-              <a:cxnSpLocks/>
-            </p:cNvCxnSpPr>
-            <p:nvPr/>
-          </p:nvCxnSpPr>
-          <p:spPr>
-            <a:xfrm>
-              <a:off x="5902036" y="1105593"/>
-              <a:ext cx="0" cy="540327"/>
-            </a:xfrm>
-            <a:prstGeom prst="line">
-              <a:avLst/>
-            </a:prstGeom>
-            <a:ln w="38100">
-              <a:solidFill>
-                <a:schemeClr val="bg1">
-                  <a:lumMod val="85000"/>
-                </a:schemeClr>
-              </a:solidFill>
-            </a:ln>
-          </p:spPr>
-          <p:style>
-            <a:lnRef idx="1">
-              <a:schemeClr val="accent1"/>
-            </a:lnRef>
-            <a:fillRef idx="0">
-              <a:schemeClr val="accent1"/>
-            </a:fillRef>
-            <a:effectRef idx="0">
-              <a:schemeClr val="accent1"/>
-            </a:effectRef>
-            <a:fontRef idx="minor">
-              <a:schemeClr val="tx1"/>
-            </a:fontRef>
-          </p:style>
-        </p:cxnSp>
-        <p:cxnSp>
-          <p:nvCxnSpPr>
-            <p:cNvPr id="58" name="Straight Connector 57">
-              <a:extLst>
-                <a:ext uri="{FF2B5EF4-FFF2-40B4-BE49-F238E27FC236}">
-                  <a16:creationId xmlns:a16="http://schemas.microsoft.com/office/drawing/2014/main" id="{41235CC1-5F35-CC40-BF53-6F5D0407BFCD}"/>
-                </a:ext>
-              </a:extLst>
-            </p:cNvPr>
-            <p:cNvCxnSpPr>
-              <a:cxnSpLocks/>
-            </p:cNvCxnSpPr>
-            <p:nvPr/>
-          </p:nvCxnSpPr>
-          <p:spPr>
-            <a:xfrm flipH="1">
-              <a:off x="5329845" y="1215444"/>
-              <a:ext cx="721820" cy="430476"/>
-            </a:xfrm>
-            <a:prstGeom prst="line">
-              <a:avLst/>
-            </a:prstGeom>
-            <a:ln w="38100">
-              <a:solidFill>
-                <a:schemeClr val="bg1">
-                  <a:lumMod val="85000"/>
-                </a:schemeClr>
-              </a:solidFill>
-            </a:ln>
-          </p:spPr>
-          <p:style>
-            <a:lnRef idx="1">
-              <a:schemeClr val="accent1"/>
-            </a:lnRef>
-            <a:fillRef idx="0">
-              <a:schemeClr val="accent1"/>
-            </a:fillRef>
-            <a:effectRef idx="0">
-              <a:schemeClr val="accent1"/>
-            </a:effectRef>
-            <a:fontRef idx="minor">
-              <a:schemeClr val="tx1"/>
-            </a:fontRef>
-          </p:style>
-        </p:cxnSp>
-      </p:grpSp>
-      <p:grpSp>
-        <p:nvGrpSpPr>
-          <p:cNvPr id="65" name="Group 64">
-            <a:extLst>
-              <a:ext uri="{FF2B5EF4-FFF2-40B4-BE49-F238E27FC236}">
-                <a16:creationId xmlns:a16="http://schemas.microsoft.com/office/drawing/2014/main" id="{6942ED47-05FF-5F49-A9EE-90B690CBAD8D}"/>
-              </a:ext>
-            </a:extLst>
-          </p:cNvPr>
-          <p:cNvGrpSpPr/>
-          <p:nvPr/>
-        </p:nvGrpSpPr>
-        <p:grpSpPr>
-          <a:xfrm>
-            <a:off x="5492300" y="1954058"/>
-            <a:ext cx="166138" cy="294517"/>
-            <a:chOff x="5492300" y="1391798"/>
-            <a:chExt cx="166138" cy="294517"/>
-          </a:xfrm>
-        </p:grpSpPr>
-        <p:cxnSp>
-          <p:nvCxnSpPr>
-            <p:cNvPr id="60" name="Straight Connector 59">
-              <a:extLst>
-                <a:ext uri="{FF2B5EF4-FFF2-40B4-BE49-F238E27FC236}">
-                  <a16:creationId xmlns:a16="http://schemas.microsoft.com/office/drawing/2014/main" id="{AECD6D0B-FD79-FB4E-A879-BD618EEF5440}"/>
-                </a:ext>
-              </a:extLst>
-            </p:cNvPr>
-            <p:cNvCxnSpPr>
-              <a:cxnSpLocks/>
-            </p:cNvCxnSpPr>
-            <p:nvPr/>
-          </p:nvCxnSpPr>
-          <p:spPr>
-            <a:xfrm>
-              <a:off x="5492300" y="1391798"/>
-              <a:ext cx="0" cy="294517"/>
-            </a:xfrm>
-            <a:prstGeom prst="line">
-              <a:avLst/>
-            </a:prstGeom>
-            <a:ln w="38100">
-              <a:solidFill>
-                <a:schemeClr val="bg1">
-                  <a:lumMod val="85000"/>
-                </a:schemeClr>
-              </a:solidFill>
-            </a:ln>
-          </p:spPr>
-          <p:style>
-            <a:lnRef idx="1">
-              <a:schemeClr val="accent1"/>
-            </a:lnRef>
-            <a:fillRef idx="0">
-              <a:schemeClr val="accent1"/>
-            </a:fillRef>
-            <a:effectRef idx="0">
-              <a:schemeClr val="accent1"/>
-            </a:effectRef>
-            <a:fontRef idx="minor">
-              <a:schemeClr val="tx1"/>
-            </a:fontRef>
-          </p:style>
-        </p:cxnSp>
-        <p:cxnSp>
-          <p:nvCxnSpPr>
-            <p:cNvPr id="61" name="Straight Connector 60">
-              <a:extLst>
-                <a:ext uri="{FF2B5EF4-FFF2-40B4-BE49-F238E27FC236}">
-                  <a16:creationId xmlns:a16="http://schemas.microsoft.com/office/drawing/2014/main" id="{B273F2A2-32A3-F644-852C-6B7703A0597D}"/>
-                </a:ext>
-              </a:extLst>
-            </p:cNvPr>
-            <p:cNvCxnSpPr>
-              <a:cxnSpLocks/>
-            </p:cNvCxnSpPr>
-            <p:nvPr/>
-          </p:nvCxnSpPr>
-          <p:spPr>
-            <a:xfrm>
-              <a:off x="5575369" y="1391798"/>
-              <a:ext cx="0" cy="294517"/>
-            </a:xfrm>
-            <a:prstGeom prst="line">
-              <a:avLst/>
-            </a:prstGeom>
-            <a:ln w="38100">
-              <a:solidFill>
-                <a:schemeClr val="bg1">
-                  <a:lumMod val="85000"/>
-                </a:schemeClr>
-              </a:solidFill>
-            </a:ln>
-          </p:spPr>
-          <p:style>
-            <a:lnRef idx="1">
-              <a:schemeClr val="accent1"/>
-            </a:lnRef>
-            <a:fillRef idx="0">
-              <a:schemeClr val="accent1"/>
-            </a:fillRef>
-            <a:effectRef idx="0">
-              <a:schemeClr val="accent1"/>
-            </a:effectRef>
-            <a:fontRef idx="minor">
-              <a:schemeClr val="tx1"/>
-            </a:fontRef>
-          </p:style>
-        </p:cxnSp>
-        <p:cxnSp>
-          <p:nvCxnSpPr>
-            <p:cNvPr id="62" name="Straight Connector 61">
-              <a:extLst>
-                <a:ext uri="{FF2B5EF4-FFF2-40B4-BE49-F238E27FC236}">
-                  <a16:creationId xmlns:a16="http://schemas.microsoft.com/office/drawing/2014/main" id="{ED9BCAF7-152E-8248-A55E-56199A35ED3B}"/>
-                </a:ext>
-              </a:extLst>
-            </p:cNvPr>
-            <p:cNvCxnSpPr>
-              <a:cxnSpLocks/>
-            </p:cNvCxnSpPr>
-            <p:nvPr/>
-          </p:nvCxnSpPr>
-          <p:spPr>
-            <a:xfrm>
-              <a:off x="5658438" y="1391798"/>
-              <a:ext cx="0" cy="294517"/>
-            </a:xfrm>
-            <a:prstGeom prst="line">
-              <a:avLst/>
-            </a:prstGeom>
-            <a:ln w="38100">
-              <a:solidFill>
-                <a:schemeClr val="bg1">
-                  <a:lumMod val="85000"/>
-                </a:schemeClr>
-              </a:solidFill>
-            </a:ln>
-          </p:spPr>
-          <p:style>
-            <a:lnRef idx="1">
-              <a:schemeClr val="accent1"/>
-            </a:lnRef>
-            <a:fillRef idx="0">
-              <a:schemeClr val="accent1"/>
-            </a:fillRef>
-            <a:effectRef idx="0">
-              <a:schemeClr val="accent1"/>
-            </a:effectRef>
-            <a:fontRef idx="minor">
-              <a:schemeClr val="tx1"/>
-            </a:fontRef>
-          </p:style>
-        </p:cxnSp>
-      </p:grpSp>
       <p:sp>
         <p:nvSpPr>
           <p:cNvPr id="66" name="TextBox 65">
@@ -9934,7 +8056,7 @@
         </p:nvSpPr>
         <p:spPr>
           <a:xfrm>
-            <a:off x="922713" y="2676698"/>
+            <a:off x="922713" y="3946328"/>
             <a:ext cx="5128952" cy="369332"/>
           </a:xfrm>
           <a:prstGeom prst="rect">
@@ -9950,7 +8072,7 @@
           <a:p>
             <a:r>
               <a:rPr lang="en-GB" dirty="0"/>
-              <a:t>Testing stories (if you test):</a:t>
+              <a:t>Methods I tried to test (method: effort required)</a:t>
             </a:r>
           </a:p>
         </p:txBody>
@@ -9969,7 +8091,7 @@
         </p:nvGrpSpPr>
         <p:grpSpPr>
           <a:xfrm>
-            <a:off x="633452" y="3200400"/>
+            <a:off x="633452" y="2202975"/>
             <a:ext cx="5734097" cy="1457407"/>
             <a:chOff x="633452" y="3200400"/>
             <a:chExt cx="5734097" cy="1457407"/>
@@ -10011,7 +8133,7 @@
                     </a:schemeClr>
                   </a:solidFill>
                 </a:rPr>
-                <a:t>Today I tested ______ and</a:t>
+                <a:t>ClassName1::method2           ClassName2::method2</a:t>
               </a:r>
             </a:p>
           </p:txBody>
@@ -10194,560 +8316,6 @@
               <a:extLst>
                 <a:ext uri="{FF2B5EF4-FFF2-40B4-BE49-F238E27FC236}">
                   <a16:creationId xmlns:a16="http://schemas.microsoft.com/office/drawing/2014/main" id="{FE60F26C-4C2F-0E4C-B2A5-2618642AFF0B}"/>
-                </a:ext>
-              </a:extLst>
-            </p:cNvPr>
-            <p:cNvCxnSpPr>
-              <a:cxnSpLocks/>
-            </p:cNvCxnSpPr>
-            <p:nvPr/>
-          </p:nvCxnSpPr>
-          <p:spPr>
-            <a:xfrm>
-              <a:off x="633452" y="4362705"/>
-              <a:ext cx="5734097" cy="0"/>
-            </a:xfrm>
-            <a:prstGeom prst="line">
-              <a:avLst/>
-            </a:prstGeom>
-            <a:ln>
-              <a:solidFill>
-                <a:schemeClr val="tx1"/>
-              </a:solidFill>
-            </a:ln>
-          </p:spPr>
-          <p:style>
-            <a:lnRef idx="1">
-              <a:schemeClr val="accent1"/>
-            </a:lnRef>
-            <a:fillRef idx="0">
-              <a:schemeClr val="accent1"/>
-            </a:fillRef>
-            <a:effectRef idx="0">
-              <a:schemeClr val="accent1"/>
-            </a:effectRef>
-            <a:fontRef idx="minor">
-              <a:schemeClr val="tx1"/>
-            </a:fontRef>
-          </p:style>
-        </p:cxnSp>
-      </p:grpSp>
-      <p:grpSp>
-        <p:nvGrpSpPr>
-          <p:cNvPr id="83" name="Group 82">
-            <a:extLst>
-              <a:ext uri="{FF2B5EF4-FFF2-40B4-BE49-F238E27FC236}">
-                <a16:creationId xmlns:a16="http://schemas.microsoft.com/office/drawing/2014/main" id="{BCF03D81-39DF-6840-BC60-7C356ED03697}"/>
-              </a:ext>
-            </a:extLst>
-          </p:cNvPr>
-          <p:cNvGrpSpPr/>
-          <p:nvPr/>
-        </p:nvGrpSpPr>
-        <p:grpSpPr>
-          <a:xfrm>
-            <a:off x="633452" y="5203767"/>
-            <a:ext cx="5734097" cy="1457407"/>
-            <a:chOff x="633452" y="3200400"/>
-            <a:chExt cx="5734097" cy="1457407"/>
-          </a:xfrm>
-        </p:grpSpPr>
-        <p:sp>
-          <p:nvSpPr>
-            <p:cNvPr id="84" name="TextBox 83">
-              <a:extLst>
-                <a:ext uri="{FF2B5EF4-FFF2-40B4-BE49-F238E27FC236}">
-                  <a16:creationId xmlns:a16="http://schemas.microsoft.com/office/drawing/2014/main" id="{600EF724-C980-CA46-A5F9-8780B3ED757B}"/>
-                </a:ext>
-              </a:extLst>
-            </p:cNvPr>
-            <p:cNvSpPr txBox="1"/>
-            <p:nvPr/>
-          </p:nvSpPr>
-          <p:spPr>
-            <a:xfrm>
-              <a:off x="1047404" y="3200400"/>
-              <a:ext cx="3794760" cy="276999"/>
-            </a:xfrm>
-            <a:prstGeom prst="rect">
-              <a:avLst/>
-            </a:prstGeom>
-            <a:noFill/>
-          </p:spPr>
-          <p:txBody>
-            <a:bodyPr wrap="square" rtlCol="0">
-              <a:spAutoFit/>
-            </a:bodyPr>
-            <a:lstStyle/>
-            <a:p>
-              <a:r>
-                <a:rPr lang="en-GB" sz="1200" dirty="0">
-                  <a:solidFill>
-                    <a:schemeClr val="bg1">
-                      <a:lumMod val="75000"/>
-                    </a:schemeClr>
-                  </a:solidFill>
-                </a:rPr>
-                <a:t>Today I tested ______ and</a:t>
-              </a:r>
-            </a:p>
-          </p:txBody>
-        </p:sp>
-        <p:cxnSp>
-          <p:nvCxnSpPr>
-            <p:cNvPr id="85" name="Straight Connector 84">
-              <a:extLst>
-                <a:ext uri="{FF2B5EF4-FFF2-40B4-BE49-F238E27FC236}">
-                  <a16:creationId xmlns:a16="http://schemas.microsoft.com/office/drawing/2014/main" id="{D4D71808-743B-5C47-8802-5884BA1A7150}"/>
-                </a:ext>
-              </a:extLst>
-            </p:cNvPr>
-            <p:cNvCxnSpPr>
-              <a:cxnSpLocks/>
-            </p:cNvCxnSpPr>
-            <p:nvPr/>
-          </p:nvCxnSpPr>
-          <p:spPr>
-            <a:xfrm>
-              <a:off x="633452" y="3477399"/>
-              <a:ext cx="5734097" cy="0"/>
-            </a:xfrm>
-            <a:prstGeom prst="line">
-              <a:avLst/>
-            </a:prstGeom>
-            <a:ln>
-              <a:solidFill>
-                <a:schemeClr val="tx1"/>
-              </a:solidFill>
-            </a:ln>
-          </p:spPr>
-          <p:style>
-            <a:lnRef idx="1">
-              <a:schemeClr val="accent1"/>
-            </a:lnRef>
-            <a:fillRef idx="0">
-              <a:schemeClr val="accent1"/>
-            </a:fillRef>
-            <a:effectRef idx="0">
-              <a:schemeClr val="accent1"/>
-            </a:effectRef>
-            <a:fontRef idx="minor">
-              <a:schemeClr val="tx1"/>
-            </a:fontRef>
-          </p:style>
-        </p:cxnSp>
-        <p:cxnSp>
-          <p:nvCxnSpPr>
-            <p:cNvPr id="86" name="Straight Connector 85">
-              <a:extLst>
-                <a:ext uri="{FF2B5EF4-FFF2-40B4-BE49-F238E27FC236}">
-                  <a16:creationId xmlns:a16="http://schemas.microsoft.com/office/drawing/2014/main" id="{7E3CFA54-722F-3848-89EB-A6E1B4B537D1}"/>
-                </a:ext>
-              </a:extLst>
-            </p:cNvPr>
-            <p:cNvCxnSpPr>
-              <a:cxnSpLocks/>
-            </p:cNvCxnSpPr>
-            <p:nvPr/>
-          </p:nvCxnSpPr>
-          <p:spPr>
-            <a:xfrm>
-              <a:off x="633452" y="3772501"/>
-              <a:ext cx="5734097" cy="0"/>
-            </a:xfrm>
-            <a:prstGeom prst="line">
-              <a:avLst/>
-            </a:prstGeom>
-            <a:ln>
-              <a:solidFill>
-                <a:schemeClr val="tx1"/>
-              </a:solidFill>
-            </a:ln>
-          </p:spPr>
-          <p:style>
-            <a:lnRef idx="1">
-              <a:schemeClr val="accent1"/>
-            </a:lnRef>
-            <a:fillRef idx="0">
-              <a:schemeClr val="accent1"/>
-            </a:fillRef>
-            <a:effectRef idx="0">
-              <a:schemeClr val="accent1"/>
-            </a:effectRef>
-            <a:fontRef idx="minor">
-              <a:schemeClr val="tx1"/>
-            </a:fontRef>
-          </p:style>
-        </p:cxnSp>
-        <p:cxnSp>
-          <p:nvCxnSpPr>
-            <p:cNvPr id="87" name="Straight Connector 86">
-              <a:extLst>
-                <a:ext uri="{FF2B5EF4-FFF2-40B4-BE49-F238E27FC236}">
-                  <a16:creationId xmlns:a16="http://schemas.microsoft.com/office/drawing/2014/main" id="{A282ED08-F26F-BB4F-B74C-85FFF6A4F1E3}"/>
-                </a:ext>
-              </a:extLst>
-            </p:cNvPr>
-            <p:cNvCxnSpPr>
-              <a:cxnSpLocks/>
-            </p:cNvCxnSpPr>
-            <p:nvPr/>
-          </p:nvCxnSpPr>
-          <p:spPr>
-            <a:xfrm>
-              <a:off x="633452" y="4067603"/>
-              <a:ext cx="5734097" cy="0"/>
-            </a:xfrm>
-            <a:prstGeom prst="line">
-              <a:avLst/>
-            </a:prstGeom>
-            <a:ln>
-              <a:solidFill>
-                <a:schemeClr val="tx1"/>
-              </a:solidFill>
-            </a:ln>
-          </p:spPr>
-          <p:style>
-            <a:lnRef idx="1">
-              <a:schemeClr val="accent1"/>
-            </a:lnRef>
-            <a:fillRef idx="0">
-              <a:schemeClr val="accent1"/>
-            </a:fillRef>
-            <a:effectRef idx="0">
-              <a:schemeClr val="accent1"/>
-            </a:effectRef>
-            <a:fontRef idx="minor">
-              <a:schemeClr val="tx1"/>
-            </a:fontRef>
-          </p:style>
-        </p:cxnSp>
-        <p:cxnSp>
-          <p:nvCxnSpPr>
-            <p:cNvPr id="88" name="Straight Connector 87">
-              <a:extLst>
-                <a:ext uri="{FF2B5EF4-FFF2-40B4-BE49-F238E27FC236}">
-                  <a16:creationId xmlns:a16="http://schemas.microsoft.com/office/drawing/2014/main" id="{FDB8A382-E0F4-D94F-8B0C-C24E0B493A9D}"/>
-                </a:ext>
-              </a:extLst>
-            </p:cNvPr>
-            <p:cNvCxnSpPr>
-              <a:cxnSpLocks/>
-            </p:cNvCxnSpPr>
-            <p:nvPr/>
-          </p:nvCxnSpPr>
-          <p:spPr>
-            <a:xfrm>
-              <a:off x="633452" y="4657807"/>
-              <a:ext cx="5734097" cy="0"/>
-            </a:xfrm>
-            <a:prstGeom prst="line">
-              <a:avLst/>
-            </a:prstGeom>
-            <a:ln>
-              <a:solidFill>
-                <a:schemeClr val="tx1"/>
-              </a:solidFill>
-            </a:ln>
-          </p:spPr>
-          <p:style>
-            <a:lnRef idx="1">
-              <a:schemeClr val="accent1"/>
-            </a:lnRef>
-            <a:fillRef idx="0">
-              <a:schemeClr val="accent1"/>
-            </a:fillRef>
-            <a:effectRef idx="0">
-              <a:schemeClr val="accent1"/>
-            </a:effectRef>
-            <a:fontRef idx="minor">
-              <a:schemeClr val="tx1"/>
-            </a:fontRef>
-          </p:style>
-        </p:cxnSp>
-        <p:cxnSp>
-          <p:nvCxnSpPr>
-            <p:cNvPr id="89" name="Straight Connector 88">
-              <a:extLst>
-                <a:ext uri="{FF2B5EF4-FFF2-40B4-BE49-F238E27FC236}">
-                  <a16:creationId xmlns:a16="http://schemas.microsoft.com/office/drawing/2014/main" id="{513FE733-6216-964B-8B09-BEDD95C73BD2}"/>
-                </a:ext>
-              </a:extLst>
-            </p:cNvPr>
-            <p:cNvCxnSpPr>
-              <a:cxnSpLocks/>
-            </p:cNvCxnSpPr>
-            <p:nvPr/>
-          </p:nvCxnSpPr>
-          <p:spPr>
-            <a:xfrm>
-              <a:off x="633452" y="4362705"/>
-              <a:ext cx="5734097" cy="0"/>
-            </a:xfrm>
-            <a:prstGeom prst="line">
-              <a:avLst/>
-            </a:prstGeom>
-            <a:ln>
-              <a:solidFill>
-                <a:schemeClr val="tx1"/>
-              </a:solidFill>
-            </a:ln>
-          </p:spPr>
-          <p:style>
-            <a:lnRef idx="1">
-              <a:schemeClr val="accent1"/>
-            </a:lnRef>
-            <a:fillRef idx="0">
-              <a:schemeClr val="accent1"/>
-            </a:fillRef>
-            <a:effectRef idx="0">
-              <a:schemeClr val="accent1"/>
-            </a:effectRef>
-            <a:fontRef idx="minor">
-              <a:schemeClr val="tx1"/>
-            </a:fontRef>
-          </p:style>
-        </p:cxnSp>
-      </p:grpSp>
-      <p:grpSp>
-        <p:nvGrpSpPr>
-          <p:cNvPr id="90" name="Group 89">
-            <a:extLst>
-              <a:ext uri="{FF2B5EF4-FFF2-40B4-BE49-F238E27FC236}">
-                <a16:creationId xmlns:a16="http://schemas.microsoft.com/office/drawing/2014/main" id="{9E0BFDFB-A67F-074F-AE70-331FBD5F7E77}"/>
-              </a:ext>
-            </a:extLst>
-          </p:cNvPr>
-          <p:cNvGrpSpPr/>
-          <p:nvPr/>
-        </p:nvGrpSpPr>
-        <p:grpSpPr>
-          <a:xfrm>
-            <a:off x="633452" y="7207134"/>
-            <a:ext cx="5734097" cy="1457407"/>
-            <a:chOff x="633452" y="3200400"/>
-            <a:chExt cx="5734097" cy="1457407"/>
-          </a:xfrm>
-        </p:grpSpPr>
-        <p:sp>
-          <p:nvSpPr>
-            <p:cNvPr id="91" name="TextBox 90">
-              <a:extLst>
-                <a:ext uri="{FF2B5EF4-FFF2-40B4-BE49-F238E27FC236}">
-                  <a16:creationId xmlns:a16="http://schemas.microsoft.com/office/drawing/2014/main" id="{8B7A63AF-4C14-1441-A635-631CCF700A4B}"/>
-                </a:ext>
-              </a:extLst>
-            </p:cNvPr>
-            <p:cNvSpPr txBox="1"/>
-            <p:nvPr/>
-          </p:nvSpPr>
-          <p:spPr>
-            <a:xfrm>
-              <a:off x="1047404" y="3200400"/>
-              <a:ext cx="3794760" cy="276999"/>
-            </a:xfrm>
-            <a:prstGeom prst="rect">
-              <a:avLst/>
-            </a:prstGeom>
-            <a:noFill/>
-          </p:spPr>
-          <p:txBody>
-            <a:bodyPr wrap="square" rtlCol="0">
-              <a:spAutoFit/>
-            </a:bodyPr>
-            <a:lstStyle/>
-            <a:p>
-              <a:r>
-                <a:rPr lang="en-GB" sz="1200" dirty="0">
-                  <a:solidFill>
-                    <a:schemeClr val="bg1">
-                      <a:lumMod val="75000"/>
-                    </a:schemeClr>
-                  </a:solidFill>
-                </a:rPr>
-                <a:t>Today I tested ______ and</a:t>
-              </a:r>
-            </a:p>
-          </p:txBody>
-        </p:sp>
-        <p:cxnSp>
-          <p:nvCxnSpPr>
-            <p:cNvPr id="92" name="Straight Connector 91">
-              <a:extLst>
-                <a:ext uri="{FF2B5EF4-FFF2-40B4-BE49-F238E27FC236}">
-                  <a16:creationId xmlns:a16="http://schemas.microsoft.com/office/drawing/2014/main" id="{AE203220-2664-C244-B1D0-0F4FBE0ED6D5}"/>
-                </a:ext>
-              </a:extLst>
-            </p:cNvPr>
-            <p:cNvCxnSpPr>
-              <a:cxnSpLocks/>
-            </p:cNvCxnSpPr>
-            <p:nvPr/>
-          </p:nvCxnSpPr>
-          <p:spPr>
-            <a:xfrm>
-              <a:off x="633452" y="3477399"/>
-              <a:ext cx="5734097" cy="0"/>
-            </a:xfrm>
-            <a:prstGeom prst="line">
-              <a:avLst/>
-            </a:prstGeom>
-            <a:ln>
-              <a:solidFill>
-                <a:schemeClr val="tx1"/>
-              </a:solidFill>
-            </a:ln>
-          </p:spPr>
-          <p:style>
-            <a:lnRef idx="1">
-              <a:schemeClr val="accent1"/>
-            </a:lnRef>
-            <a:fillRef idx="0">
-              <a:schemeClr val="accent1"/>
-            </a:fillRef>
-            <a:effectRef idx="0">
-              <a:schemeClr val="accent1"/>
-            </a:effectRef>
-            <a:fontRef idx="minor">
-              <a:schemeClr val="tx1"/>
-            </a:fontRef>
-          </p:style>
-        </p:cxnSp>
-        <p:cxnSp>
-          <p:nvCxnSpPr>
-            <p:cNvPr id="93" name="Straight Connector 92">
-              <a:extLst>
-                <a:ext uri="{FF2B5EF4-FFF2-40B4-BE49-F238E27FC236}">
-                  <a16:creationId xmlns:a16="http://schemas.microsoft.com/office/drawing/2014/main" id="{8945653C-90A5-3245-822F-3088D74CED99}"/>
-                </a:ext>
-              </a:extLst>
-            </p:cNvPr>
-            <p:cNvCxnSpPr>
-              <a:cxnSpLocks/>
-            </p:cNvCxnSpPr>
-            <p:nvPr/>
-          </p:nvCxnSpPr>
-          <p:spPr>
-            <a:xfrm>
-              <a:off x="633452" y="3772501"/>
-              <a:ext cx="5734097" cy="0"/>
-            </a:xfrm>
-            <a:prstGeom prst="line">
-              <a:avLst/>
-            </a:prstGeom>
-            <a:ln>
-              <a:solidFill>
-                <a:schemeClr val="tx1"/>
-              </a:solidFill>
-            </a:ln>
-          </p:spPr>
-          <p:style>
-            <a:lnRef idx="1">
-              <a:schemeClr val="accent1"/>
-            </a:lnRef>
-            <a:fillRef idx="0">
-              <a:schemeClr val="accent1"/>
-            </a:fillRef>
-            <a:effectRef idx="0">
-              <a:schemeClr val="accent1"/>
-            </a:effectRef>
-            <a:fontRef idx="minor">
-              <a:schemeClr val="tx1"/>
-            </a:fontRef>
-          </p:style>
-        </p:cxnSp>
-        <p:cxnSp>
-          <p:nvCxnSpPr>
-            <p:cNvPr id="94" name="Straight Connector 93">
-              <a:extLst>
-                <a:ext uri="{FF2B5EF4-FFF2-40B4-BE49-F238E27FC236}">
-                  <a16:creationId xmlns:a16="http://schemas.microsoft.com/office/drawing/2014/main" id="{5511C019-C8DB-164C-993E-6DF8C7C561CF}"/>
-                </a:ext>
-              </a:extLst>
-            </p:cNvPr>
-            <p:cNvCxnSpPr>
-              <a:cxnSpLocks/>
-            </p:cNvCxnSpPr>
-            <p:nvPr/>
-          </p:nvCxnSpPr>
-          <p:spPr>
-            <a:xfrm>
-              <a:off x="633452" y="4067603"/>
-              <a:ext cx="5734097" cy="0"/>
-            </a:xfrm>
-            <a:prstGeom prst="line">
-              <a:avLst/>
-            </a:prstGeom>
-            <a:ln>
-              <a:solidFill>
-                <a:schemeClr val="tx1"/>
-              </a:solidFill>
-            </a:ln>
-          </p:spPr>
-          <p:style>
-            <a:lnRef idx="1">
-              <a:schemeClr val="accent1"/>
-            </a:lnRef>
-            <a:fillRef idx="0">
-              <a:schemeClr val="accent1"/>
-            </a:fillRef>
-            <a:effectRef idx="0">
-              <a:schemeClr val="accent1"/>
-            </a:effectRef>
-            <a:fontRef idx="minor">
-              <a:schemeClr val="tx1"/>
-            </a:fontRef>
-          </p:style>
-        </p:cxnSp>
-        <p:cxnSp>
-          <p:nvCxnSpPr>
-            <p:cNvPr id="95" name="Straight Connector 94">
-              <a:extLst>
-                <a:ext uri="{FF2B5EF4-FFF2-40B4-BE49-F238E27FC236}">
-                  <a16:creationId xmlns:a16="http://schemas.microsoft.com/office/drawing/2014/main" id="{73FA85BD-E5C7-8F4D-845D-A6C7F0E5EAE9}"/>
-                </a:ext>
-              </a:extLst>
-            </p:cNvPr>
-            <p:cNvCxnSpPr>
-              <a:cxnSpLocks/>
-            </p:cNvCxnSpPr>
-            <p:nvPr/>
-          </p:nvCxnSpPr>
-          <p:spPr>
-            <a:xfrm>
-              <a:off x="633452" y="4657807"/>
-              <a:ext cx="5734097" cy="0"/>
-            </a:xfrm>
-            <a:prstGeom prst="line">
-              <a:avLst/>
-            </a:prstGeom>
-            <a:ln>
-              <a:solidFill>
-                <a:schemeClr val="tx1"/>
-              </a:solidFill>
-            </a:ln>
-          </p:spPr>
-          <p:style>
-            <a:lnRef idx="1">
-              <a:schemeClr val="accent1"/>
-            </a:lnRef>
-            <a:fillRef idx="0">
-              <a:schemeClr val="accent1"/>
-            </a:fillRef>
-            <a:effectRef idx="0">
-              <a:schemeClr val="accent1"/>
-            </a:effectRef>
-            <a:fontRef idx="minor">
-              <a:schemeClr val="tx1"/>
-            </a:fontRef>
-          </p:style>
-        </p:cxnSp>
-        <p:cxnSp>
-          <p:nvCxnSpPr>
-            <p:cNvPr id="96" name="Straight Connector 95">
-              <a:extLst>
-                <a:ext uri="{FF2B5EF4-FFF2-40B4-BE49-F238E27FC236}">
-                  <a16:creationId xmlns:a16="http://schemas.microsoft.com/office/drawing/2014/main" id="{EDA28E50-4522-C44E-BB3A-A9DEEB032F81}"/>
                 </a:ext>
               </a:extLst>
             </p:cNvPr>
@@ -10834,252 +8402,6 @@
           </a:p>
         </p:txBody>
       </p:sp>
-      <p:grpSp>
-        <p:nvGrpSpPr>
-          <p:cNvPr id="99" name="Group 98">
-            <a:extLst>
-              <a:ext uri="{FF2B5EF4-FFF2-40B4-BE49-F238E27FC236}">
-                <a16:creationId xmlns:a16="http://schemas.microsoft.com/office/drawing/2014/main" id="{40931D85-4EDF-914E-9D37-86DFCDDAFA02}"/>
-              </a:ext>
-            </a:extLst>
-          </p:cNvPr>
-          <p:cNvGrpSpPr/>
-          <p:nvPr/>
-        </p:nvGrpSpPr>
-        <p:grpSpPr>
-          <a:xfrm>
-            <a:off x="2977367" y="1954058"/>
-            <a:ext cx="393444" cy="294517"/>
-            <a:chOff x="5329845" y="1105593"/>
-            <a:chExt cx="721820" cy="540327"/>
-          </a:xfrm>
-        </p:grpSpPr>
-        <p:cxnSp>
-          <p:nvCxnSpPr>
-            <p:cNvPr id="100" name="Straight Connector 99">
-              <a:extLst>
-                <a:ext uri="{FF2B5EF4-FFF2-40B4-BE49-F238E27FC236}">
-                  <a16:creationId xmlns:a16="http://schemas.microsoft.com/office/drawing/2014/main" id="{861937DF-5AF5-4848-AE88-1E1A1EF49A3F}"/>
-                </a:ext>
-              </a:extLst>
-            </p:cNvPr>
-            <p:cNvCxnSpPr>
-              <a:cxnSpLocks/>
-            </p:cNvCxnSpPr>
-            <p:nvPr/>
-          </p:nvCxnSpPr>
-          <p:spPr>
-            <a:xfrm>
-              <a:off x="5444836" y="1105593"/>
-              <a:ext cx="0" cy="540327"/>
-            </a:xfrm>
-            <a:prstGeom prst="line">
-              <a:avLst/>
-            </a:prstGeom>
-            <a:ln w="38100">
-              <a:solidFill>
-                <a:schemeClr val="bg1">
-                  <a:lumMod val="85000"/>
-                </a:schemeClr>
-              </a:solidFill>
-            </a:ln>
-          </p:spPr>
-          <p:style>
-            <a:lnRef idx="1">
-              <a:schemeClr val="accent1"/>
-            </a:lnRef>
-            <a:fillRef idx="0">
-              <a:schemeClr val="accent1"/>
-            </a:fillRef>
-            <a:effectRef idx="0">
-              <a:schemeClr val="accent1"/>
-            </a:effectRef>
-            <a:fontRef idx="minor">
-              <a:schemeClr val="tx1"/>
-            </a:fontRef>
-          </p:style>
-        </p:cxnSp>
-        <p:cxnSp>
-          <p:nvCxnSpPr>
-            <p:cNvPr id="101" name="Straight Connector 100">
-              <a:extLst>
-                <a:ext uri="{FF2B5EF4-FFF2-40B4-BE49-F238E27FC236}">
-                  <a16:creationId xmlns:a16="http://schemas.microsoft.com/office/drawing/2014/main" id="{3A269FF7-FEA7-4640-A6CF-EF10B0285A57}"/>
-                </a:ext>
-              </a:extLst>
-            </p:cNvPr>
-            <p:cNvCxnSpPr>
-              <a:cxnSpLocks/>
-            </p:cNvCxnSpPr>
-            <p:nvPr/>
-          </p:nvCxnSpPr>
-          <p:spPr>
-            <a:xfrm>
-              <a:off x="5597236" y="1105593"/>
-              <a:ext cx="0" cy="540327"/>
-            </a:xfrm>
-            <a:prstGeom prst="line">
-              <a:avLst/>
-            </a:prstGeom>
-            <a:ln w="38100">
-              <a:solidFill>
-                <a:schemeClr val="bg1">
-                  <a:lumMod val="85000"/>
-                </a:schemeClr>
-              </a:solidFill>
-            </a:ln>
-          </p:spPr>
-          <p:style>
-            <a:lnRef idx="1">
-              <a:schemeClr val="accent1"/>
-            </a:lnRef>
-            <a:fillRef idx="0">
-              <a:schemeClr val="accent1"/>
-            </a:fillRef>
-            <a:effectRef idx="0">
-              <a:schemeClr val="accent1"/>
-            </a:effectRef>
-            <a:fontRef idx="minor">
-              <a:schemeClr val="tx1"/>
-            </a:fontRef>
-          </p:style>
-        </p:cxnSp>
-        <p:cxnSp>
-          <p:nvCxnSpPr>
-            <p:cNvPr id="102" name="Straight Connector 101">
-              <a:extLst>
-                <a:ext uri="{FF2B5EF4-FFF2-40B4-BE49-F238E27FC236}">
-                  <a16:creationId xmlns:a16="http://schemas.microsoft.com/office/drawing/2014/main" id="{40674E3E-22CC-B449-8E60-C6077E86C01E}"/>
-                </a:ext>
-              </a:extLst>
-            </p:cNvPr>
-            <p:cNvCxnSpPr>
-              <a:cxnSpLocks/>
-            </p:cNvCxnSpPr>
-            <p:nvPr/>
-          </p:nvCxnSpPr>
-          <p:spPr>
-            <a:xfrm>
-              <a:off x="5749636" y="1105593"/>
-              <a:ext cx="0" cy="540327"/>
-            </a:xfrm>
-            <a:prstGeom prst="line">
-              <a:avLst/>
-            </a:prstGeom>
-            <a:ln w="38100">
-              <a:solidFill>
-                <a:schemeClr val="bg1">
-                  <a:lumMod val="85000"/>
-                </a:schemeClr>
-              </a:solidFill>
-            </a:ln>
-          </p:spPr>
-          <p:style>
-            <a:lnRef idx="1">
-              <a:schemeClr val="accent1"/>
-            </a:lnRef>
-            <a:fillRef idx="0">
-              <a:schemeClr val="accent1"/>
-            </a:fillRef>
-            <a:effectRef idx="0">
-              <a:schemeClr val="accent1"/>
-            </a:effectRef>
-            <a:fontRef idx="minor">
-              <a:schemeClr val="tx1"/>
-            </a:fontRef>
-          </p:style>
-        </p:cxnSp>
-        <p:cxnSp>
-          <p:nvCxnSpPr>
-            <p:cNvPr id="103" name="Straight Connector 102">
-              <a:extLst>
-                <a:ext uri="{FF2B5EF4-FFF2-40B4-BE49-F238E27FC236}">
-                  <a16:creationId xmlns:a16="http://schemas.microsoft.com/office/drawing/2014/main" id="{058D1706-7180-954D-9248-FCFD973B291C}"/>
-                </a:ext>
-              </a:extLst>
-            </p:cNvPr>
-            <p:cNvCxnSpPr>
-              <a:cxnSpLocks/>
-            </p:cNvCxnSpPr>
-            <p:nvPr/>
-          </p:nvCxnSpPr>
-          <p:spPr>
-            <a:xfrm>
-              <a:off x="5902036" y="1105593"/>
-              <a:ext cx="0" cy="540327"/>
-            </a:xfrm>
-            <a:prstGeom prst="line">
-              <a:avLst/>
-            </a:prstGeom>
-            <a:ln w="38100">
-              <a:solidFill>
-                <a:schemeClr val="bg1">
-                  <a:lumMod val="85000"/>
-                </a:schemeClr>
-              </a:solidFill>
-            </a:ln>
-          </p:spPr>
-          <p:style>
-            <a:lnRef idx="1">
-              <a:schemeClr val="accent1"/>
-            </a:lnRef>
-            <a:fillRef idx="0">
-              <a:schemeClr val="accent1"/>
-            </a:fillRef>
-            <a:effectRef idx="0">
-              <a:schemeClr val="accent1"/>
-            </a:effectRef>
-            <a:fontRef idx="minor">
-              <a:schemeClr val="tx1"/>
-            </a:fontRef>
-          </p:style>
-        </p:cxnSp>
-        <p:cxnSp>
-          <p:nvCxnSpPr>
-            <p:cNvPr id="104" name="Straight Connector 103">
-              <a:extLst>
-                <a:ext uri="{FF2B5EF4-FFF2-40B4-BE49-F238E27FC236}">
-                  <a16:creationId xmlns:a16="http://schemas.microsoft.com/office/drawing/2014/main" id="{537E8617-DDDC-3846-BBC5-F4A66E5A3D6D}"/>
-                </a:ext>
-              </a:extLst>
-            </p:cNvPr>
-            <p:cNvCxnSpPr>
-              <a:cxnSpLocks/>
-            </p:cNvCxnSpPr>
-            <p:nvPr/>
-          </p:nvCxnSpPr>
-          <p:spPr>
-            <a:xfrm flipH="1">
-              <a:off x="5329845" y="1215444"/>
-              <a:ext cx="721820" cy="430476"/>
-            </a:xfrm>
-            <a:prstGeom prst="line">
-              <a:avLst/>
-            </a:prstGeom>
-            <a:ln w="38100">
-              <a:solidFill>
-                <a:schemeClr val="bg1">
-                  <a:lumMod val="85000"/>
-                </a:schemeClr>
-              </a:solidFill>
-            </a:ln>
-          </p:spPr>
-          <p:style>
-            <a:lnRef idx="1">
-              <a:schemeClr val="accent1"/>
-            </a:lnRef>
-            <a:fillRef idx="0">
-              <a:schemeClr val="accent1"/>
-            </a:fillRef>
-            <a:effectRef idx="0">
-              <a:schemeClr val="accent1"/>
-            </a:effectRef>
-            <a:fontRef idx="minor">
-              <a:schemeClr val="tx1"/>
-            </a:fontRef>
-          </p:style>
-        </p:cxnSp>
-      </p:grpSp>
       <p:sp>
         <p:nvSpPr>
           <p:cNvPr id="105" name="TextBox 104">
@@ -11129,7 +8451,7 @@
         </p:nvSpPr>
         <p:spPr>
           <a:xfrm>
-            <a:off x="3382903" y="1078278"/>
+            <a:off x="3586103" y="1078278"/>
             <a:ext cx="169830" cy="169830"/>
           </a:xfrm>
           <a:prstGeom prst="rect">
@@ -11181,7 +8503,7 @@
         </p:nvSpPr>
         <p:spPr>
           <a:xfrm>
-            <a:off x="3330620" y="952957"/>
+            <a:off x="3533820" y="952957"/>
             <a:ext cx="490451" cy="369332"/>
           </a:xfrm>
           <a:prstGeom prst="rect">
@@ -11208,10 +8530,727 @@
           </a:p>
         </p:txBody>
       </p:sp>
+      <p:sp>
+        <p:nvSpPr>
+          <p:cNvPr id="29" name="TextBox 28">
+            <a:extLst>
+              <a:ext uri="{FF2B5EF4-FFF2-40B4-BE49-F238E27FC236}">
+                <a16:creationId xmlns:a16="http://schemas.microsoft.com/office/drawing/2014/main" id="{48AE2099-CF8C-E847-B5E4-28F6585550FC}"/>
+              </a:ext>
+            </a:extLst>
+          </p:cNvPr>
+          <p:cNvSpPr txBox="1"/>
+          <p:nvPr/>
+        </p:nvSpPr>
+        <p:spPr>
+          <a:xfrm>
+            <a:off x="922713" y="6523487"/>
+            <a:ext cx="5128952" cy="369332"/>
+          </a:xfrm>
+          <a:prstGeom prst="rect">
+            <a:avLst/>
+          </a:prstGeom>
+          <a:noFill/>
+        </p:spPr>
+        <p:txBody>
+          <a:bodyPr wrap="square" rtlCol="0">
+            <a:spAutoFit/>
+          </a:bodyPr>
+          <a:lstStyle/>
+          <a:p>
+            <a:r>
+              <a:rPr lang="en-GB" dirty="0"/>
+              <a:t>Problems when I tried testing:</a:t>
+            </a:r>
+          </a:p>
+        </p:txBody>
+      </p:sp>
+      <p:sp>
+        <p:nvSpPr>
+          <p:cNvPr id="49" name="TextBox 48">
+            <a:extLst>
+              <a:ext uri="{FF2B5EF4-FFF2-40B4-BE49-F238E27FC236}">
+                <a16:creationId xmlns:a16="http://schemas.microsoft.com/office/drawing/2014/main" id="{BAD5489C-7452-C847-9D6F-8EB41894DC05}"/>
+              </a:ext>
+            </a:extLst>
+          </p:cNvPr>
+          <p:cNvSpPr txBox="1"/>
+          <p:nvPr/>
+        </p:nvSpPr>
+        <p:spPr>
+          <a:xfrm>
+            <a:off x="922713" y="1374927"/>
+            <a:ext cx="5128952" cy="369332"/>
+          </a:xfrm>
+          <a:prstGeom prst="rect">
+            <a:avLst/>
+          </a:prstGeom>
+          <a:noFill/>
+        </p:spPr>
+        <p:txBody>
+          <a:bodyPr wrap="square" rtlCol="0">
+            <a:spAutoFit/>
+          </a:bodyPr>
+          <a:lstStyle/>
+          <a:p>
+            <a:r>
+              <a:rPr lang="en-GB" dirty="0"/>
+              <a:t>Watch Peel &amp; Slice Videos: </a:t>
+            </a:r>
+          </a:p>
+        </p:txBody>
+      </p:sp>
+      <p:sp>
+        <p:nvSpPr>
+          <p:cNvPr id="50" name="Rectangle 49">
+            <a:extLst>
+              <a:ext uri="{FF2B5EF4-FFF2-40B4-BE49-F238E27FC236}">
+                <a16:creationId xmlns:a16="http://schemas.microsoft.com/office/drawing/2014/main" id="{B7076214-61FF-D94C-A5D2-669598654C21}"/>
+              </a:ext>
+            </a:extLst>
+          </p:cNvPr>
+          <p:cNvSpPr/>
+          <p:nvPr/>
+        </p:nvSpPr>
+        <p:spPr>
+          <a:xfrm>
+            <a:off x="3586103" y="1491935"/>
+            <a:ext cx="169830" cy="169830"/>
+          </a:xfrm>
+          <a:prstGeom prst="rect">
+            <a:avLst/>
+          </a:prstGeom>
+          <a:noFill/>
+          <a:ln w="19050">
+            <a:solidFill>
+              <a:schemeClr val="tx1"/>
+            </a:solidFill>
+          </a:ln>
+        </p:spPr>
+        <p:style>
+          <a:lnRef idx="2">
+            <a:schemeClr val="accent1">
+              <a:shade val="50000"/>
+            </a:schemeClr>
+          </a:lnRef>
+          <a:fillRef idx="1">
+            <a:schemeClr val="accent1"/>
+          </a:fillRef>
+          <a:effectRef idx="0">
+            <a:schemeClr val="accent1"/>
+          </a:effectRef>
+          <a:fontRef idx="minor">
+            <a:schemeClr val="lt1"/>
+          </a:fontRef>
+        </p:style>
+        <p:txBody>
+          <a:bodyPr rtlCol="0" anchor="ctr"/>
+          <a:lstStyle/>
+          <a:p>
+            <a:pPr algn="ctr"/>
+            <a:endParaRPr lang="en-GB"/>
+          </a:p>
+        </p:txBody>
+      </p:sp>
+      <p:sp>
+        <p:nvSpPr>
+          <p:cNvPr id="51" name="TextBox 50">
+            <a:extLst>
+              <a:ext uri="{FF2B5EF4-FFF2-40B4-BE49-F238E27FC236}">
+                <a16:creationId xmlns:a16="http://schemas.microsoft.com/office/drawing/2014/main" id="{72879322-68A7-EA4F-A796-721CEF72039D}"/>
+              </a:ext>
+            </a:extLst>
+          </p:cNvPr>
+          <p:cNvSpPr txBox="1"/>
+          <p:nvPr/>
+        </p:nvSpPr>
+        <p:spPr>
+          <a:xfrm>
+            <a:off x="3533820" y="1366614"/>
+            <a:ext cx="490451" cy="369332"/>
+          </a:xfrm>
+          <a:prstGeom prst="rect">
+            <a:avLst/>
+          </a:prstGeom>
+          <a:noFill/>
+        </p:spPr>
+        <p:txBody>
+          <a:bodyPr wrap="square" rtlCol="0">
+            <a:spAutoFit/>
+          </a:bodyPr>
+          <a:lstStyle/>
+          <a:p>
+            <a:r>
+              <a:rPr lang="en-GB" dirty="0">
+                <a:solidFill>
+                  <a:schemeClr val="bg1">
+                    <a:lumMod val="75000"/>
+                  </a:schemeClr>
+                </a:solidFill>
+              </a:rPr>
+              <a:t>✓</a:t>
+            </a:r>
+          </a:p>
+        </p:txBody>
+      </p:sp>
+      <p:grpSp>
+        <p:nvGrpSpPr>
+          <p:cNvPr id="52" name="Group 51">
+            <a:extLst>
+              <a:ext uri="{FF2B5EF4-FFF2-40B4-BE49-F238E27FC236}">
+                <a16:creationId xmlns:a16="http://schemas.microsoft.com/office/drawing/2014/main" id="{B03E1AB5-5238-4D47-934E-E3D067B308AE}"/>
+              </a:ext>
+            </a:extLst>
+          </p:cNvPr>
+          <p:cNvGrpSpPr/>
+          <p:nvPr/>
+        </p:nvGrpSpPr>
+        <p:grpSpPr>
+          <a:xfrm>
+            <a:off x="633452" y="7040369"/>
+            <a:ext cx="5734097" cy="1457407"/>
+            <a:chOff x="633452" y="3200400"/>
+            <a:chExt cx="5734097" cy="1457407"/>
+          </a:xfrm>
+        </p:grpSpPr>
+        <p:sp>
+          <p:nvSpPr>
+            <p:cNvPr id="53" name="TextBox 52">
+              <a:extLst>
+                <a:ext uri="{FF2B5EF4-FFF2-40B4-BE49-F238E27FC236}">
+                  <a16:creationId xmlns:a16="http://schemas.microsoft.com/office/drawing/2014/main" id="{FDBC9E04-9B22-3440-B36A-4E044E7A8D25}"/>
+                </a:ext>
+              </a:extLst>
+            </p:cNvPr>
+            <p:cNvSpPr txBox="1"/>
+            <p:nvPr/>
+          </p:nvSpPr>
+          <p:spPr>
+            <a:xfrm>
+              <a:off x="1047404" y="3200400"/>
+              <a:ext cx="3794760" cy="276999"/>
+            </a:xfrm>
+            <a:prstGeom prst="rect">
+              <a:avLst/>
+            </a:prstGeom>
+            <a:noFill/>
+          </p:spPr>
+          <p:txBody>
+            <a:bodyPr wrap="square" rtlCol="0">
+              <a:spAutoFit/>
+            </a:bodyPr>
+            <a:lstStyle/>
+            <a:p>
+              <a:r>
+                <a:rPr lang="en-GB" sz="1200" dirty="0">
+                  <a:solidFill>
+                    <a:schemeClr val="bg1">
+                      <a:lumMod val="75000"/>
+                    </a:schemeClr>
+                  </a:solidFill>
+                </a:rPr>
+                <a:t>method2: I couldn’t …</a:t>
+              </a:r>
+            </a:p>
+          </p:txBody>
+        </p:sp>
+        <p:cxnSp>
+          <p:nvCxnSpPr>
+            <p:cNvPr id="54" name="Straight Connector 53">
+              <a:extLst>
+                <a:ext uri="{FF2B5EF4-FFF2-40B4-BE49-F238E27FC236}">
+                  <a16:creationId xmlns:a16="http://schemas.microsoft.com/office/drawing/2014/main" id="{771D1C76-450E-624E-BF96-570F8C256B56}"/>
+                </a:ext>
+              </a:extLst>
+            </p:cNvPr>
+            <p:cNvCxnSpPr>
+              <a:cxnSpLocks/>
+            </p:cNvCxnSpPr>
+            <p:nvPr/>
+          </p:nvCxnSpPr>
+          <p:spPr>
+            <a:xfrm>
+              <a:off x="633452" y="3477399"/>
+              <a:ext cx="5734097" cy="0"/>
+            </a:xfrm>
+            <a:prstGeom prst="line">
+              <a:avLst/>
+            </a:prstGeom>
+            <a:ln>
+              <a:solidFill>
+                <a:schemeClr val="tx1"/>
+              </a:solidFill>
+            </a:ln>
+          </p:spPr>
+          <p:style>
+            <a:lnRef idx="1">
+              <a:schemeClr val="accent1"/>
+            </a:lnRef>
+            <a:fillRef idx="0">
+              <a:schemeClr val="accent1"/>
+            </a:fillRef>
+            <a:effectRef idx="0">
+              <a:schemeClr val="accent1"/>
+            </a:effectRef>
+            <a:fontRef idx="minor">
+              <a:schemeClr val="tx1"/>
+            </a:fontRef>
+          </p:style>
+        </p:cxnSp>
+        <p:cxnSp>
+          <p:nvCxnSpPr>
+            <p:cNvPr id="55" name="Straight Connector 54">
+              <a:extLst>
+                <a:ext uri="{FF2B5EF4-FFF2-40B4-BE49-F238E27FC236}">
+                  <a16:creationId xmlns:a16="http://schemas.microsoft.com/office/drawing/2014/main" id="{E74466BE-460A-5B4A-B5A9-4CE5CCCDEF38}"/>
+                </a:ext>
+              </a:extLst>
+            </p:cNvPr>
+            <p:cNvCxnSpPr>
+              <a:cxnSpLocks/>
+            </p:cNvCxnSpPr>
+            <p:nvPr/>
+          </p:nvCxnSpPr>
+          <p:spPr>
+            <a:xfrm>
+              <a:off x="633452" y="3772501"/>
+              <a:ext cx="5734097" cy="0"/>
+            </a:xfrm>
+            <a:prstGeom prst="line">
+              <a:avLst/>
+            </a:prstGeom>
+            <a:ln>
+              <a:solidFill>
+                <a:schemeClr val="tx1"/>
+              </a:solidFill>
+            </a:ln>
+          </p:spPr>
+          <p:style>
+            <a:lnRef idx="1">
+              <a:schemeClr val="accent1"/>
+            </a:lnRef>
+            <a:fillRef idx="0">
+              <a:schemeClr val="accent1"/>
+            </a:fillRef>
+            <a:effectRef idx="0">
+              <a:schemeClr val="accent1"/>
+            </a:effectRef>
+            <a:fontRef idx="minor">
+              <a:schemeClr val="tx1"/>
+            </a:fontRef>
+          </p:style>
+        </p:cxnSp>
+        <p:cxnSp>
+          <p:nvCxnSpPr>
+            <p:cNvPr id="56" name="Straight Connector 55">
+              <a:extLst>
+                <a:ext uri="{FF2B5EF4-FFF2-40B4-BE49-F238E27FC236}">
+                  <a16:creationId xmlns:a16="http://schemas.microsoft.com/office/drawing/2014/main" id="{C408790F-069A-E64B-964D-3C251C6475E1}"/>
+                </a:ext>
+              </a:extLst>
+            </p:cNvPr>
+            <p:cNvCxnSpPr>
+              <a:cxnSpLocks/>
+            </p:cNvCxnSpPr>
+            <p:nvPr/>
+          </p:nvCxnSpPr>
+          <p:spPr>
+            <a:xfrm>
+              <a:off x="633452" y="4067603"/>
+              <a:ext cx="5734097" cy="0"/>
+            </a:xfrm>
+            <a:prstGeom prst="line">
+              <a:avLst/>
+            </a:prstGeom>
+            <a:ln>
+              <a:solidFill>
+                <a:schemeClr val="tx1"/>
+              </a:solidFill>
+            </a:ln>
+          </p:spPr>
+          <p:style>
+            <a:lnRef idx="1">
+              <a:schemeClr val="accent1"/>
+            </a:lnRef>
+            <a:fillRef idx="0">
+              <a:schemeClr val="accent1"/>
+            </a:fillRef>
+            <a:effectRef idx="0">
+              <a:schemeClr val="accent1"/>
+            </a:effectRef>
+            <a:fontRef idx="minor">
+              <a:schemeClr val="tx1"/>
+            </a:fontRef>
+          </p:style>
+        </p:cxnSp>
+        <p:cxnSp>
+          <p:nvCxnSpPr>
+            <p:cNvPr id="57" name="Straight Connector 56">
+              <a:extLst>
+                <a:ext uri="{FF2B5EF4-FFF2-40B4-BE49-F238E27FC236}">
+                  <a16:creationId xmlns:a16="http://schemas.microsoft.com/office/drawing/2014/main" id="{F6858FE5-1603-E447-A5EA-F1D68836EE2D}"/>
+                </a:ext>
+              </a:extLst>
+            </p:cNvPr>
+            <p:cNvCxnSpPr>
+              <a:cxnSpLocks/>
+            </p:cNvCxnSpPr>
+            <p:nvPr/>
+          </p:nvCxnSpPr>
+          <p:spPr>
+            <a:xfrm>
+              <a:off x="633452" y="4657807"/>
+              <a:ext cx="5734097" cy="0"/>
+            </a:xfrm>
+            <a:prstGeom prst="line">
+              <a:avLst/>
+            </a:prstGeom>
+            <a:ln>
+              <a:solidFill>
+                <a:schemeClr val="tx1"/>
+              </a:solidFill>
+            </a:ln>
+          </p:spPr>
+          <p:style>
+            <a:lnRef idx="1">
+              <a:schemeClr val="accent1"/>
+            </a:lnRef>
+            <a:fillRef idx="0">
+              <a:schemeClr val="accent1"/>
+            </a:fillRef>
+            <a:effectRef idx="0">
+              <a:schemeClr val="accent1"/>
+            </a:effectRef>
+            <a:fontRef idx="minor">
+              <a:schemeClr val="tx1"/>
+            </a:fontRef>
+          </p:style>
+        </p:cxnSp>
+        <p:cxnSp>
+          <p:nvCxnSpPr>
+            <p:cNvPr id="58" name="Straight Connector 57">
+              <a:extLst>
+                <a:ext uri="{FF2B5EF4-FFF2-40B4-BE49-F238E27FC236}">
+                  <a16:creationId xmlns:a16="http://schemas.microsoft.com/office/drawing/2014/main" id="{C9BDA8F8-2726-4F49-9F58-690297C9940A}"/>
+                </a:ext>
+              </a:extLst>
+            </p:cNvPr>
+            <p:cNvCxnSpPr>
+              <a:cxnSpLocks/>
+            </p:cNvCxnSpPr>
+            <p:nvPr/>
+          </p:nvCxnSpPr>
+          <p:spPr>
+            <a:xfrm>
+              <a:off x="633452" y="4362705"/>
+              <a:ext cx="5734097" cy="0"/>
+            </a:xfrm>
+            <a:prstGeom prst="line">
+              <a:avLst/>
+            </a:prstGeom>
+            <a:ln>
+              <a:solidFill>
+                <a:schemeClr val="tx1"/>
+              </a:solidFill>
+            </a:ln>
+          </p:spPr>
+          <p:style>
+            <a:lnRef idx="1">
+              <a:schemeClr val="accent1"/>
+            </a:lnRef>
+            <a:fillRef idx="0">
+              <a:schemeClr val="accent1"/>
+            </a:fillRef>
+            <a:effectRef idx="0">
+              <a:schemeClr val="accent1"/>
+            </a:effectRef>
+            <a:fontRef idx="minor">
+              <a:schemeClr val="tx1"/>
+            </a:fontRef>
+          </p:style>
+        </p:cxnSp>
+      </p:grpSp>
+      <p:grpSp>
+        <p:nvGrpSpPr>
+          <p:cNvPr id="59" name="Group 58">
+            <a:extLst>
+              <a:ext uri="{FF2B5EF4-FFF2-40B4-BE49-F238E27FC236}">
+                <a16:creationId xmlns:a16="http://schemas.microsoft.com/office/drawing/2014/main" id="{EE80CA4F-B584-F84E-B0DF-A875554A7361}"/>
+              </a:ext>
+            </a:extLst>
+          </p:cNvPr>
+          <p:cNvGrpSpPr/>
+          <p:nvPr/>
+        </p:nvGrpSpPr>
+        <p:grpSpPr>
+          <a:xfrm>
+            <a:off x="633452" y="4494019"/>
+            <a:ext cx="5734097" cy="1457407"/>
+            <a:chOff x="633452" y="3200400"/>
+            <a:chExt cx="5734097" cy="1457407"/>
+          </a:xfrm>
+        </p:grpSpPr>
+        <p:sp>
+          <p:nvSpPr>
+            <p:cNvPr id="60" name="TextBox 59">
+              <a:extLst>
+                <a:ext uri="{FF2B5EF4-FFF2-40B4-BE49-F238E27FC236}">
+                  <a16:creationId xmlns:a16="http://schemas.microsoft.com/office/drawing/2014/main" id="{D15EAF35-2F6B-FE4E-9A7A-5A01045BA828}"/>
+                </a:ext>
+              </a:extLst>
+            </p:cNvPr>
+            <p:cNvSpPr txBox="1"/>
+            <p:nvPr/>
+          </p:nvSpPr>
+          <p:spPr>
+            <a:xfrm>
+              <a:off x="1047404" y="3200400"/>
+              <a:ext cx="3794760" cy="276999"/>
+            </a:xfrm>
+            <a:prstGeom prst="rect">
+              <a:avLst/>
+            </a:prstGeom>
+            <a:noFill/>
+          </p:spPr>
+          <p:txBody>
+            <a:bodyPr wrap="square" rtlCol="0">
+              <a:spAutoFit/>
+            </a:bodyPr>
+            <a:lstStyle/>
+            <a:p>
+              <a:r>
+                <a:rPr lang="en-GB" sz="1200" dirty="0">
+                  <a:solidFill>
+                    <a:schemeClr val="bg1">
+                      <a:lumMod val="75000"/>
+                    </a:schemeClr>
+                  </a:solidFill>
+                </a:rPr>
+                <a:t>method1: easy</a:t>
+              </a:r>
+            </a:p>
+          </p:txBody>
+        </p:sp>
+        <p:cxnSp>
+          <p:nvCxnSpPr>
+            <p:cNvPr id="61" name="Straight Connector 60">
+              <a:extLst>
+                <a:ext uri="{FF2B5EF4-FFF2-40B4-BE49-F238E27FC236}">
+                  <a16:creationId xmlns:a16="http://schemas.microsoft.com/office/drawing/2014/main" id="{ADC0CD94-4557-2549-9ED4-F28769ABB041}"/>
+                </a:ext>
+              </a:extLst>
+            </p:cNvPr>
+            <p:cNvCxnSpPr>
+              <a:cxnSpLocks/>
+            </p:cNvCxnSpPr>
+            <p:nvPr/>
+          </p:nvCxnSpPr>
+          <p:spPr>
+            <a:xfrm>
+              <a:off x="633452" y="3477399"/>
+              <a:ext cx="5734097" cy="0"/>
+            </a:xfrm>
+            <a:prstGeom prst="line">
+              <a:avLst/>
+            </a:prstGeom>
+            <a:ln>
+              <a:solidFill>
+                <a:schemeClr val="tx1"/>
+              </a:solidFill>
+            </a:ln>
+          </p:spPr>
+          <p:style>
+            <a:lnRef idx="1">
+              <a:schemeClr val="accent1"/>
+            </a:lnRef>
+            <a:fillRef idx="0">
+              <a:schemeClr val="accent1"/>
+            </a:fillRef>
+            <a:effectRef idx="0">
+              <a:schemeClr val="accent1"/>
+            </a:effectRef>
+            <a:fontRef idx="minor">
+              <a:schemeClr val="tx1"/>
+            </a:fontRef>
+          </p:style>
+        </p:cxnSp>
+        <p:cxnSp>
+          <p:nvCxnSpPr>
+            <p:cNvPr id="62" name="Straight Connector 61">
+              <a:extLst>
+                <a:ext uri="{FF2B5EF4-FFF2-40B4-BE49-F238E27FC236}">
+                  <a16:creationId xmlns:a16="http://schemas.microsoft.com/office/drawing/2014/main" id="{DF48B284-EB31-1043-995A-193C99C0ECCF}"/>
+                </a:ext>
+              </a:extLst>
+            </p:cNvPr>
+            <p:cNvCxnSpPr>
+              <a:cxnSpLocks/>
+            </p:cNvCxnSpPr>
+            <p:nvPr/>
+          </p:nvCxnSpPr>
+          <p:spPr>
+            <a:xfrm>
+              <a:off x="633452" y="3772501"/>
+              <a:ext cx="5734097" cy="0"/>
+            </a:xfrm>
+            <a:prstGeom prst="line">
+              <a:avLst/>
+            </a:prstGeom>
+            <a:ln>
+              <a:solidFill>
+                <a:schemeClr val="tx1"/>
+              </a:solidFill>
+            </a:ln>
+          </p:spPr>
+          <p:style>
+            <a:lnRef idx="1">
+              <a:schemeClr val="accent1"/>
+            </a:lnRef>
+            <a:fillRef idx="0">
+              <a:schemeClr val="accent1"/>
+            </a:fillRef>
+            <a:effectRef idx="0">
+              <a:schemeClr val="accent1"/>
+            </a:effectRef>
+            <a:fontRef idx="minor">
+              <a:schemeClr val="tx1"/>
+            </a:fontRef>
+          </p:style>
+        </p:cxnSp>
+        <p:cxnSp>
+          <p:nvCxnSpPr>
+            <p:cNvPr id="63" name="Straight Connector 62">
+              <a:extLst>
+                <a:ext uri="{FF2B5EF4-FFF2-40B4-BE49-F238E27FC236}">
+                  <a16:creationId xmlns:a16="http://schemas.microsoft.com/office/drawing/2014/main" id="{55E7B53B-2646-3947-98AE-0739969D3A7B}"/>
+                </a:ext>
+              </a:extLst>
+            </p:cNvPr>
+            <p:cNvCxnSpPr>
+              <a:cxnSpLocks/>
+            </p:cNvCxnSpPr>
+            <p:nvPr/>
+          </p:nvCxnSpPr>
+          <p:spPr>
+            <a:xfrm>
+              <a:off x="633452" y="4067603"/>
+              <a:ext cx="5734097" cy="0"/>
+            </a:xfrm>
+            <a:prstGeom prst="line">
+              <a:avLst/>
+            </a:prstGeom>
+            <a:ln>
+              <a:solidFill>
+                <a:schemeClr val="tx1"/>
+              </a:solidFill>
+            </a:ln>
+          </p:spPr>
+          <p:style>
+            <a:lnRef idx="1">
+              <a:schemeClr val="accent1"/>
+            </a:lnRef>
+            <a:fillRef idx="0">
+              <a:schemeClr val="accent1"/>
+            </a:fillRef>
+            <a:effectRef idx="0">
+              <a:schemeClr val="accent1"/>
+            </a:effectRef>
+            <a:fontRef idx="minor">
+              <a:schemeClr val="tx1"/>
+            </a:fontRef>
+          </p:style>
+        </p:cxnSp>
+        <p:cxnSp>
+          <p:nvCxnSpPr>
+            <p:cNvPr id="64" name="Straight Connector 63">
+              <a:extLst>
+                <a:ext uri="{FF2B5EF4-FFF2-40B4-BE49-F238E27FC236}">
+                  <a16:creationId xmlns:a16="http://schemas.microsoft.com/office/drawing/2014/main" id="{32AC2788-8392-D541-B50E-DE5E9E730400}"/>
+                </a:ext>
+              </a:extLst>
+            </p:cNvPr>
+            <p:cNvCxnSpPr>
+              <a:cxnSpLocks/>
+            </p:cNvCxnSpPr>
+            <p:nvPr/>
+          </p:nvCxnSpPr>
+          <p:spPr>
+            <a:xfrm>
+              <a:off x="633452" y="4657807"/>
+              <a:ext cx="5734097" cy="0"/>
+            </a:xfrm>
+            <a:prstGeom prst="line">
+              <a:avLst/>
+            </a:prstGeom>
+            <a:ln>
+              <a:solidFill>
+                <a:schemeClr val="tx1"/>
+              </a:solidFill>
+            </a:ln>
+          </p:spPr>
+          <p:style>
+            <a:lnRef idx="1">
+              <a:schemeClr val="accent1"/>
+            </a:lnRef>
+            <a:fillRef idx="0">
+              <a:schemeClr val="accent1"/>
+            </a:fillRef>
+            <a:effectRef idx="0">
+              <a:schemeClr val="accent1"/>
+            </a:effectRef>
+            <a:fontRef idx="minor">
+              <a:schemeClr val="tx1"/>
+            </a:fontRef>
+          </p:style>
+        </p:cxnSp>
+        <p:cxnSp>
+          <p:nvCxnSpPr>
+            <p:cNvPr id="65" name="Straight Connector 64">
+              <a:extLst>
+                <a:ext uri="{FF2B5EF4-FFF2-40B4-BE49-F238E27FC236}">
+                  <a16:creationId xmlns:a16="http://schemas.microsoft.com/office/drawing/2014/main" id="{5A5138A7-D5A0-2C4F-8B54-6F38C9F8067C}"/>
+                </a:ext>
+              </a:extLst>
+            </p:cNvPr>
+            <p:cNvCxnSpPr>
+              <a:cxnSpLocks/>
+            </p:cNvCxnSpPr>
+            <p:nvPr/>
+          </p:nvCxnSpPr>
+          <p:spPr>
+            <a:xfrm>
+              <a:off x="633452" y="4362705"/>
+              <a:ext cx="5734097" cy="0"/>
+            </a:xfrm>
+            <a:prstGeom prst="line">
+              <a:avLst/>
+            </a:prstGeom>
+            <a:ln>
+              <a:solidFill>
+                <a:schemeClr val="tx1"/>
+              </a:solidFill>
+            </a:ln>
+          </p:spPr>
+          <p:style>
+            <a:lnRef idx="1">
+              <a:schemeClr val="accent1"/>
+            </a:lnRef>
+            <a:fillRef idx="0">
+              <a:schemeClr val="accent1"/>
+            </a:fillRef>
+            <a:effectRef idx="0">
+              <a:schemeClr val="accent1"/>
+            </a:effectRef>
+            <a:fontRef idx="minor">
+              <a:schemeClr val="tx1"/>
+            </a:fontRef>
+          </p:style>
+        </p:cxnSp>
+      </p:grpSp>
     </p:spTree>
     <p:extLst>
       <p:ext uri="{BB962C8B-B14F-4D97-AF65-F5344CB8AC3E}">
-        <p14:creationId xmlns:p14="http://schemas.microsoft.com/office/powerpoint/2010/main" val="430857155"/>
+        <p14:creationId xmlns:p14="http://schemas.microsoft.com/office/powerpoint/2010/main" val="3081273035"/>
       </p:ext>
     </p:extLst>
   </p:cSld>

</xml_diff>

<commit_message>
Split up weeks 3 & 4 - add URL to homework
</commit_message>
<xml_diff>
--- a/Homework Printouts.pptx
+++ b/Homework Printouts.pptx
@@ -245,7 +245,7 @@
           <a:p>
             <a:fld id="{9BAD008B-C58F-DC47-9BDF-ACF9484DF185}" type="datetimeFigureOut">
               <a:rPr lang="en-GB" smtClean="0"/>
-              <a:t>05/11/2020</a:t>
+              <a:t>16/11/2020</a:t>
             </a:fld>
             <a:endParaRPr lang="en-GB"/>
           </a:p>
@@ -415,7 +415,7 @@
           <a:p>
             <a:fld id="{9BAD008B-C58F-DC47-9BDF-ACF9484DF185}" type="datetimeFigureOut">
               <a:rPr lang="en-GB" smtClean="0"/>
-              <a:t>05/11/2020</a:t>
+              <a:t>16/11/2020</a:t>
             </a:fld>
             <a:endParaRPr lang="en-GB"/>
           </a:p>
@@ -595,7 +595,7 @@
           <a:p>
             <a:fld id="{9BAD008B-C58F-DC47-9BDF-ACF9484DF185}" type="datetimeFigureOut">
               <a:rPr lang="en-GB" smtClean="0"/>
-              <a:t>05/11/2020</a:t>
+              <a:t>16/11/2020</a:t>
             </a:fld>
             <a:endParaRPr lang="en-GB"/>
           </a:p>
@@ -765,7 +765,7 @@
           <a:p>
             <a:fld id="{9BAD008B-C58F-DC47-9BDF-ACF9484DF185}" type="datetimeFigureOut">
               <a:rPr lang="en-GB" smtClean="0"/>
-              <a:t>05/11/2020</a:t>
+              <a:t>16/11/2020</a:t>
             </a:fld>
             <a:endParaRPr lang="en-GB"/>
           </a:p>
@@ -1009,7 +1009,7 @@
           <a:p>
             <a:fld id="{9BAD008B-C58F-DC47-9BDF-ACF9484DF185}" type="datetimeFigureOut">
               <a:rPr lang="en-GB" smtClean="0"/>
-              <a:t>05/11/2020</a:t>
+              <a:t>16/11/2020</a:t>
             </a:fld>
             <a:endParaRPr lang="en-GB"/>
           </a:p>
@@ -1241,7 +1241,7 @@
           <a:p>
             <a:fld id="{9BAD008B-C58F-DC47-9BDF-ACF9484DF185}" type="datetimeFigureOut">
               <a:rPr lang="en-GB" smtClean="0"/>
-              <a:t>05/11/2020</a:t>
+              <a:t>16/11/2020</a:t>
             </a:fld>
             <a:endParaRPr lang="en-GB"/>
           </a:p>
@@ -1608,7 +1608,7 @@
           <a:p>
             <a:fld id="{9BAD008B-C58F-DC47-9BDF-ACF9484DF185}" type="datetimeFigureOut">
               <a:rPr lang="en-GB" smtClean="0"/>
-              <a:t>05/11/2020</a:t>
+              <a:t>16/11/2020</a:t>
             </a:fld>
             <a:endParaRPr lang="en-GB"/>
           </a:p>
@@ -1726,7 +1726,7 @@
           <a:p>
             <a:fld id="{9BAD008B-C58F-DC47-9BDF-ACF9484DF185}" type="datetimeFigureOut">
               <a:rPr lang="en-GB" smtClean="0"/>
-              <a:t>05/11/2020</a:t>
+              <a:t>16/11/2020</a:t>
             </a:fld>
             <a:endParaRPr lang="en-GB"/>
           </a:p>
@@ -1821,7 +1821,7 @@
           <a:p>
             <a:fld id="{9BAD008B-C58F-DC47-9BDF-ACF9484DF185}" type="datetimeFigureOut">
               <a:rPr lang="en-GB" smtClean="0"/>
-              <a:t>05/11/2020</a:t>
+              <a:t>16/11/2020</a:t>
             </a:fld>
             <a:endParaRPr lang="en-GB"/>
           </a:p>
@@ -2098,7 +2098,7 @@
           <a:p>
             <a:fld id="{9BAD008B-C58F-DC47-9BDF-ACF9484DF185}" type="datetimeFigureOut">
               <a:rPr lang="en-GB" smtClean="0"/>
-              <a:t>05/11/2020</a:t>
+              <a:t>16/11/2020</a:t>
             </a:fld>
             <a:endParaRPr lang="en-GB"/>
           </a:p>
@@ -2355,7 +2355,7 @@
           <a:p>
             <a:fld id="{9BAD008B-C58F-DC47-9BDF-ACF9484DF185}" type="datetimeFigureOut">
               <a:rPr lang="en-GB" smtClean="0"/>
-              <a:t>05/11/2020</a:t>
+              <a:t>16/11/2020</a:t>
             </a:fld>
             <a:endParaRPr lang="en-GB"/>
           </a:p>
@@ -2568,7 +2568,7 @@
           <a:p>
             <a:fld id="{9BAD008B-C58F-DC47-9BDF-ACF9484DF185}" type="datetimeFigureOut">
               <a:rPr lang="en-GB" smtClean="0"/>
-              <a:t>05/11/2020</a:t>
+              <a:t>16/11/2020</a:t>
             </a:fld>
             <a:endParaRPr lang="en-GB"/>
           </a:p>
@@ -8021,7 +8021,7 @@
         </p:nvSpPr>
         <p:spPr>
           <a:xfrm>
-            <a:off x="922713" y="1805012"/>
+            <a:off x="922713" y="1883393"/>
             <a:ext cx="5128952" cy="369332"/>
           </a:xfrm>
           <a:prstGeom prst="rect">
@@ -8056,7 +8056,7 @@
         </p:nvSpPr>
         <p:spPr>
           <a:xfrm>
-            <a:off x="922713" y="3946328"/>
+            <a:off x="922713" y="4024709"/>
             <a:ext cx="5128952" cy="369332"/>
           </a:xfrm>
           <a:prstGeom prst="rect">
@@ -8091,7 +8091,7 @@
         </p:nvGrpSpPr>
         <p:grpSpPr>
           <a:xfrm>
-            <a:off x="633452" y="2202975"/>
+            <a:off x="633452" y="2281356"/>
             <a:ext cx="5734097" cy="1457407"/>
             <a:chOff x="633452" y="3200400"/>
             <a:chExt cx="5734097" cy="1457407"/>
@@ -8984,7 +8984,7 @@
         </p:nvGrpSpPr>
         <p:grpSpPr>
           <a:xfrm>
-            <a:off x="633452" y="4494019"/>
+            <a:off x="633452" y="4572400"/>
             <a:ext cx="5734097" cy="1457407"/>
             <a:chOff x="633452" y="3200400"/>
             <a:chExt cx="5734097" cy="1457407"/>
@@ -9247,6 +9247,46 @@
           </p:style>
         </p:cxnSp>
       </p:grpSp>
+      <p:sp>
+        <p:nvSpPr>
+          <p:cNvPr id="3" name="Rectangle 2">
+            <a:extLst>
+              <a:ext uri="{FF2B5EF4-FFF2-40B4-BE49-F238E27FC236}">
+                <a16:creationId xmlns:a16="http://schemas.microsoft.com/office/drawing/2014/main" id="{27FA2C43-8793-A245-9C03-0DE3685AC609}"/>
+              </a:ext>
+            </a:extLst>
+          </p:cNvPr>
+          <p:cNvSpPr/>
+          <p:nvPr/>
+        </p:nvSpPr>
+        <p:spPr>
+          <a:xfrm>
+            <a:off x="1697805" y="1611632"/>
+            <a:ext cx="1836015" cy="276999"/>
+          </a:xfrm>
+          <a:prstGeom prst="rect">
+            <a:avLst/>
+          </a:prstGeom>
+        </p:spPr>
+        <p:txBody>
+          <a:bodyPr wrap="none">
+            <a:spAutoFit/>
+          </a:bodyPr>
+          <a:lstStyle/>
+          <a:p>
+            <a:r>
+              <a:rPr lang="en-GB" sz="1200" dirty="0">
+                <a:solidFill>
+                  <a:schemeClr val="bg2">
+                    <a:lumMod val="50000"/>
+                  </a:schemeClr>
+                </a:solidFill>
+              </a:rPr>
+              <a:t>http://lfal.co/PeelAndSlice</a:t>
+            </a:r>
+          </a:p>
+        </p:txBody>
+      </p:sp>
     </p:spTree>
     <p:extLst>
       <p:ext uri="{BB962C8B-B14F-4D97-AF65-F5344CB8AC3E}">

</xml_diff>

<commit_message>
Finish week 4 homework
Co-Authored-By: Llewellyn Falco <10874+isidore@users.noreply.github.com>
</commit_message>
<xml_diff>
--- a/Homework Printouts.pptx
+++ b/Homework Printouts.pptx
@@ -9332,7 +9332,7 @@
         </p:nvSpPr>
         <p:spPr>
           <a:xfrm>
-            <a:off x="922713" y="2074982"/>
+            <a:off x="800787" y="2074982"/>
             <a:ext cx="5128952" cy="369332"/>
           </a:xfrm>
           <a:prstGeom prst="rect">
@@ -9415,7 +9415,7 @@
         </p:nvSpPr>
         <p:spPr>
           <a:xfrm>
-            <a:off x="922713" y="961270"/>
+            <a:off x="800787" y="961270"/>
             <a:ext cx="5128952" cy="369332"/>
           </a:xfrm>
           <a:prstGeom prst="rect">
@@ -9450,7 +9450,7 @@
         </p:nvSpPr>
         <p:spPr>
           <a:xfrm>
-            <a:off x="3586103" y="1078278"/>
+            <a:off x="3464177" y="1078278"/>
             <a:ext cx="169830" cy="169830"/>
           </a:xfrm>
           <a:prstGeom prst="rect">
@@ -9502,7 +9502,7 @@
         </p:nvSpPr>
         <p:spPr>
           <a:xfrm>
-            <a:off x="3533820" y="952957"/>
+            <a:off x="3411894" y="952957"/>
             <a:ext cx="490451" cy="369332"/>
           </a:xfrm>
           <a:prstGeom prst="rect">
@@ -9543,7 +9543,7 @@
         </p:nvSpPr>
         <p:spPr>
           <a:xfrm>
-            <a:off x="922713" y="1374927"/>
+            <a:off x="800787" y="1374927"/>
             <a:ext cx="5128952" cy="369332"/>
           </a:xfrm>
           <a:prstGeom prst="rect">
@@ -9578,7 +9578,7 @@
         </p:nvSpPr>
         <p:spPr>
           <a:xfrm>
-            <a:off x="3586103" y="1491935"/>
+            <a:off x="3464177" y="1491935"/>
             <a:ext cx="169830" cy="169830"/>
           </a:xfrm>
           <a:prstGeom prst="rect">
@@ -9630,7 +9630,7 @@
         </p:nvSpPr>
         <p:spPr>
           <a:xfrm>
-            <a:off x="3533820" y="1366614"/>
+            <a:off x="3411894" y="1366614"/>
             <a:ext cx="490451" cy="369332"/>
           </a:xfrm>
           <a:prstGeom prst="rect">
@@ -9671,7 +9671,7 @@
         </p:nvSpPr>
         <p:spPr>
           <a:xfrm>
-            <a:off x="922713" y="4060225"/>
+            <a:off x="800787" y="4060225"/>
             <a:ext cx="5128952" cy="369332"/>
           </a:xfrm>
           <a:prstGeom prst="rect">
@@ -9706,7 +9706,7 @@
         </p:nvSpPr>
         <p:spPr>
           <a:xfrm>
-            <a:off x="922713" y="5758279"/>
+            <a:off x="800787" y="5758279"/>
             <a:ext cx="5128952" cy="369332"/>
           </a:xfrm>
           <a:prstGeom prst="rect">
@@ -9741,7 +9741,7 @@
         </p:nvGrpSpPr>
         <p:grpSpPr>
           <a:xfrm>
-            <a:off x="979535" y="6215995"/>
+            <a:off x="857609" y="6215995"/>
             <a:ext cx="5212260" cy="1475471"/>
             <a:chOff x="633452" y="3182336"/>
             <a:chExt cx="5734097" cy="1475471"/>
@@ -9776,16 +9776,6 @@
             <a:lstStyle/>
             <a:p>
               <a:r>
-                <a:rPr lang="en-GB" sz="1200" dirty="0" err="1">
-                  <a:solidFill>
-                    <a:schemeClr val="bg1">
-                      <a:lumMod val="75000"/>
-                    </a:schemeClr>
-                  </a:solidFill>
-                </a:rPr>
-                <a:t>getReport</a:t>
-              </a:r>
-              <a:r>
                 <a:rPr lang="en-GB" sz="1200" dirty="0">
                   <a:solidFill>
                     <a:schemeClr val="bg1">
@@ -9793,7 +9783,7 @@
                     </a:schemeClr>
                   </a:solidFill>
                 </a:rPr>
-                <a:t>()           		Scrubbed dates</a:t>
+                <a:t>getReport()           		Scrubbed dates</a:t>
               </a:r>
             </a:p>
           </p:txBody>
@@ -10063,7 +10053,7 @@
         </p:nvGrpSpPr>
         <p:grpSpPr>
           <a:xfrm>
-            <a:off x="1031264" y="3030142"/>
+            <a:off x="909338" y="3030142"/>
             <a:ext cx="4152424" cy="294517"/>
             <a:chOff x="1506014" y="1954058"/>
             <a:chExt cx="4152424" cy="294517"/>
@@ -12208,7 +12198,7 @@
         </p:nvGrpSpPr>
         <p:grpSpPr>
           <a:xfrm>
-            <a:off x="979534" y="4940570"/>
+            <a:off x="857608" y="4940570"/>
             <a:ext cx="4152424" cy="294517"/>
             <a:chOff x="1506014" y="1954058"/>
             <a:chExt cx="4152424" cy="294517"/>
@@ -14361,7 +14351,7 @@
         </p:blipFill>
         <p:spPr>
           <a:xfrm>
-            <a:off x="2961837" y="4026412"/>
+            <a:off x="2839911" y="4026412"/>
             <a:ext cx="3147566" cy="693214"/>
           </a:xfrm>
           <a:prstGeom prst="rect">
@@ -14391,7 +14381,7 @@
         </p:blipFill>
         <p:spPr>
           <a:xfrm>
-            <a:off x="2951335" y="2112235"/>
+            <a:off x="2829409" y="2112235"/>
             <a:ext cx="2274085" cy="708231"/>
           </a:xfrm>
           <a:prstGeom prst="rect">
@@ -14415,7 +14405,7 @@
         </p:nvCxnSpPr>
         <p:spPr>
           <a:xfrm>
-            <a:off x="2707462" y="6092775"/>
+            <a:off x="2585536" y="6092775"/>
             <a:ext cx="0" cy="1600975"/>
           </a:xfrm>
           <a:prstGeom prst="line">
@@ -14456,8 +14446,8 @@
         </p:nvSpPr>
         <p:spPr>
           <a:xfrm>
-            <a:off x="922713" y="8159931"/>
-            <a:ext cx="5128952" cy="830997"/>
+            <a:off x="1038191" y="8182730"/>
+            <a:ext cx="5128952" cy="738664"/>
           </a:xfrm>
           <a:prstGeom prst="rect">
             <a:avLst/>
@@ -14472,29 +14462,95 @@
           <a:p>
             <a:pPr algn="r"/>
             <a:r>
-              <a:rPr lang="en-GB" sz="1200" dirty="0"/>
+              <a:rPr lang="en-GB" sz="1050" dirty="0">
+                <a:solidFill>
+                  <a:schemeClr val="tx1">
+                    <a:lumMod val="65000"/>
+                    <a:lumOff val="35000"/>
+                  </a:schemeClr>
+                </a:solidFill>
+                <a:latin typeface="Cavolini" panose="020B0604020202020204" pitchFamily="34" charset="0"/>
+                <a:cs typeface="Cavolini" panose="020B0604020202020204" pitchFamily="34" charset="0"/>
+              </a:rPr>
               <a:t>We hope you enjoyed this class as much as we enjoy teaching it.</a:t>
             </a:r>
           </a:p>
           <a:p>
             <a:pPr algn="r"/>
             <a:r>
-              <a:rPr lang="en-GB" sz="1200" dirty="0"/>
+              <a:rPr lang="en-GB" sz="1050" dirty="0">
+                <a:solidFill>
+                  <a:schemeClr val="tx1">
+                    <a:lumMod val="65000"/>
+                    <a:lumOff val="35000"/>
+                  </a:schemeClr>
+                </a:solidFill>
+                <a:latin typeface="Cavolini" panose="020B0604020202020204" pitchFamily="34" charset="0"/>
+                <a:cs typeface="Cavolini" panose="020B0604020202020204" pitchFamily="34" charset="0"/>
+              </a:rPr>
               <a:t>Please ping us if you ever need help.</a:t>
             </a:r>
           </a:p>
           <a:p>
             <a:pPr algn="r"/>
             <a:r>
-              <a:rPr lang="en-GB" sz="1200" dirty="0"/>
-              <a:t>llewellyn.falco@gmail.com</a:t>
+              <a:rPr lang="en-GB" sz="1050" dirty="0">
+                <a:solidFill>
+                  <a:schemeClr val="tx1">
+                    <a:lumMod val="95000"/>
+                    <a:lumOff val="5000"/>
+                  </a:schemeClr>
+                </a:solidFill>
+                <a:latin typeface="Verdana" panose="020B0604030504040204" pitchFamily="34" charset="0"/>
+                <a:ea typeface="Verdana" panose="020B0604030504040204" pitchFamily="34" charset="0"/>
+                <a:cs typeface="Verdana" panose="020B0604030504040204" pitchFamily="34" charset="0"/>
+              </a:rPr>
+              <a:t>llewellyn</a:t>
+            </a:r>
+            <a:r>
+              <a:rPr lang="en-GB" sz="1050" dirty="0">
+                <a:solidFill>
+                  <a:schemeClr val="tx1">
+                    <a:lumMod val="65000"/>
+                    <a:lumOff val="35000"/>
+                  </a:schemeClr>
+                </a:solidFill>
+                <a:latin typeface="Verdana" panose="020B0604030504040204" pitchFamily="34" charset="0"/>
+                <a:ea typeface="Verdana" panose="020B0604030504040204" pitchFamily="34" charset="0"/>
+                <a:cs typeface="Verdana" panose="020B0604030504040204" pitchFamily="34" charset="0"/>
+              </a:rPr>
+              <a:t>.falco@gmail.com</a:t>
             </a:r>
           </a:p>
           <a:p>
             <a:pPr algn="r"/>
             <a:r>
-              <a:rPr lang="en-GB" sz="1200" dirty="0"/>
-              <a:t>clare@claremacrae.co.uk</a:t>
+              <a:rPr lang="en-GB" sz="1050" dirty="0">
+                <a:solidFill>
+                  <a:schemeClr val="tx1">
+                    <a:lumMod val="95000"/>
+                    <a:lumOff val="5000"/>
+                  </a:schemeClr>
+                </a:solidFill>
+                <a:latin typeface="Verdana" panose="020B0604030504040204" pitchFamily="34" charset="0"/>
+                <a:ea typeface="Verdana" panose="020B0604030504040204" pitchFamily="34" charset="0"/>
+                <a:cs typeface="Verdana" panose="020B0604030504040204" pitchFamily="34" charset="0"/>
+              </a:rPr>
+              <a:t>clare</a:t>
+            </a:r>
+            <a:r>
+              <a:rPr lang="en-GB" sz="1050" dirty="0">
+                <a:solidFill>
+                  <a:schemeClr val="tx1">
+                    <a:lumMod val="65000"/>
+                    <a:lumOff val="35000"/>
+                  </a:schemeClr>
+                </a:solidFill>
+                <a:latin typeface="Verdana" panose="020B0604030504040204" pitchFamily="34" charset="0"/>
+                <a:ea typeface="Verdana" panose="020B0604030504040204" pitchFamily="34" charset="0"/>
+                <a:cs typeface="Verdana" panose="020B0604030504040204" pitchFamily="34" charset="0"/>
+              </a:rPr>
+              <a:t>@claremacrae.co.uk</a:t>
             </a:r>
           </a:p>
         </p:txBody>

</xml_diff>

<commit_message>
Add Functional Code image
Co-Authored-By: Llewellyn Falco <10874+isidore@users.noreply.github.com>
</commit_message>
<xml_diff>
--- a/Homework Printouts.pptx
+++ b/Homework Printouts.pptx
@@ -246,7 +246,7 @@
           <a:p>
             <a:fld id="{9BAD008B-C58F-DC47-9BDF-ACF9484DF185}" type="datetimeFigureOut">
               <a:rPr lang="en-GB" smtClean="0"/>
-              <a:t>23/11/2020</a:t>
+              <a:t>26/11/2020</a:t>
             </a:fld>
             <a:endParaRPr lang="en-GB"/>
           </a:p>
@@ -416,7 +416,7 @@
           <a:p>
             <a:fld id="{9BAD008B-C58F-DC47-9BDF-ACF9484DF185}" type="datetimeFigureOut">
               <a:rPr lang="en-GB" smtClean="0"/>
-              <a:t>23/11/2020</a:t>
+              <a:t>26/11/2020</a:t>
             </a:fld>
             <a:endParaRPr lang="en-GB"/>
           </a:p>
@@ -596,7 +596,7 @@
           <a:p>
             <a:fld id="{9BAD008B-C58F-DC47-9BDF-ACF9484DF185}" type="datetimeFigureOut">
               <a:rPr lang="en-GB" smtClean="0"/>
-              <a:t>23/11/2020</a:t>
+              <a:t>26/11/2020</a:t>
             </a:fld>
             <a:endParaRPr lang="en-GB"/>
           </a:p>
@@ -766,7 +766,7 @@
           <a:p>
             <a:fld id="{9BAD008B-C58F-DC47-9BDF-ACF9484DF185}" type="datetimeFigureOut">
               <a:rPr lang="en-GB" smtClean="0"/>
-              <a:t>23/11/2020</a:t>
+              <a:t>26/11/2020</a:t>
             </a:fld>
             <a:endParaRPr lang="en-GB"/>
           </a:p>
@@ -1010,7 +1010,7 @@
           <a:p>
             <a:fld id="{9BAD008B-C58F-DC47-9BDF-ACF9484DF185}" type="datetimeFigureOut">
               <a:rPr lang="en-GB" smtClean="0"/>
-              <a:t>23/11/2020</a:t>
+              <a:t>26/11/2020</a:t>
             </a:fld>
             <a:endParaRPr lang="en-GB"/>
           </a:p>
@@ -1242,7 +1242,7 @@
           <a:p>
             <a:fld id="{9BAD008B-C58F-DC47-9BDF-ACF9484DF185}" type="datetimeFigureOut">
               <a:rPr lang="en-GB" smtClean="0"/>
-              <a:t>23/11/2020</a:t>
+              <a:t>26/11/2020</a:t>
             </a:fld>
             <a:endParaRPr lang="en-GB"/>
           </a:p>
@@ -1609,7 +1609,7 @@
           <a:p>
             <a:fld id="{9BAD008B-C58F-DC47-9BDF-ACF9484DF185}" type="datetimeFigureOut">
               <a:rPr lang="en-GB" smtClean="0"/>
-              <a:t>23/11/2020</a:t>
+              <a:t>26/11/2020</a:t>
             </a:fld>
             <a:endParaRPr lang="en-GB"/>
           </a:p>
@@ -1727,7 +1727,7 @@
           <a:p>
             <a:fld id="{9BAD008B-C58F-DC47-9BDF-ACF9484DF185}" type="datetimeFigureOut">
               <a:rPr lang="en-GB" smtClean="0"/>
-              <a:t>23/11/2020</a:t>
+              <a:t>26/11/2020</a:t>
             </a:fld>
             <a:endParaRPr lang="en-GB"/>
           </a:p>
@@ -1822,7 +1822,7 @@
           <a:p>
             <a:fld id="{9BAD008B-C58F-DC47-9BDF-ACF9484DF185}" type="datetimeFigureOut">
               <a:rPr lang="en-GB" smtClean="0"/>
-              <a:t>23/11/2020</a:t>
+              <a:t>26/11/2020</a:t>
             </a:fld>
             <a:endParaRPr lang="en-GB"/>
           </a:p>
@@ -2099,7 +2099,7 @@
           <a:p>
             <a:fld id="{9BAD008B-C58F-DC47-9BDF-ACF9484DF185}" type="datetimeFigureOut">
               <a:rPr lang="en-GB" smtClean="0"/>
-              <a:t>23/11/2020</a:t>
+              <a:t>26/11/2020</a:t>
             </a:fld>
             <a:endParaRPr lang="en-GB"/>
           </a:p>
@@ -2356,7 +2356,7 @@
           <a:p>
             <a:fld id="{9BAD008B-C58F-DC47-9BDF-ACF9484DF185}" type="datetimeFigureOut">
               <a:rPr lang="en-GB" smtClean="0"/>
-              <a:t>23/11/2020</a:t>
+              <a:t>26/11/2020</a:t>
             </a:fld>
             <a:endParaRPr lang="en-GB"/>
           </a:p>
@@ -2569,7 +2569,7 @@
           <a:p>
             <a:fld id="{9BAD008B-C58F-DC47-9BDF-ACF9484DF185}" type="datetimeFigureOut">
               <a:rPr lang="en-GB" smtClean="0"/>
-              <a:t>23/11/2020</a:t>
+              <a:t>26/11/2020</a:t>
             </a:fld>
             <a:endParaRPr lang="en-GB"/>
           </a:p>
@@ -5768,7 +5768,7 @@
         <p:spPr>
           <a:xfrm>
             <a:off x="223069" y="207820"/>
-            <a:ext cx="3344185" cy="584775"/>
+            <a:ext cx="3352777" cy="430887"/>
           </a:xfrm>
           <a:prstGeom prst="rect">
             <a:avLst/>
@@ -5791,12 +5791,6 @@
             <a:r>
               <a:rPr lang="en-GB" sz="1000" dirty="0"/>
               <a:t>Week 1 Observation Homework</a:t>
-            </a:r>
-          </a:p>
-          <a:p>
-            <a:r>
-              <a:rPr lang="en-GB" sz="1000" dirty="0"/>
-              <a:t>November 2020</a:t>
             </a:r>
           </a:p>
         </p:txBody>
@@ -6175,6 +6169,36 @@
           </a:p>
         </p:txBody>
       </p:sp>
+      <p:pic>
+        <p:nvPicPr>
+          <p:cNvPr id="3" name="Picture 2">
+            <a:extLst>
+              <a:ext uri="{FF2B5EF4-FFF2-40B4-BE49-F238E27FC236}">
+                <a16:creationId xmlns:a16="http://schemas.microsoft.com/office/drawing/2014/main" id="{4B8904C0-F23C-D946-A831-27D7C259320B}"/>
+              </a:ext>
+            </a:extLst>
+          </p:cNvPr>
+          <p:cNvPicPr>
+            <a:picLocks noChangeAspect="1"/>
+          </p:cNvPicPr>
+          <p:nvPr/>
+        </p:nvPicPr>
+        <p:blipFill>
+          <a:blip r:embed="rId2"/>
+          <a:stretch>
+            <a:fillRect/>
+          </a:stretch>
+        </p:blipFill>
+        <p:spPr>
+          <a:xfrm>
+            <a:off x="4349871" y="220817"/>
+            <a:ext cx="1965487" cy="1232690"/>
+          </a:xfrm>
+          <a:prstGeom prst="rect">
+            <a:avLst/>
+          </a:prstGeom>
+        </p:spPr>
+      </p:pic>
     </p:spTree>
     <p:extLst>
       <p:ext uri="{BB962C8B-B14F-4D97-AF65-F5344CB8AC3E}">
@@ -6798,7 +6822,7 @@
         <p:spPr>
           <a:xfrm>
             <a:off x="223069" y="207820"/>
-            <a:ext cx="3344185" cy="584775"/>
+            <a:ext cx="3352777" cy="430887"/>
           </a:xfrm>
           <a:prstGeom prst="rect">
             <a:avLst/>
@@ -6821,12 +6845,6 @@
             <a:r>
               <a:rPr lang="en-GB" sz="1000" dirty="0"/>
               <a:t>Week 2 Observation Homework</a:t>
-            </a:r>
-          </a:p>
-          <a:p>
-            <a:r>
-              <a:rPr lang="en-GB" sz="1000" dirty="0"/>
-              <a:t>November 2020</a:t>
             </a:r>
           </a:p>
         </p:txBody>
@@ -8370,7 +8388,7 @@
         <p:spPr>
           <a:xfrm>
             <a:off x="223069" y="207820"/>
-            <a:ext cx="3344185" cy="584775"/>
+            <a:ext cx="3352777" cy="430887"/>
           </a:xfrm>
           <a:prstGeom prst="rect">
             <a:avLst/>
@@ -8393,12 +8411,6 @@
             <a:r>
               <a:rPr lang="en-GB" sz="1000" dirty="0"/>
               <a:t>Week 3 Observation Homework</a:t>
-            </a:r>
-          </a:p>
-          <a:p>
-            <a:r>
-              <a:rPr lang="en-GB" sz="1000" dirty="0"/>
-              <a:t>November 2020</a:t>
             </a:r>
           </a:p>
         </p:txBody>
@@ -9368,7 +9380,7 @@
         <p:spPr>
           <a:xfrm>
             <a:off x="223069" y="207820"/>
-            <a:ext cx="3344185" cy="584775"/>
+            <a:ext cx="3352777" cy="430887"/>
           </a:xfrm>
           <a:prstGeom prst="rect">
             <a:avLst/>
@@ -9391,12 +9403,6 @@
             <a:r>
               <a:rPr lang="en-GB" sz="1000" dirty="0"/>
               <a:t>Week 4 Observation Homework</a:t>
-            </a:r>
-          </a:p>
-          <a:p>
-            <a:r>
-              <a:rPr lang="en-GB" sz="1000" dirty="0"/>
-              <a:t>November 2020</a:t>
             </a:r>
           </a:p>
         </p:txBody>

</xml_diff>